<commit_message>
Added Makefile Defined terms now linked in HTML
</commit_message>
<xml_diff>
--- a/pptx/figures.pptx
+++ b/pptx/figures.pptx
@@ -11,6 +11,7 @@
     <p:sldId id="274" r:id="rId5"/>
     <p:sldId id="276" r:id="rId6"/>
     <p:sldId id="277" r:id="rId7"/>
+    <p:sldId id="278" r:id="rId8"/>
   </p:sldIdLst>
   <p:sldSz cx="12192000" cy="6858000"/>
   <p:notesSz cx="6858000" cy="9144000"/>
@@ -275,7 +276,7 @@
           <a:p>
             <a:fld id="{8B6844D7-9723-4963-9A7A-AA67393D1570}" type="datetimeFigureOut">
               <a:rPr lang="en-US" smtClean="0"/>
-              <a:t>5/4/2024</a:t>
+              <a:t>7/22/2024</a:t>
             </a:fld>
             <a:endParaRPr lang="en-US"/>
           </a:p>
@@ -473,7 +474,7 @@
           <a:p>
             <a:fld id="{8B6844D7-9723-4963-9A7A-AA67393D1570}" type="datetimeFigureOut">
               <a:rPr lang="en-US" smtClean="0"/>
-              <a:t>5/4/2024</a:t>
+              <a:t>7/22/2024</a:t>
             </a:fld>
             <a:endParaRPr lang="en-US"/>
           </a:p>
@@ -681,7 +682,7 @@
           <a:p>
             <a:fld id="{8B6844D7-9723-4963-9A7A-AA67393D1570}" type="datetimeFigureOut">
               <a:rPr lang="en-US" smtClean="0"/>
-              <a:t>5/4/2024</a:t>
+              <a:t>7/22/2024</a:t>
             </a:fld>
             <a:endParaRPr lang="en-US"/>
           </a:p>
@@ -879,7 +880,7 @@
           <a:p>
             <a:fld id="{8B6844D7-9723-4963-9A7A-AA67393D1570}" type="datetimeFigureOut">
               <a:rPr lang="en-US" smtClean="0"/>
-              <a:t>5/4/2024</a:t>
+              <a:t>7/22/2024</a:t>
             </a:fld>
             <a:endParaRPr lang="en-US"/>
           </a:p>
@@ -1154,7 +1155,7 @@
           <a:p>
             <a:fld id="{8B6844D7-9723-4963-9A7A-AA67393D1570}" type="datetimeFigureOut">
               <a:rPr lang="en-US" smtClean="0"/>
-              <a:t>5/4/2024</a:t>
+              <a:t>7/22/2024</a:t>
             </a:fld>
             <a:endParaRPr lang="en-US"/>
           </a:p>
@@ -1419,7 +1420,7 @@
           <a:p>
             <a:fld id="{8B6844D7-9723-4963-9A7A-AA67393D1570}" type="datetimeFigureOut">
               <a:rPr lang="en-US" smtClean="0"/>
-              <a:t>5/4/2024</a:t>
+              <a:t>7/22/2024</a:t>
             </a:fld>
             <a:endParaRPr lang="en-US"/>
           </a:p>
@@ -1831,7 +1832,7 @@
           <a:p>
             <a:fld id="{8B6844D7-9723-4963-9A7A-AA67393D1570}" type="datetimeFigureOut">
               <a:rPr lang="en-US" smtClean="0"/>
-              <a:t>5/4/2024</a:t>
+              <a:t>7/22/2024</a:t>
             </a:fld>
             <a:endParaRPr lang="en-US"/>
           </a:p>
@@ -1972,7 +1973,7 @@
           <a:p>
             <a:fld id="{8B6844D7-9723-4963-9A7A-AA67393D1570}" type="datetimeFigureOut">
               <a:rPr lang="en-US" smtClean="0"/>
-              <a:t>5/4/2024</a:t>
+              <a:t>7/22/2024</a:t>
             </a:fld>
             <a:endParaRPr lang="en-US"/>
           </a:p>
@@ -2085,7 +2086,7 @@
           <a:p>
             <a:fld id="{8B6844D7-9723-4963-9A7A-AA67393D1570}" type="datetimeFigureOut">
               <a:rPr lang="en-US" smtClean="0"/>
-              <a:t>5/4/2024</a:t>
+              <a:t>7/22/2024</a:t>
             </a:fld>
             <a:endParaRPr lang="en-US"/>
           </a:p>
@@ -2396,7 +2397,7 @@
           <a:p>
             <a:fld id="{8B6844D7-9723-4963-9A7A-AA67393D1570}" type="datetimeFigureOut">
               <a:rPr lang="en-US" smtClean="0"/>
-              <a:t>5/4/2024</a:t>
+              <a:t>7/22/2024</a:t>
             </a:fld>
             <a:endParaRPr lang="en-US"/>
           </a:p>
@@ -2684,7 +2685,7 @@
           <a:p>
             <a:fld id="{8B6844D7-9723-4963-9A7A-AA67393D1570}" type="datetimeFigureOut">
               <a:rPr lang="en-US" smtClean="0"/>
-              <a:t>5/4/2024</a:t>
+              <a:t>7/22/2024</a:t>
             </a:fld>
             <a:endParaRPr lang="en-US"/>
           </a:p>
@@ -2925,7 +2926,7 @@
           <a:p>
             <a:fld id="{8B6844D7-9723-4963-9A7A-AA67393D1570}" type="datetimeFigureOut">
               <a:rPr lang="en-US" smtClean="0"/>
-              <a:t>5/4/2024</a:t>
+              <a:t>7/22/2024</a:t>
             </a:fld>
             <a:endParaRPr lang="en-US"/>
           </a:p>
@@ -32037,6 +32038,1381 @@
 </p:sld>
 </file>
 
+<file path=ppt/slides/slide7.xml><?xml version="1.0" encoding="utf-8"?>
+<p:sld xmlns:a="http://schemas.openxmlformats.org/drawingml/2006/main" xmlns:r="http://schemas.openxmlformats.org/officeDocument/2006/relationships" xmlns:p="http://schemas.openxmlformats.org/presentationml/2006/main">
+  <p:cSld>
+    <p:spTree>
+      <p:nvGrpSpPr>
+        <p:cNvPr id="1" name=""/>
+        <p:cNvGrpSpPr/>
+        <p:nvPr/>
+      </p:nvGrpSpPr>
+      <p:grpSpPr>
+        <a:xfrm>
+          <a:off x="0" y="0"/>
+          <a:ext cx="0" cy="0"/>
+          <a:chOff x="0" y="0"/>
+          <a:chExt cx="0" cy="0"/>
+        </a:xfrm>
+      </p:grpSpPr>
+      <p:sp>
+        <p:nvSpPr>
+          <p:cNvPr id="2" name="Slide Number Placeholder 1">
+            <a:extLst>
+              <a:ext uri="{FF2B5EF4-FFF2-40B4-BE49-F238E27FC236}">
+                <a16:creationId xmlns:a16="http://schemas.microsoft.com/office/drawing/2014/main" id="{E1B7DD40-936E-75D9-470F-DFC9C59E84F8}"/>
+              </a:ext>
+            </a:extLst>
+          </p:cNvPr>
+          <p:cNvSpPr>
+            <a:spLocks noGrp="1"/>
+          </p:cNvSpPr>
+          <p:nvPr>
+            <p:ph type="sldNum" sz="quarter" idx="12"/>
+          </p:nvPr>
+        </p:nvSpPr>
+        <p:spPr/>
+        <p:txBody>
+          <a:bodyPr/>
+          <a:lstStyle/>
+          <a:p>
+            <a:fld id="{BECF63ED-5365-0347-943C-46237B9951C9}" type="slidenum">
+              <a:rPr lang="en-US" sz="1000" smtClean="0"/>
+              <a:t>7</a:t>
+            </a:fld>
+            <a:endParaRPr lang="en-US" sz="1000"/>
+          </a:p>
+        </p:txBody>
+      </p:sp>
+      <p:sp>
+        <p:nvSpPr>
+          <p:cNvPr id="53" name="Rectangle: Rounded Corners 52">
+            <a:extLst>
+              <a:ext uri="{FF2B5EF4-FFF2-40B4-BE49-F238E27FC236}">
+                <a16:creationId xmlns:a16="http://schemas.microsoft.com/office/drawing/2014/main" id="{200C5F00-C6D5-96ED-062C-E4DF93C7C27B}"/>
+              </a:ext>
+            </a:extLst>
+          </p:cNvPr>
+          <p:cNvSpPr/>
+          <p:nvPr/>
+        </p:nvSpPr>
+        <p:spPr>
+          <a:xfrm>
+            <a:off x="5298789" y="3733800"/>
+            <a:ext cx="1329800" cy="457200"/>
+          </a:xfrm>
+          <a:prstGeom prst="roundRect">
+            <a:avLst/>
+          </a:prstGeom>
+          <a:solidFill>
+            <a:schemeClr val="accent5">
+              <a:lumMod val="60000"/>
+              <a:lumOff val="40000"/>
+            </a:schemeClr>
+          </a:solidFill>
+          <a:ln>
+            <a:solidFill>
+              <a:schemeClr val="tx1"/>
+            </a:solidFill>
+          </a:ln>
+        </p:spPr>
+        <p:style>
+          <a:lnRef idx="2">
+            <a:schemeClr val="accent1">
+              <a:shade val="50000"/>
+            </a:schemeClr>
+          </a:lnRef>
+          <a:fillRef idx="1">
+            <a:schemeClr val="accent1"/>
+          </a:fillRef>
+          <a:effectRef idx="0">
+            <a:schemeClr val="accent1"/>
+          </a:effectRef>
+          <a:fontRef idx="minor">
+            <a:schemeClr val="lt1"/>
+          </a:fontRef>
+        </p:style>
+        <p:txBody>
+          <a:bodyPr rtlCol="0" anchor="ctr"/>
+          <a:lstStyle>
+            <a:defPPr>
+              <a:defRPr lang="en-US"/>
+            </a:defPPr>
+            <a:lvl1pPr marL="0" algn="l" defTabSz="914400" rtl="0" eaLnBrk="1" latinLnBrk="0" hangingPunct="1">
+              <a:defRPr sz="1800" kern="1200">
+                <a:solidFill>
+                  <a:schemeClr val="lt1"/>
+                </a:solidFill>
+                <a:latin typeface="+mn-lt"/>
+                <a:ea typeface="+mn-ea"/>
+                <a:cs typeface="+mn-cs"/>
+              </a:defRPr>
+            </a:lvl1pPr>
+            <a:lvl2pPr marL="457200" algn="l" defTabSz="914400" rtl="0" eaLnBrk="1" latinLnBrk="0" hangingPunct="1">
+              <a:defRPr sz="1800" kern="1200">
+                <a:solidFill>
+                  <a:schemeClr val="lt1"/>
+                </a:solidFill>
+                <a:latin typeface="+mn-lt"/>
+                <a:ea typeface="+mn-ea"/>
+                <a:cs typeface="+mn-cs"/>
+              </a:defRPr>
+            </a:lvl2pPr>
+            <a:lvl3pPr marL="914400" algn="l" defTabSz="914400" rtl="0" eaLnBrk="1" latinLnBrk="0" hangingPunct="1">
+              <a:defRPr sz="1800" kern="1200">
+                <a:solidFill>
+                  <a:schemeClr val="lt1"/>
+                </a:solidFill>
+                <a:latin typeface="+mn-lt"/>
+                <a:ea typeface="+mn-ea"/>
+                <a:cs typeface="+mn-cs"/>
+              </a:defRPr>
+            </a:lvl3pPr>
+            <a:lvl4pPr marL="1371600" algn="l" defTabSz="914400" rtl="0" eaLnBrk="1" latinLnBrk="0" hangingPunct="1">
+              <a:defRPr sz="1800" kern="1200">
+                <a:solidFill>
+                  <a:schemeClr val="lt1"/>
+                </a:solidFill>
+                <a:latin typeface="+mn-lt"/>
+                <a:ea typeface="+mn-ea"/>
+                <a:cs typeface="+mn-cs"/>
+              </a:defRPr>
+            </a:lvl4pPr>
+            <a:lvl5pPr marL="1828800" algn="l" defTabSz="914400" rtl="0" eaLnBrk="1" latinLnBrk="0" hangingPunct="1">
+              <a:defRPr sz="1800" kern="1200">
+                <a:solidFill>
+                  <a:schemeClr val="lt1"/>
+                </a:solidFill>
+                <a:latin typeface="+mn-lt"/>
+                <a:ea typeface="+mn-ea"/>
+                <a:cs typeface="+mn-cs"/>
+              </a:defRPr>
+            </a:lvl5pPr>
+            <a:lvl6pPr marL="2286000" algn="l" defTabSz="914400" rtl="0" eaLnBrk="1" latinLnBrk="0" hangingPunct="1">
+              <a:defRPr sz="1800" kern="1200">
+                <a:solidFill>
+                  <a:schemeClr val="lt1"/>
+                </a:solidFill>
+                <a:latin typeface="+mn-lt"/>
+                <a:ea typeface="+mn-ea"/>
+                <a:cs typeface="+mn-cs"/>
+              </a:defRPr>
+            </a:lvl6pPr>
+            <a:lvl7pPr marL="2743200" algn="l" defTabSz="914400" rtl="0" eaLnBrk="1" latinLnBrk="0" hangingPunct="1">
+              <a:defRPr sz="1800" kern="1200">
+                <a:solidFill>
+                  <a:schemeClr val="lt1"/>
+                </a:solidFill>
+                <a:latin typeface="+mn-lt"/>
+                <a:ea typeface="+mn-ea"/>
+                <a:cs typeface="+mn-cs"/>
+              </a:defRPr>
+            </a:lvl7pPr>
+            <a:lvl8pPr marL="3200400" algn="l" defTabSz="914400" rtl="0" eaLnBrk="1" latinLnBrk="0" hangingPunct="1">
+              <a:defRPr sz="1800" kern="1200">
+                <a:solidFill>
+                  <a:schemeClr val="lt1"/>
+                </a:solidFill>
+                <a:latin typeface="+mn-lt"/>
+                <a:ea typeface="+mn-ea"/>
+                <a:cs typeface="+mn-cs"/>
+              </a:defRPr>
+            </a:lvl8pPr>
+            <a:lvl9pPr marL="3657600" algn="l" defTabSz="914400" rtl="0" eaLnBrk="1" latinLnBrk="0" hangingPunct="1">
+              <a:defRPr sz="1800" kern="1200">
+                <a:solidFill>
+                  <a:schemeClr val="lt1"/>
+                </a:solidFill>
+                <a:latin typeface="+mn-lt"/>
+                <a:ea typeface="+mn-ea"/>
+                <a:cs typeface="+mn-cs"/>
+              </a:defRPr>
+            </a:lvl9pPr>
+          </a:lstStyle>
+          <a:p>
+            <a:pPr algn="ctr"/>
+            <a:r>
+              <a:rPr lang="en-US" sz="1000" err="1">
+                <a:solidFill>
+                  <a:schemeClr val="tx1"/>
+                </a:solidFill>
+              </a:rPr>
+              <a:t>nc:</a:t>
+            </a:r>
+            <a:r>
+              <a:rPr lang="en-US" sz="1000">
+                <a:solidFill>
+                  <a:schemeClr val="tx1"/>
+                </a:solidFill>
+              </a:rPr>
+              <a:t>PersonNameType</a:t>
+            </a:r>
+          </a:p>
+        </p:txBody>
+      </p:sp>
+      <p:sp>
+        <p:nvSpPr>
+          <p:cNvPr id="54" name="Rectangle: Rounded Corners 53">
+            <a:extLst>
+              <a:ext uri="{FF2B5EF4-FFF2-40B4-BE49-F238E27FC236}">
+                <a16:creationId xmlns:a16="http://schemas.microsoft.com/office/drawing/2014/main" id="{CD6C9854-0469-8F68-FE40-E6BA9D1700AD}"/>
+              </a:ext>
+            </a:extLst>
+          </p:cNvPr>
+          <p:cNvSpPr/>
+          <p:nvPr/>
+        </p:nvSpPr>
+        <p:spPr>
+          <a:xfrm>
+            <a:off x="3335211" y="3730260"/>
+            <a:ext cx="1223862" cy="457200"/>
+          </a:xfrm>
+          <a:prstGeom prst="roundRect">
+            <a:avLst/>
+          </a:prstGeom>
+          <a:solidFill>
+            <a:schemeClr val="accent5">
+              <a:lumMod val="60000"/>
+              <a:lumOff val="40000"/>
+            </a:schemeClr>
+          </a:solidFill>
+          <a:ln>
+            <a:solidFill>
+              <a:schemeClr val="tx1"/>
+            </a:solidFill>
+          </a:ln>
+        </p:spPr>
+        <p:style>
+          <a:lnRef idx="2">
+            <a:schemeClr val="accent1">
+              <a:shade val="50000"/>
+            </a:schemeClr>
+          </a:lnRef>
+          <a:fillRef idx="1">
+            <a:schemeClr val="accent1"/>
+          </a:fillRef>
+          <a:effectRef idx="0">
+            <a:schemeClr val="accent1"/>
+          </a:effectRef>
+          <a:fontRef idx="minor">
+            <a:schemeClr val="lt1"/>
+          </a:fontRef>
+        </p:style>
+        <p:txBody>
+          <a:bodyPr rtlCol="0" anchor="ctr"/>
+          <a:lstStyle>
+            <a:defPPr>
+              <a:defRPr lang="en-US"/>
+            </a:defPPr>
+            <a:lvl1pPr marL="0" algn="l" defTabSz="914400" rtl="0" eaLnBrk="1" latinLnBrk="0" hangingPunct="1">
+              <a:defRPr sz="1800" kern="1200">
+                <a:solidFill>
+                  <a:schemeClr val="lt1"/>
+                </a:solidFill>
+                <a:latin typeface="+mn-lt"/>
+                <a:ea typeface="+mn-ea"/>
+                <a:cs typeface="+mn-cs"/>
+              </a:defRPr>
+            </a:lvl1pPr>
+            <a:lvl2pPr marL="457200" algn="l" defTabSz="914400" rtl="0" eaLnBrk="1" latinLnBrk="0" hangingPunct="1">
+              <a:defRPr sz="1800" kern="1200">
+                <a:solidFill>
+                  <a:schemeClr val="lt1"/>
+                </a:solidFill>
+                <a:latin typeface="+mn-lt"/>
+                <a:ea typeface="+mn-ea"/>
+                <a:cs typeface="+mn-cs"/>
+              </a:defRPr>
+            </a:lvl2pPr>
+            <a:lvl3pPr marL="914400" algn="l" defTabSz="914400" rtl="0" eaLnBrk="1" latinLnBrk="0" hangingPunct="1">
+              <a:defRPr sz="1800" kern="1200">
+                <a:solidFill>
+                  <a:schemeClr val="lt1"/>
+                </a:solidFill>
+                <a:latin typeface="+mn-lt"/>
+                <a:ea typeface="+mn-ea"/>
+                <a:cs typeface="+mn-cs"/>
+              </a:defRPr>
+            </a:lvl3pPr>
+            <a:lvl4pPr marL="1371600" algn="l" defTabSz="914400" rtl="0" eaLnBrk="1" latinLnBrk="0" hangingPunct="1">
+              <a:defRPr sz="1800" kern="1200">
+                <a:solidFill>
+                  <a:schemeClr val="lt1"/>
+                </a:solidFill>
+                <a:latin typeface="+mn-lt"/>
+                <a:ea typeface="+mn-ea"/>
+                <a:cs typeface="+mn-cs"/>
+              </a:defRPr>
+            </a:lvl4pPr>
+            <a:lvl5pPr marL="1828800" algn="l" defTabSz="914400" rtl="0" eaLnBrk="1" latinLnBrk="0" hangingPunct="1">
+              <a:defRPr sz="1800" kern="1200">
+                <a:solidFill>
+                  <a:schemeClr val="lt1"/>
+                </a:solidFill>
+                <a:latin typeface="+mn-lt"/>
+                <a:ea typeface="+mn-ea"/>
+                <a:cs typeface="+mn-cs"/>
+              </a:defRPr>
+            </a:lvl5pPr>
+            <a:lvl6pPr marL="2286000" algn="l" defTabSz="914400" rtl="0" eaLnBrk="1" latinLnBrk="0" hangingPunct="1">
+              <a:defRPr sz="1800" kern="1200">
+                <a:solidFill>
+                  <a:schemeClr val="lt1"/>
+                </a:solidFill>
+                <a:latin typeface="+mn-lt"/>
+                <a:ea typeface="+mn-ea"/>
+                <a:cs typeface="+mn-cs"/>
+              </a:defRPr>
+            </a:lvl6pPr>
+            <a:lvl7pPr marL="2743200" algn="l" defTabSz="914400" rtl="0" eaLnBrk="1" latinLnBrk="0" hangingPunct="1">
+              <a:defRPr sz="1800" kern="1200">
+                <a:solidFill>
+                  <a:schemeClr val="lt1"/>
+                </a:solidFill>
+                <a:latin typeface="+mn-lt"/>
+                <a:ea typeface="+mn-ea"/>
+                <a:cs typeface="+mn-cs"/>
+              </a:defRPr>
+            </a:lvl7pPr>
+            <a:lvl8pPr marL="3200400" algn="l" defTabSz="914400" rtl="0" eaLnBrk="1" latinLnBrk="0" hangingPunct="1">
+              <a:defRPr sz="1800" kern="1200">
+                <a:solidFill>
+                  <a:schemeClr val="lt1"/>
+                </a:solidFill>
+                <a:latin typeface="+mn-lt"/>
+                <a:ea typeface="+mn-ea"/>
+                <a:cs typeface="+mn-cs"/>
+              </a:defRPr>
+            </a:lvl8pPr>
+            <a:lvl9pPr marL="3657600" algn="l" defTabSz="914400" rtl="0" eaLnBrk="1" latinLnBrk="0" hangingPunct="1">
+              <a:defRPr sz="1800" kern="1200">
+                <a:solidFill>
+                  <a:schemeClr val="lt1"/>
+                </a:solidFill>
+                <a:latin typeface="+mn-lt"/>
+                <a:ea typeface="+mn-ea"/>
+                <a:cs typeface="+mn-cs"/>
+              </a:defRPr>
+            </a:lvl9pPr>
+          </a:lstStyle>
+          <a:p>
+            <a:pPr algn="ctr"/>
+            <a:r>
+              <a:rPr lang="en-US" sz="1000" err="1">
+                <a:solidFill>
+                  <a:schemeClr val="tx1"/>
+                </a:solidFill>
+              </a:rPr>
+              <a:t>nc:</a:t>
+            </a:r>
+            <a:r>
+              <a:rPr lang="en-US" sz="1000">
+                <a:solidFill>
+                  <a:schemeClr val="tx1"/>
+                </a:solidFill>
+              </a:rPr>
+              <a:t>PersonType</a:t>
+            </a:r>
+          </a:p>
+        </p:txBody>
+      </p:sp>
+      <p:sp>
+        <p:nvSpPr>
+          <p:cNvPr id="68" name="TextBox 67">
+            <a:extLst>
+              <a:ext uri="{FF2B5EF4-FFF2-40B4-BE49-F238E27FC236}">
+                <a16:creationId xmlns:a16="http://schemas.microsoft.com/office/drawing/2014/main" id="{1C52BA73-A68F-7081-6F42-AB02F01A7A09}"/>
+              </a:ext>
+            </a:extLst>
+          </p:cNvPr>
+          <p:cNvSpPr txBox="1"/>
+          <p:nvPr/>
+        </p:nvSpPr>
+        <p:spPr>
+          <a:xfrm>
+            <a:off x="4451107" y="4800600"/>
+            <a:ext cx="998991" cy="246221"/>
+          </a:xfrm>
+          <a:prstGeom prst="rect">
+            <a:avLst/>
+          </a:prstGeom>
+          <a:noFill/>
+        </p:spPr>
+        <p:txBody>
+          <a:bodyPr wrap="none" rtlCol="0">
+            <a:spAutoFit/>
+          </a:bodyPr>
+          <a:lstStyle/>
+          <a:p>
+            <a:r>
+              <a:rPr lang="en-US" sz="1000" i="1" err="1"/>
+              <a:t>nc:PersonName</a:t>
+            </a:r>
+            <a:endParaRPr lang="en-US" sz="1000" i="1"/>
+          </a:p>
+        </p:txBody>
+      </p:sp>
+      <p:sp>
+        <p:nvSpPr>
+          <p:cNvPr id="72" name="TextBox 71">
+            <a:extLst>
+              <a:ext uri="{FF2B5EF4-FFF2-40B4-BE49-F238E27FC236}">
+                <a16:creationId xmlns:a16="http://schemas.microsoft.com/office/drawing/2014/main" id="{F03B557E-6B45-9802-9750-2936D90AEAEB}"/>
+              </a:ext>
+            </a:extLst>
+          </p:cNvPr>
+          <p:cNvSpPr txBox="1"/>
+          <p:nvPr/>
+        </p:nvSpPr>
+        <p:spPr>
+          <a:xfrm>
+            <a:off x="6328181" y="4800600"/>
+            <a:ext cx="1181734" cy="246221"/>
+          </a:xfrm>
+          <a:prstGeom prst="rect">
+            <a:avLst/>
+          </a:prstGeom>
+          <a:noFill/>
+        </p:spPr>
+        <p:txBody>
+          <a:bodyPr wrap="none" rtlCol="0">
+            <a:spAutoFit/>
+          </a:bodyPr>
+          <a:lstStyle/>
+          <a:p>
+            <a:r>
+              <a:rPr lang="en-US" sz="1000" i="1" err="1"/>
+              <a:t>nc:PersonFullName</a:t>
+            </a:r>
+            <a:endParaRPr lang="en-US" sz="1000" i="1"/>
+          </a:p>
+        </p:txBody>
+      </p:sp>
+      <p:sp>
+        <p:nvSpPr>
+          <p:cNvPr id="79" name="Rectangle: Rounded Corners 78">
+            <a:extLst>
+              <a:ext uri="{FF2B5EF4-FFF2-40B4-BE49-F238E27FC236}">
+                <a16:creationId xmlns:a16="http://schemas.microsoft.com/office/drawing/2014/main" id="{B45DC37A-47D7-D8D9-6BD5-D8D093D21B37}"/>
+              </a:ext>
+            </a:extLst>
+          </p:cNvPr>
+          <p:cNvSpPr/>
+          <p:nvPr/>
+        </p:nvSpPr>
+        <p:spPr>
+          <a:xfrm>
+            <a:off x="5655960" y="4845068"/>
+            <a:ext cx="615456" cy="457200"/>
+          </a:xfrm>
+          <a:prstGeom prst="roundRect">
+            <a:avLst/>
+          </a:prstGeom>
+          <a:solidFill>
+            <a:schemeClr val="accent4">
+              <a:lumMod val="20000"/>
+              <a:lumOff val="80000"/>
+            </a:schemeClr>
+          </a:solidFill>
+          <a:ln>
+            <a:solidFill>
+              <a:schemeClr val="tx1"/>
+            </a:solidFill>
+          </a:ln>
+        </p:spPr>
+        <p:style>
+          <a:lnRef idx="2">
+            <a:schemeClr val="accent1">
+              <a:shade val="50000"/>
+            </a:schemeClr>
+          </a:lnRef>
+          <a:fillRef idx="1">
+            <a:schemeClr val="accent1"/>
+          </a:fillRef>
+          <a:effectRef idx="0">
+            <a:schemeClr val="accent1"/>
+          </a:effectRef>
+          <a:fontRef idx="minor">
+            <a:schemeClr val="lt1"/>
+          </a:fontRef>
+        </p:style>
+        <p:txBody>
+          <a:bodyPr rtlCol="0" anchor="ctr"/>
+          <a:lstStyle>
+            <a:defPPr>
+              <a:defRPr lang="en-US"/>
+            </a:defPPr>
+            <a:lvl1pPr marL="0" algn="l" defTabSz="914400" rtl="0" eaLnBrk="1" latinLnBrk="0" hangingPunct="1">
+              <a:defRPr sz="1800" kern="1200">
+                <a:solidFill>
+                  <a:schemeClr val="lt1"/>
+                </a:solidFill>
+                <a:latin typeface="+mn-lt"/>
+                <a:ea typeface="+mn-ea"/>
+                <a:cs typeface="+mn-cs"/>
+              </a:defRPr>
+            </a:lvl1pPr>
+            <a:lvl2pPr marL="457200" algn="l" defTabSz="914400" rtl="0" eaLnBrk="1" latinLnBrk="0" hangingPunct="1">
+              <a:defRPr sz="1800" kern="1200">
+                <a:solidFill>
+                  <a:schemeClr val="lt1"/>
+                </a:solidFill>
+                <a:latin typeface="+mn-lt"/>
+                <a:ea typeface="+mn-ea"/>
+                <a:cs typeface="+mn-cs"/>
+              </a:defRPr>
+            </a:lvl2pPr>
+            <a:lvl3pPr marL="914400" algn="l" defTabSz="914400" rtl="0" eaLnBrk="1" latinLnBrk="0" hangingPunct="1">
+              <a:defRPr sz="1800" kern="1200">
+                <a:solidFill>
+                  <a:schemeClr val="lt1"/>
+                </a:solidFill>
+                <a:latin typeface="+mn-lt"/>
+                <a:ea typeface="+mn-ea"/>
+                <a:cs typeface="+mn-cs"/>
+              </a:defRPr>
+            </a:lvl3pPr>
+            <a:lvl4pPr marL="1371600" algn="l" defTabSz="914400" rtl="0" eaLnBrk="1" latinLnBrk="0" hangingPunct="1">
+              <a:defRPr sz="1800" kern="1200">
+                <a:solidFill>
+                  <a:schemeClr val="lt1"/>
+                </a:solidFill>
+                <a:latin typeface="+mn-lt"/>
+                <a:ea typeface="+mn-ea"/>
+                <a:cs typeface="+mn-cs"/>
+              </a:defRPr>
+            </a:lvl4pPr>
+            <a:lvl5pPr marL="1828800" algn="l" defTabSz="914400" rtl="0" eaLnBrk="1" latinLnBrk="0" hangingPunct="1">
+              <a:defRPr sz="1800" kern="1200">
+                <a:solidFill>
+                  <a:schemeClr val="lt1"/>
+                </a:solidFill>
+                <a:latin typeface="+mn-lt"/>
+                <a:ea typeface="+mn-ea"/>
+                <a:cs typeface="+mn-cs"/>
+              </a:defRPr>
+            </a:lvl5pPr>
+            <a:lvl6pPr marL="2286000" algn="l" defTabSz="914400" rtl="0" eaLnBrk="1" latinLnBrk="0" hangingPunct="1">
+              <a:defRPr sz="1800" kern="1200">
+                <a:solidFill>
+                  <a:schemeClr val="lt1"/>
+                </a:solidFill>
+                <a:latin typeface="+mn-lt"/>
+                <a:ea typeface="+mn-ea"/>
+                <a:cs typeface="+mn-cs"/>
+              </a:defRPr>
+            </a:lvl6pPr>
+            <a:lvl7pPr marL="2743200" algn="l" defTabSz="914400" rtl="0" eaLnBrk="1" latinLnBrk="0" hangingPunct="1">
+              <a:defRPr sz="1800" kern="1200">
+                <a:solidFill>
+                  <a:schemeClr val="lt1"/>
+                </a:solidFill>
+                <a:latin typeface="+mn-lt"/>
+                <a:ea typeface="+mn-ea"/>
+                <a:cs typeface="+mn-cs"/>
+              </a:defRPr>
+            </a:lvl7pPr>
+            <a:lvl8pPr marL="3200400" algn="l" defTabSz="914400" rtl="0" eaLnBrk="1" latinLnBrk="0" hangingPunct="1">
+              <a:defRPr sz="1800" kern="1200">
+                <a:solidFill>
+                  <a:schemeClr val="lt1"/>
+                </a:solidFill>
+                <a:latin typeface="+mn-lt"/>
+                <a:ea typeface="+mn-ea"/>
+                <a:cs typeface="+mn-cs"/>
+              </a:defRPr>
+            </a:lvl8pPr>
+            <a:lvl9pPr marL="3657600" algn="l" defTabSz="914400" rtl="0" eaLnBrk="1" latinLnBrk="0" hangingPunct="1">
+              <a:defRPr sz="1800" kern="1200">
+                <a:solidFill>
+                  <a:schemeClr val="lt1"/>
+                </a:solidFill>
+                <a:latin typeface="+mn-lt"/>
+                <a:ea typeface="+mn-ea"/>
+                <a:cs typeface="+mn-cs"/>
+              </a:defRPr>
+            </a:lvl9pPr>
+          </a:lstStyle>
+          <a:p>
+            <a:pPr algn="ctr"/>
+            <a:r>
+              <a:rPr lang="en-US" sz="1000">
+                <a:solidFill>
+                  <a:schemeClr val="tx1"/>
+                </a:solidFill>
+              </a:rPr>
+              <a:t>_:n2</a:t>
+            </a:r>
+          </a:p>
+        </p:txBody>
+      </p:sp>
+      <p:sp>
+        <p:nvSpPr>
+          <p:cNvPr id="81" name="Rectangle: Rounded Corners 80">
+            <a:extLst>
+              <a:ext uri="{FF2B5EF4-FFF2-40B4-BE49-F238E27FC236}">
+                <a16:creationId xmlns:a16="http://schemas.microsoft.com/office/drawing/2014/main" id="{23FE2339-4A73-03BC-DE9A-7C5991B6A466}"/>
+              </a:ext>
+            </a:extLst>
+          </p:cNvPr>
+          <p:cNvSpPr/>
+          <p:nvPr/>
+        </p:nvSpPr>
+        <p:spPr>
+          <a:xfrm>
+            <a:off x="3629789" y="4845068"/>
+            <a:ext cx="615456" cy="457200"/>
+          </a:xfrm>
+          <a:prstGeom prst="roundRect">
+            <a:avLst/>
+          </a:prstGeom>
+          <a:solidFill>
+            <a:schemeClr val="accent4">
+              <a:lumMod val="20000"/>
+              <a:lumOff val="80000"/>
+            </a:schemeClr>
+          </a:solidFill>
+          <a:ln>
+            <a:solidFill>
+              <a:schemeClr val="tx1"/>
+            </a:solidFill>
+          </a:ln>
+        </p:spPr>
+        <p:style>
+          <a:lnRef idx="2">
+            <a:schemeClr val="accent1">
+              <a:shade val="50000"/>
+            </a:schemeClr>
+          </a:lnRef>
+          <a:fillRef idx="1">
+            <a:schemeClr val="accent1"/>
+          </a:fillRef>
+          <a:effectRef idx="0">
+            <a:schemeClr val="accent1"/>
+          </a:effectRef>
+          <a:fontRef idx="minor">
+            <a:schemeClr val="lt1"/>
+          </a:fontRef>
+        </p:style>
+        <p:txBody>
+          <a:bodyPr rtlCol="0" anchor="ctr"/>
+          <a:lstStyle>
+            <a:defPPr>
+              <a:defRPr lang="en-US"/>
+            </a:defPPr>
+            <a:lvl1pPr marL="0" algn="l" defTabSz="914400" rtl="0" eaLnBrk="1" latinLnBrk="0" hangingPunct="1">
+              <a:defRPr sz="1800" kern="1200">
+                <a:solidFill>
+                  <a:schemeClr val="lt1"/>
+                </a:solidFill>
+                <a:latin typeface="+mn-lt"/>
+                <a:ea typeface="+mn-ea"/>
+                <a:cs typeface="+mn-cs"/>
+              </a:defRPr>
+            </a:lvl1pPr>
+            <a:lvl2pPr marL="457200" algn="l" defTabSz="914400" rtl="0" eaLnBrk="1" latinLnBrk="0" hangingPunct="1">
+              <a:defRPr sz="1800" kern="1200">
+                <a:solidFill>
+                  <a:schemeClr val="lt1"/>
+                </a:solidFill>
+                <a:latin typeface="+mn-lt"/>
+                <a:ea typeface="+mn-ea"/>
+                <a:cs typeface="+mn-cs"/>
+              </a:defRPr>
+            </a:lvl2pPr>
+            <a:lvl3pPr marL="914400" algn="l" defTabSz="914400" rtl="0" eaLnBrk="1" latinLnBrk="0" hangingPunct="1">
+              <a:defRPr sz="1800" kern="1200">
+                <a:solidFill>
+                  <a:schemeClr val="lt1"/>
+                </a:solidFill>
+                <a:latin typeface="+mn-lt"/>
+                <a:ea typeface="+mn-ea"/>
+                <a:cs typeface="+mn-cs"/>
+              </a:defRPr>
+            </a:lvl3pPr>
+            <a:lvl4pPr marL="1371600" algn="l" defTabSz="914400" rtl="0" eaLnBrk="1" latinLnBrk="0" hangingPunct="1">
+              <a:defRPr sz="1800" kern="1200">
+                <a:solidFill>
+                  <a:schemeClr val="lt1"/>
+                </a:solidFill>
+                <a:latin typeface="+mn-lt"/>
+                <a:ea typeface="+mn-ea"/>
+                <a:cs typeface="+mn-cs"/>
+              </a:defRPr>
+            </a:lvl4pPr>
+            <a:lvl5pPr marL="1828800" algn="l" defTabSz="914400" rtl="0" eaLnBrk="1" latinLnBrk="0" hangingPunct="1">
+              <a:defRPr sz="1800" kern="1200">
+                <a:solidFill>
+                  <a:schemeClr val="lt1"/>
+                </a:solidFill>
+                <a:latin typeface="+mn-lt"/>
+                <a:ea typeface="+mn-ea"/>
+                <a:cs typeface="+mn-cs"/>
+              </a:defRPr>
+            </a:lvl5pPr>
+            <a:lvl6pPr marL="2286000" algn="l" defTabSz="914400" rtl="0" eaLnBrk="1" latinLnBrk="0" hangingPunct="1">
+              <a:defRPr sz="1800" kern="1200">
+                <a:solidFill>
+                  <a:schemeClr val="lt1"/>
+                </a:solidFill>
+                <a:latin typeface="+mn-lt"/>
+                <a:ea typeface="+mn-ea"/>
+                <a:cs typeface="+mn-cs"/>
+              </a:defRPr>
+            </a:lvl6pPr>
+            <a:lvl7pPr marL="2743200" algn="l" defTabSz="914400" rtl="0" eaLnBrk="1" latinLnBrk="0" hangingPunct="1">
+              <a:defRPr sz="1800" kern="1200">
+                <a:solidFill>
+                  <a:schemeClr val="lt1"/>
+                </a:solidFill>
+                <a:latin typeface="+mn-lt"/>
+                <a:ea typeface="+mn-ea"/>
+                <a:cs typeface="+mn-cs"/>
+              </a:defRPr>
+            </a:lvl7pPr>
+            <a:lvl8pPr marL="3200400" algn="l" defTabSz="914400" rtl="0" eaLnBrk="1" latinLnBrk="0" hangingPunct="1">
+              <a:defRPr sz="1800" kern="1200">
+                <a:solidFill>
+                  <a:schemeClr val="lt1"/>
+                </a:solidFill>
+                <a:latin typeface="+mn-lt"/>
+                <a:ea typeface="+mn-ea"/>
+                <a:cs typeface="+mn-cs"/>
+              </a:defRPr>
+            </a:lvl8pPr>
+            <a:lvl9pPr marL="3657600" algn="l" defTabSz="914400" rtl="0" eaLnBrk="1" latinLnBrk="0" hangingPunct="1">
+              <a:defRPr sz="1800" kern="1200">
+                <a:solidFill>
+                  <a:schemeClr val="lt1"/>
+                </a:solidFill>
+                <a:latin typeface="+mn-lt"/>
+                <a:ea typeface="+mn-ea"/>
+                <a:cs typeface="+mn-cs"/>
+              </a:defRPr>
+            </a:lvl9pPr>
+          </a:lstStyle>
+          <a:p>
+            <a:pPr algn="ctr"/>
+            <a:r>
+              <a:rPr lang="en-US" sz="1000">
+                <a:solidFill>
+                  <a:schemeClr val="tx1"/>
+                </a:solidFill>
+              </a:rPr>
+              <a:t>_:n1</a:t>
+            </a:r>
+          </a:p>
+        </p:txBody>
+      </p:sp>
+      <p:sp>
+        <p:nvSpPr>
+          <p:cNvPr id="89" name="TextBox 88">
+            <a:extLst>
+              <a:ext uri="{FF2B5EF4-FFF2-40B4-BE49-F238E27FC236}">
+                <a16:creationId xmlns:a16="http://schemas.microsoft.com/office/drawing/2014/main" id="{0FF80540-12C5-1513-380C-8E90ADE03BF0}"/>
+              </a:ext>
+            </a:extLst>
+          </p:cNvPr>
+          <p:cNvSpPr txBox="1"/>
+          <p:nvPr/>
+        </p:nvSpPr>
+        <p:spPr>
+          <a:xfrm>
+            <a:off x="7577704" y="4935379"/>
+            <a:ext cx="822661" cy="246221"/>
+          </a:xfrm>
+          <a:prstGeom prst="rect">
+            <a:avLst/>
+          </a:prstGeom>
+          <a:solidFill>
+            <a:schemeClr val="accent4">
+              <a:lumMod val="20000"/>
+              <a:lumOff val="80000"/>
+            </a:schemeClr>
+          </a:solidFill>
+        </p:spPr>
+        <p:txBody>
+          <a:bodyPr wrap="none" rtlCol="0">
+            <a:spAutoFit/>
+          </a:bodyPr>
+          <a:lstStyle/>
+          <a:p>
+            <a:r>
+              <a:rPr lang="en-US" sz="1000"/>
+              <a:t>“Clark Kent”</a:t>
+            </a:r>
+          </a:p>
+        </p:txBody>
+      </p:sp>
+      <p:cxnSp>
+        <p:nvCxnSpPr>
+          <p:cNvPr id="96" name="Straight Arrow Connector 95">
+            <a:extLst>
+              <a:ext uri="{FF2B5EF4-FFF2-40B4-BE49-F238E27FC236}">
+                <a16:creationId xmlns:a16="http://schemas.microsoft.com/office/drawing/2014/main" id="{F348D63A-0951-462F-B3AC-C2DAC8C50872}"/>
+              </a:ext>
+            </a:extLst>
+          </p:cNvPr>
+          <p:cNvCxnSpPr>
+            <a:cxnSpLocks/>
+            <a:stCxn id="81" idx="0"/>
+            <a:endCxn id="54" idx="2"/>
+          </p:cNvCxnSpPr>
+          <p:nvPr/>
+        </p:nvCxnSpPr>
+        <p:spPr>
+          <a:xfrm flipV="1">
+            <a:off x="3937517" y="4187460"/>
+            <a:ext cx="9625" cy="657608"/>
+          </a:xfrm>
+          <a:prstGeom prst="straightConnector1">
+            <a:avLst/>
+          </a:prstGeom>
+          <a:ln w="22225">
+            <a:solidFill>
+              <a:schemeClr val="accent1">
+                <a:lumMod val="75000"/>
+              </a:schemeClr>
+            </a:solidFill>
+            <a:tailEnd type="triangle"/>
+          </a:ln>
+        </p:spPr>
+        <p:style>
+          <a:lnRef idx="1">
+            <a:schemeClr val="accent1"/>
+          </a:lnRef>
+          <a:fillRef idx="0">
+            <a:schemeClr val="accent1"/>
+          </a:fillRef>
+          <a:effectRef idx="0">
+            <a:schemeClr val="accent1"/>
+          </a:effectRef>
+          <a:fontRef idx="minor">
+            <a:schemeClr val="tx1"/>
+          </a:fontRef>
+        </p:style>
+      </p:cxnSp>
+      <p:cxnSp>
+        <p:nvCxnSpPr>
+          <p:cNvPr id="98" name="Straight Arrow Connector 97">
+            <a:extLst>
+              <a:ext uri="{FF2B5EF4-FFF2-40B4-BE49-F238E27FC236}">
+                <a16:creationId xmlns:a16="http://schemas.microsoft.com/office/drawing/2014/main" id="{50C080F9-B549-66F0-9110-97278F140811}"/>
+              </a:ext>
+            </a:extLst>
+          </p:cNvPr>
+          <p:cNvCxnSpPr>
+            <a:cxnSpLocks/>
+          </p:cNvCxnSpPr>
+          <p:nvPr/>
+        </p:nvCxnSpPr>
+        <p:spPr>
+          <a:xfrm flipV="1">
+            <a:off x="5963688" y="4191000"/>
+            <a:ext cx="1" cy="654068"/>
+          </a:xfrm>
+          <a:prstGeom prst="straightConnector1">
+            <a:avLst/>
+          </a:prstGeom>
+          <a:ln w="22225">
+            <a:solidFill>
+              <a:schemeClr val="accent1">
+                <a:lumMod val="75000"/>
+              </a:schemeClr>
+            </a:solidFill>
+            <a:tailEnd type="triangle"/>
+          </a:ln>
+        </p:spPr>
+        <p:style>
+          <a:lnRef idx="1">
+            <a:schemeClr val="accent1"/>
+          </a:lnRef>
+          <a:fillRef idx="0">
+            <a:schemeClr val="accent1"/>
+          </a:fillRef>
+          <a:effectRef idx="0">
+            <a:schemeClr val="accent1"/>
+          </a:effectRef>
+          <a:fontRef idx="minor">
+            <a:schemeClr val="tx1"/>
+          </a:fontRef>
+        </p:style>
+      </p:cxnSp>
+      <p:cxnSp>
+        <p:nvCxnSpPr>
+          <p:cNvPr id="102" name="Straight Arrow Connector 101">
+            <a:extLst>
+              <a:ext uri="{FF2B5EF4-FFF2-40B4-BE49-F238E27FC236}">
+                <a16:creationId xmlns:a16="http://schemas.microsoft.com/office/drawing/2014/main" id="{BB8DD5E4-FF30-6F29-B7C3-A1E22EBA41BB}"/>
+              </a:ext>
+            </a:extLst>
+          </p:cNvPr>
+          <p:cNvCxnSpPr>
+            <a:cxnSpLocks/>
+          </p:cNvCxnSpPr>
+          <p:nvPr/>
+        </p:nvCxnSpPr>
+        <p:spPr>
+          <a:xfrm>
+            <a:off x="4245245" y="5073668"/>
+            <a:ext cx="1410715" cy="0"/>
+          </a:xfrm>
+          <a:prstGeom prst="straightConnector1">
+            <a:avLst/>
+          </a:prstGeom>
+          <a:ln w="12700">
+            <a:solidFill>
+              <a:schemeClr val="tx1"/>
+            </a:solidFill>
+            <a:tailEnd type="triangle"/>
+          </a:ln>
+        </p:spPr>
+        <p:style>
+          <a:lnRef idx="1">
+            <a:schemeClr val="accent1"/>
+          </a:lnRef>
+          <a:fillRef idx="0">
+            <a:schemeClr val="accent1"/>
+          </a:fillRef>
+          <a:effectRef idx="0">
+            <a:schemeClr val="accent1"/>
+          </a:effectRef>
+          <a:fontRef idx="minor">
+            <a:schemeClr val="tx1"/>
+          </a:fontRef>
+        </p:style>
+      </p:cxnSp>
+      <p:sp>
+        <p:nvSpPr>
+          <p:cNvPr id="105" name="TextBox 104">
+            <a:extLst>
+              <a:ext uri="{FF2B5EF4-FFF2-40B4-BE49-F238E27FC236}">
+                <a16:creationId xmlns:a16="http://schemas.microsoft.com/office/drawing/2014/main" id="{2369BA33-B9A9-42B0-0B4B-6F6FDD3D8D62}"/>
+              </a:ext>
+            </a:extLst>
+          </p:cNvPr>
+          <p:cNvSpPr txBox="1"/>
+          <p:nvPr/>
+        </p:nvSpPr>
+        <p:spPr>
+          <a:xfrm>
+            <a:off x="5924577" y="4394924"/>
+            <a:ext cx="593432" cy="246221"/>
+          </a:xfrm>
+          <a:prstGeom prst="rect">
+            <a:avLst/>
+          </a:prstGeom>
+          <a:noFill/>
+        </p:spPr>
+        <p:txBody>
+          <a:bodyPr wrap="none" rtlCol="0">
+            <a:spAutoFit/>
+          </a:bodyPr>
+          <a:lstStyle/>
+          <a:p>
+            <a:r>
+              <a:rPr lang="en-US" sz="1000" i="1" err="1"/>
+              <a:t>rdf:type</a:t>
+            </a:r>
+            <a:endParaRPr lang="en-US" sz="1000" i="1"/>
+          </a:p>
+        </p:txBody>
+      </p:sp>
+      <p:sp>
+        <p:nvSpPr>
+          <p:cNvPr id="107" name="TextBox 106">
+            <a:extLst>
+              <a:ext uri="{FF2B5EF4-FFF2-40B4-BE49-F238E27FC236}">
+                <a16:creationId xmlns:a16="http://schemas.microsoft.com/office/drawing/2014/main" id="{860475A3-1120-D842-A9E4-10531F2C2949}"/>
+              </a:ext>
+            </a:extLst>
+          </p:cNvPr>
+          <p:cNvSpPr txBox="1"/>
+          <p:nvPr/>
+        </p:nvSpPr>
+        <p:spPr>
+          <a:xfrm>
+            <a:off x="3937517" y="4394924"/>
+            <a:ext cx="593432" cy="246221"/>
+          </a:xfrm>
+          <a:prstGeom prst="rect">
+            <a:avLst/>
+          </a:prstGeom>
+          <a:noFill/>
+        </p:spPr>
+        <p:txBody>
+          <a:bodyPr wrap="none" rtlCol="0">
+            <a:spAutoFit/>
+          </a:bodyPr>
+          <a:lstStyle/>
+          <a:p>
+            <a:r>
+              <a:rPr lang="en-US" sz="1000" i="1" err="1"/>
+              <a:t>rdf:type</a:t>
+            </a:r>
+            <a:endParaRPr lang="en-US" sz="1000" i="1"/>
+          </a:p>
+        </p:txBody>
+      </p:sp>
+      <p:cxnSp>
+        <p:nvCxnSpPr>
+          <p:cNvPr id="26" name="Straight Arrow Connector 25">
+            <a:extLst>
+              <a:ext uri="{FF2B5EF4-FFF2-40B4-BE49-F238E27FC236}">
+                <a16:creationId xmlns:a16="http://schemas.microsoft.com/office/drawing/2014/main" id="{989F2BCB-CBEB-5C18-2184-9ACF21846B31}"/>
+              </a:ext>
+            </a:extLst>
+          </p:cNvPr>
+          <p:cNvCxnSpPr>
+            <a:cxnSpLocks/>
+          </p:cNvCxnSpPr>
+          <p:nvPr/>
+        </p:nvCxnSpPr>
+        <p:spPr>
+          <a:xfrm flipV="1">
+            <a:off x="6265904" y="5058490"/>
+            <a:ext cx="1306288" cy="9380"/>
+          </a:xfrm>
+          <a:prstGeom prst="straightConnector1">
+            <a:avLst/>
+          </a:prstGeom>
+          <a:ln w="12700">
+            <a:solidFill>
+              <a:schemeClr val="tx1"/>
+            </a:solidFill>
+            <a:tailEnd type="triangle"/>
+          </a:ln>
+        </p:spPr>
+        <p:style>
+          <a:lnRef idx="1">
+            <a:schemeClr val="accent1"/>
+          </a:lnRef>
+          <a:fillRef idx="0">
+            <a:schemeClr val="accent1"/>
+          </a:fillRef>
+          <a:effectRef idx="0">
+            <a:schemeClr val="accent1"/>
+          </a:effectRef>
+          <a:fontRef idx="minor">
+            <a:schemeClr val="tx1"/>
+          </a:fontRef>
+        </p:style>
+      </p:cxnSp>
+      <p:sp>
+        <p:nvSpPr>
+          <p:cNvPr id="8" name="TextBox 7">
+            <a:extLst>
+              <a:ext uri="{FF2B5EF4-FFF2-40B4-BE49-F238E27FC236}">
+                <a16:creationId xmlns:a16="http://schemas.microsoft.com/office/drawing/2014/main" id="{87937B6A-D5E2-A0FF-6C50-796A96993AD7}"/>
+              </a:ext>
+            </a:extLst>
+          </p:cNvPr>
+          <p:cNvSpPr txBox="1"/>
+          <p:nvPr/>
+        </p:nvSpPr>
+        <p:spPr>
+          <a:xfrm>
+            <a:off x="2579663" y="4800600"/>
+            <a:ext cx="688009" cy="246221"/>
+          </a:xfrm>
+          <a:prstGeom prst="rect">
+            <a:avLst/>
+          </a:prstGeom>
+          <a:noFill/>
+        </p:spPr>
+        <p:txBody>
+          <a:bodyPr wrap="none" rtlCol="0">
+            <a:spAutoFit/>
+          </a:bodyPr>
+          <a:lstStyle/>
+          <a:p>
+            <a:r>
+              <a:rPr lang="en-US" sz="1000" i="1" err="1"/>
+              <a:t>nc:</a:t>
+            </a:r>
+            <a:r>
+              <a:rPr lang="en-US" sz="1000" i="1"/>
+              <a:t>Person</a:t>
+            </a:r>
+          </a:p>
+        </p:txBody>
+      </p:sp>
+      <p:sp>
+        <p:nvSpPr>
+          <p:cNvPr id="9" name="Rectangle: Rounded Corners 8">
+            <a:extLst>
+              <a:ext uri="{FF2B5EF4-FFF2-40B4-BE49-F238E27FC236}">
+                <a16:creationId xmlns:a16="http://schemas.microsoft.com/office/drawing/2014/main" id="{04B64032-04DC-CC00-F27A-DE96AD4E53C4}"/>
+              </a:ext>
+            </a:extLst>
+          </p:cNvPr>
+          <p:cNvSpPr/>
+          <p:nvPr/>
+        </p:nvSpPr>
+        <p:spPr>
+          <a:xfrm>
+            <a:off x="1602854" y="4845068"/>
+            <a:ext cx="615456" cy="457200"/>
+          </a:xfrm>
+          <a:prstGeom prst="roundRect">
+            <a:avLst/>
+          </a:prstGeom>
+          <a:solidFill>
+            <a:schemeClr val="accent4">
+              <a:lumMod val="20000"/>
+              <a:lumOff val="80000"/>
+            </a:schemeClr>
+          </a:solidFill>
+          <a:ln>
+            <a:solidFill>
+              <a:schemeClr val="tx1"/>
+            </a:solidFill>
+          </a:ln>
+        </p:spPr>
+        <p:style>
+          <a:lnRef idx="2">
+            <a:schemeClr val="accent1">
+              <a:shade val="50000"/>
+            </a:schemeClr>
+          </a:lnRef>
+          <a:fillRef idx="1">
+            <a:schemeClr val="accent1"/>
+          </a:fillRef>
+          <a:effectRef idx="0">
+            <a:schemeClr val="accent1"/>
+          </a:effectRef>
+          <a:fontRef idx="minor">
+            <a:schemeClr val="lt1"/>
+          </a:fontRef>
+        </p:style>
+        <p:txBody>
+          <a:bodyPr rtlCol="0" anchor="ctr"/>
+          <a:lstStyle>
+            <a:defPPr>
+              <a:defRPr lang="en-US"/>
+            </a:defPPr>
+            <a:lvl1pPr marL="0" algn="l" defTabSz="914400" rtl="0" eaLnBrk="1" latinLnBrk="0" hangingPunct="1">
+              <a:defRPr sz="1800" kern="1200">
+                <a:solidFill>
+                  <a:schemeClr val="lt1"/>
+                </a:solidFill>
+                <a:latin typeface="+mn-lt"/>
+                <a:ea typeface="+mn-ea"/>
+                <a:cs typeface="+mn-cs"/>
+              </a:defRPr>
+            </a:lvl1pPr>
+            <a:lvl2pPr marL="457200" algn="l" defTabSz="914400" rtl="0" eaLnBrk="1" latinLnBrk="0" hangingPunct="1">
+              <a:defRPr sz="1800" kern="1200">
+                <a:solidFill>
+                  <a:schemeClr val="lt1"/>
+                </a:solidFill>
+                <a:latin typeface="+mn-lt"/>
+                <a:ea typeface="+mn-ea"/>
+                <a:cs typeface="+mn-cs"/>
+              </a:defRPr>
+            </a:lvl2pPr>
+            <a:lvl3pPr marL="914400" algn="l" defTabSz="914400" rtl="0" eaLnBrk="1" latinLnBrk="0" hangingPunct="1">
+              <a:defRPr sz="1800" kern="1200">
+                <a:solidFill>
+                  <a:schemeClr val="lt1"/>
+                </a:solidFill>
+                <a:latin typeface="+mn-lt"/>
+                <a:ea typeface="+mn-ea"/>
+                <a:cs typeface="+mn-cs"/>
+              </a:defRPr>
+            </a:lvl3pPr>
+            <a:lvl4pPr marL="1371600" algn="l" defTabSz="914400" rtl="0" eaLnBrk="1" latinLnBrk="0" hangingPunct="1">
+              <a:defRPr sz="1800" kern="1200">
+                <a:solidFill>
+                  <a:schemeClr val="lt1"/>
+                </a:solidFill>
+                <a:latin typeface="+mn-lt"/>
+                <a:ea typeface="+mn-ea"/>
+                <a:cs typeface="+mn-cs"/>
+              </a:defRPr>
+            </a:lvl4pPr>
+            <a:lvl5pPr marL="1828800" algn="l" defTabSz="914400" rtl="0" eaLnBrk="1" latinLnBrk="0" hangingPunct="1">
+              <a:defRPr sz="1800" kern="1200">
+                <a:solidFill>
+                  <a:schemeClr val="lt1"/>
+                </a:solidFill>
+                <a:latin typeface="+mn-lt"/>
+                <a:ea typeface="+mn-ea"/>
+                <a:cs typeface="+mn-cs"/>
+              </a:defRPr>
+            </a:lvl5pPr>
+            <a:lvl6pPr marL="2286000" algn="l" defTabSz="914400" rtl="0" eaLnBrk="1" latinLnBrk="0" hangingPunct="1">
+              <a:defRPr sz="1800" kern="1200">
+                <a:solidFill>
+                  <a:schemeClr val="lt1"/>
+                </a:solidFill>
+                <a:latin typeface="+mn-lt"/>
+                <a:ea typeface="+mn-ea"/>
+                <a:cs typeface="+mn-cs"/>
+              </a:defRPr>
+            </a:lvl6pPr>
+            <a:lvl7pPr marL="2743200" algn="l" defTabSz="914400" rtl="0" eaLnBrk="1" latinLnBrk="0" hangingPunct="1">
+              <a:defRPr sz="1800" kern="1200">
+                <a:solidFill>
+                  <a:schemeClr val="lt1"/>
+                </a:solidFill>
+                <a:latin typeface="+mn-lt"/>
+                <a:ea typeface="+mn-ea"/>
+                <a:cs typeface="+mn-cs"/>
+              </a:defRPr>
+            </a:lvl7pPr>
+            <a:lvl8pPr marL="3200400" algn="l" defTabSz="914400" rtl="0" eaLnBrk="1" latinLnBrk="0" hangingPunct="1">
+              <a:defRPr sz="1800" kern="1200">
+                <a:solidFill>
+                  <a:schemeClr val="lt1"/>
+                </a:solidFill>
+                <a:latin typeface="+mn-lt"/>
+                <a:ea typeface="+mn-ea"/>
+                <a:cs typeface="+mn-cs"/>
+              </a:defRPr>
+            </a:lvl8pPr>
+            <a:lvl9pPr marL="3657600" algn="l" defTabSz="914400" rtl="0" eaLnBrk="1" latinLnBrk="0" hangingPunct="1">
+              <a:defRPr sz="1800" kern="1200">
+                <a:solidFill>
+                  <a:schemeClr val="lt1"/>
+                </a:solidFill>
+                <a:latin typeface="+mn-lt"/>
+                <a:ea typeface="+mn-ea"/>
+                <a:cs typeface="+mn-cs"/>
+              </a:defRPr>
+            </a:lvl9pPr>
+          </a:lstStyle>
+          <a:p>
+            <a:pPr algn="ctr"/>
+            <a:r>
+              <a:rPr lang="en-US" sz="1000">
+                <a:solidFill>
+                  <a:schemeClr val="tx1"/>
+                </a:solidFill>
+              </a:rPr>
+              <a:t>_:n0</a:t>
+            </a:r>
+          </a:p>
+        </p:txBody>
+      </p:sp>
+      <p:cxnSp>
+        <p:nvCxnSpPr>
+          <p:cNvPr id="10" name="Straight Arrow Connector 9">
+            <a:extLst>
+              <a:ext uri="{FF2B5EF4-FFF2-40B4-BE49-F238E27FC236}">
+                <a16:creationId xmlns:a16="http://schemas.microsoft.com/office/drawing/2014/main" id="{A6652DB6-2DC7-D1CE-4CE7-A43B119AE7E9}"/>
+              </a:ext>
+            </a:extLst>
+          </p:cNvPr>
+          <p:cNvCxnSpPr>
+            <a:cxnSpLocks/>
+          </p:cNvCxnSpPr>
+          <p:nvPr/>
+        </p:nvCxnSpPr>
+        <p:spPr>
+          <a:xfrm>
+            <a:off x="2218310" y="5073668"/>
+            <a:ext cx="1410715" cy="0"/>
+          </a:xfrm>
+          <a:prstGeom prst="straightConnector1">
+            <a:avLst/>
+          </a:prstGeom>
+          <a:ln w="12700">
+            <a:solidFill>
+              <a:schemeClr val="tx1"/>
+            </a:solidFill>
+            <a:tailEnd type="triangle"/>
+          </a:ln>
+        </p:spPr>
+        <p:style>
+          <a:lnRef idx="1">
+            <a:schemeClr val="accent1"/>
+          </a:lnRef>
+          <a:fillRef idx="0">
+            <a:schemeClr val="accent1"/>
+          </a:fillRef>
+          <a:effectRef idx="0">
+            <a:schemeClr val="accent1"/>
+          </a:effectRef>
+          <a:fontRef idx="minor">
+            <a:schemeClr val="tx1"/>
+          </a:fontRef>
+        </p:style>
+      </p:cxnSp>
+      <p:sp>
+        <p:nvSpPr>
+          <p:cNvPr id="11" name="Rectangle 10">
+            <a:extLst>
+              <a:ext uri="{FF2B5EF4-FFF2-40B4-BE49-F238E27FC236}">
+                <a16:creationId xmlns:a16="http://schemas.microsoft.com/office/drawing/2014/main" id="{C7C85375-E208-78FF-88ED-57C8D6B253F7}"/>
+              </a:ext>
+            </a:extLst>
+          </p:cNvPr>
+          <p:cNvSpPr/>
+          <p:nvPr/>
+        </p:nvSpPr>
+        <p:spPr>
+          <a:xfrm>
+            <a:off x="196655" y="209706"/>
+            <a:ext cx="1555945" cy="484094"/>
+          </a:xfrm>
+          <a:prstGeom prst="rect">
+            <a:avLst/>
+          </a:prstGeom>
+          <a:solidFill>
+            <a:srgbClr val="FFFF00"/>
+          </a:solidFill>
+          <a:ln>
+            <a:solidFill>
+              <a:schemeClr val="tx1"/>
+            </a:solidFill>
+          </a:ln>
+        </p:spPr>
+        <p:style>
+          <a:lnRef idx="2">
+            <a:schemeClr val="accent1">
+              <a:shade val="15000"/>
+            </a:schemeClr>
+          </a:lnRef>
+          <a:fillRef idx="1">
+            <a:schemeClr val="accent1"/>
+          </a:fillRef>
+          <a:effectRef idx="0">
+            <a:schemeClr val="accent1"/>
+          </a:effectRef>
+          <a:fontRef idx="minor">
+            <a:schemeClr val="lt1"/>
+          </a:fontRef>
+        </p:style>
+        <p:txBody>
+          <a:bodyPr rtlCol="0" anchor="ctr"/>
+          <a:lstStyle/>
+          <a:p>
+            <a:pPr algn="ctr"/>
+            <a:r>
+              <a:rPr lang="en-US">
+                <a:solidFill>
+                  <a:schemeClr val="tx1"/>
+                </a:solidFill>
+              </a:rPr>
+              <a:t>xml-meaning</a:t>
+            </a:r>
+          </a:p>
+        </p:txBody>
+      </p:sp>
+    </p:spTree>
+    <p:extLst>
+      <p:ext uri="{BB962C8B-B14F-4D97-AF65-F5344CB8AC3E}">
+        <p14:creationId xmlns:p14="http://schemas.microsoft.com/office/powerpoint/2010/main" val="1809712793"/>
+      </p:ext>
+    </p:extLst>
+  </p:cSld>
+  <p:clrMapOvr>
+    <a:masterClrMapping/>
+  </p:clrMapOvr>
+</p:sld>
+</file>
+
 <file path=ppt/theme/theme1.xml><?xml version="1.0" encoding="utf-8"?>
 <a:theme xmlns:a="http://schemas.openxmlformats.org/drawingml/2006/main" name="Office Theme">
   <a:themeElements>

</xml_diff>

<commit_message>
Revised figure 3-3 Revised conformance targets
</commit_message>
<xml_diff>
--- a/pptx/figures.pptx
+++ b/pptx/figures.pptx
@@ -276,7 +276,7 @@
           <a:p>
             <a:fld id="{8B6844D7-9723-4963-9A7A-AA67393D1570}" type="datetimeFigureOut">
               <a:rPr lang="en-US" smtClean="0"/>
-              <a:t>7/22/2024</a:t>
+              <a:t>9/4/2024</a:t>
             </a:fld>
             <a:endParaRPr lang="en-US"/>
           </a:p>
@@ -474,7 +474,7 @@
           <a:p>
             <a:fld id="{8B6844D7-9723-4963-9A7A-AA67393D1570}" type="datetimeFigureOut">
               <a:rPr lang="en-US" smtClean="0"/>
-              <a:t>7/22/2024</a:t>
+              <a:t>9/4/2024</a:t>
             </a:fld>
             <a:endParaRPr lang="en-US"/>
           </a:p>
@@ -682,7 +682,7 @@
           <a:p>
             <a:fld id="{8B6844D7-9723-4963-9A7A-AA67393D1570}" type="datetimeFigureOut">
               <a:rPr lang="en-US" smtClean="0"/>
-              <a:t>7/22/2024</a:t>
+              <a:t>9/4/2024</a:t>
             </a:fld>
             <a:endParaRPr lang="en-US"/>
           </a:p>
@@ -880,7 +880,7 @@
           <a:p>
             <a:fld id="{8B6844D7-9723-4963-9A7A-AA67393D1570}" type="datetimeFigureOut">
               <a:rPr lang="en-US" smtClean="0"/>
-              <a:t>7/22/2024</a:t>
+              <a:t>9/4/2024</a:t>
             </a:fld>
             <a:endParaRPr lang="en-US"/>
           </a:p>
@@ -1155,7 +1155,7 @@
           <a:p>
             <a:fld id="{8B6844D7-9723-4963-9A7A-AA67393D1570}" type="datetimeFigureOut">
               <a:rPr lang="en-US" smtClean="0"/>
-              <a:t>7/22/2024</a:t>
+              <a:t>9/4/2024</a:t>
             </a:fld>
             <a:endParaRPr lang="en-US"/>
           </a:p>
@@ -1420,7 +1420,7 @@
           <a:p>
             <a:fld id="{8B6844D7-9723-4963-9A7A-AA67393D1570}" type="datetimeFigureOut">
               <a:rPr lang="en-US" smtClean="0"/>
-              <a:t>7/22/2024</a:t>
+              <a:t>9/4/2024</a:t>
             </a:fld>
             <a:endParaRPr lang="en-US"/>
           </a:p>
@@ -1832,7 +1832,7 @@
           <a:p>
             <a:fld id="{8B6844D7-9723-4963-9A7A-AA67393D1570}" type="datetimeFigureOut">
               <a:rPr lang="en-US" smtClean="0"/>
-              <a:t>7/22/2024</a:t>
+              <a:t>9/4/2024</a:t>
             </a:fld>
             <a:endParaRPr lang="en-US"/>
           </a:p>
@@ -1973,7 +1973,7 @@
           <a:p>
             <a:fld id="{8B6844D7-9723-4963-9A7A-AA67393D1570}" type="datetimeFigureOut">
               <a:rPr lang="en-US" smtClean="0"/>
-              <a:t>7/22/2024</a:t>
+              <a:t>9/4/2024</a:t>
             </a:fld>
             <a:endParaRPr lang="en-US"/>
           </a:p>
@@ -2086,7 +2086,7 @@
           <a:p>
             <a:fld id="{8B6844D7-9723-4963-9A7A-AA67393D1570}" type="datetimeFigureOut">
               <a:rPr lang="en-US" smtClean="0"/>
-              <a:t>7/22/2024</a:t>
+              <a:t>9/4/2024</a:t>
             </a:fld>
             <a:endParaRPr lang="en-US"/>
           </a:p>
@@ -2397,7 +2397,7 @@
           <a:p>
             <a:fld id="{8B6844D7-9723-4963-9A7A-AA67393D1570}" type="datetimeFigureOut">
               <a:rPr lang="en-US" smtClean="0"/>
-              <a:t>7/22/2024</a:t>
+              <a:t>9/4/2024</a:t>
             </a:fld>
             <a:endParaRPr lang="en-US"/>
           </a:p>
@@ -2685,7 +2685,7 @@
           <a:p>
             <a:fld id="{8B6844D7-9723-4963-9A7A-AA67393D1570}" type="datetimeFigureOut">
               <a:rPr lang="en-US" smtClean="0"/>
-              <a:t>7/22/2024</a:t>
+              <a:t>9/4/2024</a:t>
             </a:fld>
             <a:endParaRPr lang="en-US"/>
           </a:p>
@@ -2926,7 +2926,7 @@
           <a:p>
             <a:fld id="{8B6844D7-9723-4963-9A7A-AA67393D1570}" type="datetimeFigureOut">
               <a:rPr lang="en-US" smtClean="0"/>
-              <a:t>7/22/2024</a:t>
+              <a:t>9/4/2024</a:t>
             </a:fld>
             <a:endParaRPr lang="en-US"/>
           </a:p>
@@ -28626,7 +28626,7 @@
         </p:nvSpPr>
         <p:spPr>
           <a:xfrm>
-            <a:off x="4800600" y="1698173"/>
+            <a:off x="5011495" y="1698173"/>
             <a:ext cx="1307011" cy="405676"/>
           </a:xfrm>
           <a:prstGeom prst="roundRect">
@@ -28842,7 +28842,7 @@
         </p:nvSpPr>
         <p:spPr>
           <a:xfrm>
-            <a:off x="4800599" y="2345249"/>
+            <a:off x="5011494" y="2345249"/>
             <a:ext cx="1307011" cy="405676"/>
           </a:xfrm>
           <a:prstGeom prst="roundRect">
@@ -28997,7 +28997,7 @@
         </p:nvSpPr>
         <p:spPr>
           <a:xfrm>
-            <a:off x="4800600" y="2983389"/>
+            <a:off x="5011495" y="2983389"/>
             <a:ext cx="1307011" cy="405676"/>
           </a:xfrm>
           <a:prstGeom prst="roundRect">
@@ -29152,7 +29152,7 @@
         </p:nvSpPr>
         <p:spPr>
           <a:xfrm>
-            <a:off x="4817088" y="3601906"/>
+            <a:off x="5027983" y="3601906"/>
             <a:ext cx="1307011" cy="405676"/>
           </a:xfrm>
           <a:prstGeom prst="roundRect">
@@ -29307,7 +29307,7 @@
         </p:nvSpPr>
         <p:spPr>
           <a:xfrm>
-            <a:off x="4839863" y="4269846"/>
+            <a:off x="5050758" y="4276316"/>
             <a:ext cx="1284236" cy="405676"/>
           </a:xfrm>
           <a:prstGeom prst="roundRect">
@@ -29462,7 +29462,7 @@
         </p:nvSpPr>
         <p:spPr>
           <a:xfrm>
-            <a:off x="5914692" y="1965389"/>
+            <a:off x="6125587" y="1965389"/>
             <a:ext cx="389036" cy="502960"/>
           </a:xfrm>
           <a:prstGeom prst="arc">
@@ -29515,7 +29515,7 @@
         </p:nvSpPr>
         <p:spPr>
           <a:xfrm>
-            <a:off x="6107611" y="2133628"/>
+            <a:off x="6318506" y="2133628"/>
             <a:ext cx="285335" cy="153888"/>
           </a:xfrm>
           <a:prstGeom prst="rect">
@@ -29552,8 +29552,8 @@
         </p:nvSpPr>
         <p:spPr>
           <a:xfrm>
-            <a:off x="4959418" y="1154961"/>
-            <a:ext cx="989373" cy="276999"/>
+            <a:off x="5169699" y="1091848"/>
+            <a:ext cx="990600" cy="461665"/>
           </a:xfrm>
           <a:prstGeom prst="rect">
             <a:avLst/>
@@ -29561,18 +29561,19 @@
           <a:noFill/>
         </p:spPr>
         <p:txBody>
-          <a:bodyPr wrap="none" rtlCol="0">
+          <a:bodyPr wrap="square" rtlCol="0">
             <a:spAutoFit/>
           </a:bodyPr>
           <a:lstStyle/>
           <a:p>
+            <a:pPr algn="ctr"/>
             <a:r>
               <a:rPr lang="en-US" sz="1200" b="1">
                 <a:solidFill>
                   <a:srgbClr val="1C0054"/>
                 </a:solidFill>
               </a:rPr>
-              <a:t>NIEM Model</a:t>
+              <a:t>NIEM data model </a:t>
             </a:r>
           </a:p>
         </p:txBody>
@@ -29588,13 +29589,15 @@
           </p:cNvPr>
           <p:cNvCxnSpPr>
             <a:cxnSpLocks/>
+            <a:stCxn id="81" idx="3"/>
+            <a:endCxn id="54" idx="1"/>
           </p:cNvCxnSpPr>
           <p:nvPr/>
         </p:nvCxnSpPr>
         <p:spPr>
-          <a:xfrm flipV="1">
-            <a:off x="3806500" y="1918446"/>
-            <a:ext cx="979215" cy="805"/>
+          <a:xfrm>
+            <a:off x="3806500" y="1900475"/>
+            <a:ext cx="1204995" cy="536"/>
           </a:xfrm>
           <a:prstGeom prst="straightConnector1">
             <a:avLst/>
@@ -29635,7 +29638,7 @@
         </p:nvSpPr>
         <p:spPr>
           <a:xfrm>
-            <a:off x="3191044" y="1716681"/>
+            <a:off x="3191044" y="1698173"/>
             <a:ext cx="615456" cy="404603"/>
           </a:xfrm>
           <a:prstGeom prst="roundRect">
@@ -30116,13 +30119,15 @@
           </p:cNvPr>
           <p:cNvCxnSpPr>
             <a:cxnSpLocks/>
+            <a:stCxn id="47" idx="3"/>
+            <a:endCxn id="16" idx="1"/>
           </p:cNvCxnSpPr>
           <p:nvPr/>
         </p:nvCxnSpPr>
         <p:spPr>
-          <a:xfrm>
-            <a:off x="3795115" y="3191805"/>
-            <a:ext cx="990600" cy="7084"/>
+          <a:xfrm flipV="1">
+            <a:off x="3806500" y="3186227"/>
+            <a:ext cx="1204995" cy="1"/>
           </a:xfrm>
           <a:prstGeom prst="straightConnector1">
             <a:avLst/>
@@ -30163,7 +30168,7 @@
         </p:nvSpPr>
         <p:spPr>
           <a:xfrm>
-            <a:off x="3084735" y="4292568"/>
+            <a:off x="3084735" y="4284600"/>
             <a:ext cx="889821" cy="389109"/>
           </a:xfrm>
           <a:prstGeom prst="rect">
@@ -30237,9 +30242,9 @@
           <p:nvPr/>
         </p:nvCxnSpPr>
         <p:spPr>
-          <a:xfrm>
-            <a:off x="3981125" y="4485624"/>
-            <a:ext cx="843853" cy="4495"/>
+          <a:xfrm flipV="1">
+            <a:off x="3974556" y="4490119"/>
+            <a:ext cx="1076202" cy="1"/>
           </a:xfrm>
           <a:prstGeom prst="straightConnector1">
             <a:avLst/>
@@ -30280,8 +30285,8 @@
         </p:nvSpPr>
         <p:spPr>
           <a:xfrm>
-            <a:off x="2642338" y="1154961"/>
-            <a:ext cx="1676400" cy="461665"/>
+            <a:off x="2677637" y="1091848"/>
+            <a:ext cx="1704016" cy="461665"/>
           </a:xfrm>
           <a:prstGeom prst="rect">
             <a:avLst/>
@@ -30348,7 +30353,7 @@
         </p:nvSpPr>
         <p:spPr>
           <a:xfrm>
-            <a:off x="4346018" y="1842038"/>
+            <a:off x="4346018" y="1824067"/>
             <a:ext cx="275075" cy="153888"/>
           </a:xfrm>
           <a:prstGeom prst="rect">
@@ -30459,7 +30464,7 @@
         </p:nvSpPr>
         <p:spPr>
           <a:xfrm>
-            <a:off x="5914692" y="2613381"/>
+            <a:off x="6125587" y="2613381"/>
             <a:ext cx="389036" cy="502960"/>
           </a:xfrm>
           <a:prstGeom prst="arc">
@@ -30512,7 +30517,7 @@
         </p:nvSpPr>
         <p:spPr>
           <a:xfrm>
-            <a:off x="6194587" y="2770159"/>
+            <a:off x="6405482" y="2770159"/>
             <a:ext cx="182742" cy="153888"/>
           </a:xfrm>
           <a:prstGeom prst="rect">
@@ -30549,7 +30554,7 @@
         </p:nvSpPr>
         <p:spPr>
           <a:xfrm>
-            <a:off x="5914692" y="3273119"/>
+            <a:off x="6125587" y="3273119"/>
             <a:ext cx="389036" cy="502960"/>
           </a:xfrm>
           <a:prstGeom prst="arc">
@@ -30602,7 +30607,7 @@
         </p:nvSpPr>
         <p:spPr>
           <a:xfrm>
-            <a:off x="6143290" y="3407688"/>
+            <a:off x="6354185" y="3407688"/>
             <a:ext cx="285335" cy="153888"/>
           </a:xfrm>
           <a:prstGeom prst="rect">
@@ -30639,7 +30644,7 @@
         </p:nvSpPr>
         <p:spPr>
           <a:xfrm>
-            <a:off x="5914692" y="3928089"/>
+            <a:off x="6125587" y="3928089"/>
             <a:ext cx="389036" cy="502960"/>
           </a:xfrm>
           <a:prstGeom prst="arc">
@@ -30692,7 +30697,7 @@
         </p:nvSpPr>
         <p:spPr>
           <a:xfrm>
-            <a:off x="6201825" y="4075345"/>
+            <a:off x="6412720" y="4075345"/>
             <a:ext cx="182742" cy="153888"/>
           </a:xfrm>
           <a:prstGeom prst="rect">
@@ -30726,13 +30731,14 @@
           </p:cNvPr>
           <p:cNvCxnSpPr>
             <a:cxnSpLocks/>
+            <a:endCxn id="18" idx="1"/>
           </p:cNvCxnSpPr>
           <p:nvPr/>
         </p:nvCxnSpPr>
         <p:spPr>
           <a:xfrm flipV="1">
-            <a:off x="6101810" y="1900609"/>
-            <a:ext cx="979215" cy="805"/>
+            <a:off x="6312705" y="1899885"/>
+            <a:ext cx="1217102" cy="1529"/>
           </a:xfrm>
           <a:prstGeom prst="straightConnector1">
             <a:avLst/>
@@ -30773,7 +30779,7 @@
         </p:nvSpPr>
         <p:spPr>
           <a:xfrm>
-            <a:off x="6641328" y="1824067"/>
+            <a:off x="6852223" y="1824067"/>
             <a:ext cx="275075" cy="153888"/>
           </a:xfrm>
           <a:prstGeom prst="rect">
@@ -30810,7 +30816,7 @@
         </p:nvSpPr>
         <p:spPr>
           <a:xfrm>
-            <a:off x="7075225" y="1697047"/>
+            <a:off x="7529807" y="1697047"/>
             <a:ext cx="770468" cy="405676"/>
           </a:xfrm>
           <a:prstGeom prst="roundRect">
@@ -30968,7 +30974,7 @@
         </p:nvSpPr>
         <p:spPr>
           <a:xfrm>
-            <a:off x="7075225" y="2345249"/>
+            <a:off x="7529807" y="2345249"/>
             <a:ext cx="770468" cy="405676"/>
           </a:xfrm>
           <a:prstGeom prst="roundRect">
@@ -31126,7 +31132,7 @@
         </p:nvSpPr>
         <p:spPr>
           <a:xfrm>
-            <a:off x="7075225" y="2983389"/>
+            <a:off x="7529807" y="2983389"/>
             <a:ext cx="770468" cy="405676"/>
           </a:xfrm>
           <a:prstGeom prst="roundRect">
@@ -31284,7 +31290,7 @@
         </p:nvSpPr>
         <p:spPr>
           <a:xfrm>
-            <a:off x="7075225" y="3601906"/>
+            <a:off x="7529807" y="3601906"/>
             <a:ext cx="770468" cy="405676"/>
           </a:xfrm>
           <a:prstGeom prst="roundRect">
@@ -31442,7 +31448,7 @@
         </p:nvSpPr>
         <p:spPr>
           <a:xfrm>
-            <a:off x="7075225" y="4282786"/>
+            <a:off x="7529807" y="4276316"/>
             <a:ext cx="770468" cy="405676"/>
           </a:xfrm>
           <a:prstGeom prst="roundRect">
@@ -31597,13 +31603,14 @@
           </p:cNvPr>
           <p:cNvCxnSpPr>
             <a:cxnSpLocks/>
+            <a:endCxn id="19" idx="1"/>
           </p:cNvCxnSpPr>
           <p:nvPr/>
         </p:nvCxnSpPr>
         <p:spPr>
           <a:xfrm flipV="1">
-            <a:off x="6107630" y="2547685"/>
-            <a:ext cx="979215" cy="805"/>
+            <a:off x="6318525" y="2548087"/>
+            <a:ext cx="1211282" cy="403"/>
           </a:xfrm>
           <a:prstGeom prst="straightConnector1">
             <a:avLst/>
@@ -31644,7 +31651,7 @@
         </p:nvSpPr>
         <p:spPr>
           <a:xfrm>
-            <a:off x="6647148" y="2471143"/>
+            <a:off x="6858043" y="2471143"/>
             <a:ext cx="275075" cy="153888"/>
           </a:xfrm>
           <a:prstGeom prst="rect">
@@ -31678,13 +31685,14 @@
           </p:cNvPr>
           <p:cNvCxnSpPr>
             <a:cxnSpLocks/>
+            <a:endCxn id="20" idx="1"/>
           </p:cNvCxnSpPr>
           <p:nvPr/>
         </p:nvCxnSpPr>
         <p:spPr>
           <a:xfrm flipV="1">
-            <a:off x="6113450" y="3185825"/>
-            <a:ext cx="979215" cy="805"/>
+            <a:off x="6324345" y="3186227"/>
+            <a:ext cx="1205462" cy="403"/>
           </a:xfrm>
           <a:prstGeom prst="straightConnector1">
             <a:avLst/>
@@ -31725,7 +31733,7 @@
         </p:nvSpPr>
         <p:spPr>
           <a:xfrm>
-            <a:off x="6652968" y="3109283"/>
+            <a:off x="6863863" y="3109283"/>
             <a:ext cx="275075" cy="153888"/>
           </a:xfrm>
           <a:prstGeom prst="rect">
@@ -31759,13 +31767,14 @@
           </p:cNvPr>
           <p:cNvCxnSpPr>
             <a:cxnSpLocks/>
+            <a:endCxn id="21" idx="1"/>
           </p:cNvCxnSpPr>
           <p:nvPr/>
         </p:nvCxnSpPr>
         <p:spPr>
           <a:xfrm flipV="1">
-            <a:off x="6119270" y="3804342"/>
-            <a:ext cx="979215" cy="805"/>
+            <a:off x="6330165" y="3804744"/>
+            <a:ext cx="1199642" cy="403"/>
           </a:xfrm>
           <a:prstGeom prst="straightConnector1">
             <a:avLst/>
@@ -31806,7 +31815,7 @@
         </p:nvSpPr>
         <p:spPr>
           <a:xfrm>
-            <a:off x="6658788" y="3727800"/>
+            <a:off x="6869683" y="3727800"/>
             <a:ext cx="275075" cy="153888"/>
           </a:xfrm>
           <a:prstGeom prst="rect">
@@ -31845,8 +31854,8 @@
         </p:nvCxnSpPr>
         <p:spPr>
           <a:xfrm flipV="1">
-            <a:off x="6125090" y="4485222"/>
-            <a:ext cx="979215" cy="805"/>
+            <a:off x="6335985" y="4478953"/>
+            <a:ext cx="1193822" cy="6873"/>
           </a:xfrm>
           <a:prstGeom prst="straightConnector1">
             <a:avLst/>
@@ -31887,7 +31896,7 @@
         </p:nvSpPr>
         <p:spPr>
           <a:xfrm>
-            <a:off x="6664608" y="4408680"/>
+            <a:off x="6875503" y="4408680"/>
             <a:ext cx="275075" cy="153888"/>
           </a:xfrm>
           <a:prstGeom prst="rect">
@@ -31924,7 +31933,7 @@
         </p:nvSpPr>
         <p:spPr>
           <a:xfrm>
-            <a:off x="6995876" y="1162741"/>
+            <a:off x="7450458" y="1184181"/>
             <a:ext cx="929165" cy="276999"/>
           </a:xfrm>
           <a:prstGeom prst="rect">
@@ -32021,6 +32030,188 @@
             <a:r>
               <a:rPr lang="en-US" sz="1000" i="1"/>
               <a:t>has-a</a:t>
+            </a:r>
+          </a:p>
+        </p:txBody>
+      </p:sp>
+      <p:sp>
+        <p:nvSpPr>
+          <p:cNvPr id="72" name="Arc 71">
+            <a:extLst>
+              <a:ext uri="{FF2B5EF4-FFF2-40B4-BE49-F238E27FC236}">
+                <a16:creationId xmlns:a16="http://schemas.microsoft.com/office/drawing/2014/main" id="{56D213E4-C900-A5D3-180E-FEEC850E29F9}"/>
+              </a:ext>
+            </a:extLst>
+          </p:cNvPr>
+          <p:cNvSpPr/>
+          <p:nvPr/>
+        </p:nvSpPr>
+        <p:spPr>
+          <a:xfrm>
+            <a:off x="3596844" y="762000"/>
+            <a:ext cx="1889555" cy="914400"/>
+          </a:xfrm>
+          <a:prstGeom prst="arc">
+            <a:avLst>
+              <a:gd name="adj1" fmla="val 11214114"/>
+              <a:gd name="adj2" fmla="val 21204117"/>
+            </a:avLst>
+          </a:prstGeom>
+          <a:ln>
+            <a:solidFill>
+              <a:schemeClr val="tx1"/>
+            </a:solidFill>
+            <a:prstDash val="dash"/>
+            <a:tailEnd type="triangle"/>
+          </a:ln>
+        </p:spPr>
+        <p:style>
+          <a:lnRef idx="1">
+            <a:schemeClr val="accent1"/>
+          </a:lnRef>
+          <a:fillRef idx="0">
+            <a:schemeClr val="accent1"/>
+          </a:fillRef>
+          <a:effectRef idx="0">
+            <a:schemeClr val="accent1"/>
+          </a:effectRef>
+          <a:fontRef idx="minor">
+            <a:schemeClr val="tx1"/>
+          </a:fontRef>
+        </p:style>
+        <p:txBody>
+          <a:bodyPr rtlCol="0" anchor="ctr"/>
+          <a:lstStyle/>
+          <a:p>
+            <a:pPr algn="ctr"/>
+            <a:endParaRPr lang="en-US"/>
+          </a:p>
+        </p:txBody>
+      </p:sp>
+      <p:sp>
+        <p:nvSpPr>
+          <p:cNvPr id="77" name="Arc 76">
+            <a:extLst>
+              <a:ext uri="{FF2B5EF4-FFF2-40B4-BE49-F238E27FC236}">
+                <a16:creationId xmlns:a16="http://schemas.microsoft.com/office/drawing/2014/main" id="{3597D0BD-FEAF-A142-ED90-9A2B52A0563B}"/>
+              </a:ext>
+            </a:extLst>
+          </p:cNvPr>
+          <p:cNvSpPr/>
+          <p:nvPr/>
+        </p:nvSpPr>
+        <p:spPr>
+          <a:xfrm>
+            <a:off x="5882845" y="762000"/>
+            <a:ext cx="1889555" cy="914400"/>
+          </a:xfrm>
+          <a:prstGeom prst="arc">
+            <a:avLst>
+              <a:gd name="adj1" fmla="val 11214114"/>
+              <a:gd name="adj2" fmla="val 21204117"/>
+            </a:avLst>
+          </a:prstGeom>
+          <a:ln>
+            <a:solidFill>
+              <a:schemeClr val="tx1"/>
+            </a:solidFill>
+            <a:prstDash val="dash"/>
+            <a:tailEnd type="triangle"/>
+          </a:ln>
+        </p:spPr>
+        <p:style>
+          <a:lnRef idx="1">
+            <a:schemeClr val="accent1"/>
+          </a:lnRef>
+          <a:fillRef idx="0">
+            <a:schemeClr val="accent1"/>
+          </a:fillRef>
+          <a:effectRef idx="0">
+            <a:schemeClr val="accent1"/>
+          </a:effectRef>
+          <a:fontRef idx="minor">
+            <a:schemeClr val="tx1"/>
+          </a:fontRef>
+        </p:style>
+        <p:txBody>
+          <a:bodyPr rtlCol="0" anchor="ctr"/>
+          <a:lstStyle/>
+          <a:p>
+            <a:pPr algn="ctr"/>
+            <a:endParaRPr lang="en-US"/>
+          </a:p>
+        </p:txBody>
+      </p:sp>
+      <p:sp>
+        <p:nvSpPr>
+          <p:cNvPr id="68" name="TextBox 67">
+            <a:extLst>
+              <a:ext uri="{FF2B5EF4-FFF2-40B4-BE49-F238E27FC236}">
+                <a16:creationId xmlns:a16="http://schemas.microsoft.com/office/drawing/2014/main" id="{77A63326-A33D-2E1C-4BF3-1DFB5F38DA2A}"/>
+              </a:ext>
+            </a:extLst>
+          </p:cNvPr>
+          <p:cNvSpPr txBox="1"/>
+          <p:nvPr/>
+        </p:nvSpPr>
+        <p:spPr>
+          <a:xfrm>
+            <a:off x="4188479" y="688314"/>
+            <a:ext cx="706284" cy="153888"/>
+          </a:xfrm>
+          <a:prstGeom prst="rect">
+            <a:avLst/>
+          </a:prstGeom>
+          <a:solidFill>
+            <a:schemeClr val="bg1"/>
+          </a:solidFill>
+        </p:spPr>
+        <p:txBody>
+          <a:bodyPr wrap="none" lIns="45720" tIns="0" rIns="45720" bIns="0" rtlCol="0">
+            <a:spAutoFit/>
+          </a:bodyPr>
+          <a:lstStyle/>
+          <a:p>
+            <a:r>
+              <a:rPr lang="en-US" sz="1000" i="1"/>
+              <a:t>specified-by</a:t>
+            </a:r>
+          </a:p>
+        </p:txBody>
+      </p:sp>
+      <p:sp>
+        <p:nvSpPr>
+          <p:cNvPr id="71" name="TextBox 70">
+            <a:extLst>
+              <a:ext uri="{FF2B5EF4-FFF2-40B4-BE49-F238E27FC236}">
+                <a16:creationId xmlns:a16="http://schemas.microsoft.com/office/drawing/2014/main" id="{075EFCA0-D08D-5442-195E-58610A277688}"/>
+              </a:ext>
+            </a:extLst>
+          </p:cNvPr>
+          <p:cNvSpPr txBox="1"/>
+          <p:nvPr/>
+        </p:nvSpPr>
+        <p:spPr>
+          <a:xfrm>
+            <a:off x="6493716" y="695032"/>
+            <a:ext cx="667812" cy="153888"/>
+          </a:xfrm>
+          <a:prstGeom prst="rect">
+            <a:avLst/>
+          </a:prstGeom>
+          <a:solidFill>
+            <a:schemeClr val="bg1"/>
+          </a:solidFill>
+        </p:spPr>
+        <p:txBody>
+          <a:bodyPr wrap="none" lIns="45720" tIns="0" rIns="45720" bIns="0" rtlCol="0">
+            <a:spAutoFit/>
+          </a:bodyPr>
+          <a:lstStyle/>
+          <a:p>
+            <a:r>
+              <a:rPr lang="en-US" sz="1000" i="1"/>
+              <a:t>instance-of</a:t>
             </a:r>
           </a:p>
         </p:txBody>

</xml_diff>

<commit_message>
14 October draft Updates to section 3, 4.1, 4.2, ndr-feedback
</commit_message>
<xml_diff>
--- a/pptx/figures.pptx
+++ b/pptx/figures.pptx
@@ -275,7 +275,7 @@
           <a:p>
             <a:fld id="{8B6844D7-9723-4963-9A7A-AA67393D1570}" type="datetimeFigureOut">
               <a:rPr lang="en-US" smtClean="0"/>
-              <a:t>10/13/2024</a:t>
+              <a:t>10/14/2024</a:t>
             </a:fld>
             <a:endParaRPr lang="en-US"/>
           </a:p>
@@ -473,7 +473,7 @@
           <a:p>
             <a:fld id="{8B6844D7-9723-4963-9A7A-AA67393D1570}" type="datetimeFigureOut">
               <a:rPr lang="en-US" smtClean="0"/>
-              <a:t>10/13/2024</a:t>
+              <a:t>10/14/2024</a:t>
             </a:fld>
             <a:endParaRPr lang="en-US"/>
           </a:p>
@@ -681,7 +681,7 @@
           <a:p>
             <a:fld id="{8B6844D7-9723-4963-9A7A-AA67393D1570}" type="datetimeFigureOut">
               <a:rPr lang="en-US" smtClean="0"/>
-              <a:t>10/13/2024</a:t>
+              <a:t>10/14/2024</a:t>
             </a:fld>
             <a:endParaRPr lang="en-US"/>
           </a:p>
@@ -879,7 +879,7 @@
           <a:p>
             <a:fld id="{8B6844D7-9723-4963-9A7A-AA67393D1570}" type="datetimeFigureOut">
               <a:rPr lang="en-US" smtClean="0"/>
-              <a:t>10/13/2024</a:t>
+              <a:t>10/14/2024</a:t>
             </a:fld>
             <a:endParaRPr lang="en-US"/>
           </a:p>
@@ -1154,7 +1154,7 @@
           <a:p>
             <a:fld id="{8B6844D7-9723-4963-9A7A-AA67393D1570}" type="datetimeFigureOut">
               <a:rPr lang="en-US" smtClean="0"/>
-              <a:t>10/13/2024</a:t>
+              <a:t>10/14/2024</a:t>
             </a:fld>
             <a:endParaRPr lang="en-US"/>
           </a:p>
@@ -1419,7 +1419,7 @@
           <a:p>
             <a:fld id="{8B6844D7-9723-4963-9A7A-AA67393D1570}" type="datetimeFigureOut">
               <a:rPr lang="en-US" smtClean="0"/>
-              <a:t>10/13/2024</a:t>
+              <a:t>10/14/2024</a:t>
             </a:fld>
             <a:endParaRPr lang="en-US"/>
           </a:p>
@@ -1831,7 +1831,7 @@
           <a:p>
             <a:fld id="{8B6844D7-9723-4963-9A7A-AA67393D1570}" type="datetimeFigureOut">
               <a:rPr lang="en-US" smtClean="0"/>
-              <a:t>10/13/2024</a:t>
+              <a:t>10/14/2024</a:t>
             </a:fld>
             <a:endParaRPr lang="en-US"/>
           </a:p>
@@ -1972,7 +1972,7 @@
           <a:p>
             <a:fld id="{8B6844D7-9723-4963-9A7A-AA67393D1570}" type="datetimeFigureOut">
               <a:rPr lang="en-US" smtClean="0"/>
-              <a:t>10/13/2024</a:t>
+              <a:t>10/14/2024</a:t>
             </a:fld>
             <a:endParaRPr lang="en-US"/>
           </a:p>
@@ -2085,7 +2085,7 @@
           <a:p>
             <a:fld id="{8B6844D7-9723-4963-9A7A-AA67393D1570}" type="datetimeFigureOut">
               <a:rPr lang="en-US" smtClean="0"/>
-              <a:t>10/13/2024</a:t>
+              <a:t>10/14/2024</a:t>
             </a:fld>
             <a:endParaRPr lang="en-US"/>
           </a:p>
@@ -2396,7 +2396,7 @@
           <a:p>
             <a:fld id="{8B6844D7-9723-4963-9A7A-AA67393D1570}" type="datetimeFigureOut">
               <a:rPr lang="en-US" smtClean="0"/>
-              <a:t>10/13/2024</a:t>
+              <a:t>10/14/2024</a:t>
             </a:fld>
             <a:endParaRPr lang="en-US"/>
           </a:p>
@@ -2684,7 +2684,7 @@
           <a:p>
             <a:fld id="{8B6844D7-9723-4963-9A7A-AA67393D1570}" type="datetimeFigureOut">
               <a:rPr lang="en-US" smtClean="0"/>
-              <a:t>10/13/2024</a:t>
+              <a:t>10/14/2024</a:t>
             </a:fld>
             <a:endParaRPr lang="en-US"/>
           </a:p>
@@ -2925,7 +2925,7 @@
           <a:p>
             <a:fld id="{8B6844D7-9723-4963-9A7A-AA67393D1570}" type="datetimeFigureOut">
               <a:rPr lang="en-US" smtClean="0"/>
-              <a:t>10/13/2024</a:t>
+              <a:t>10/14/2024</a:t>
             </a:fld>
             <a:endParaRPr lang="en-US"/>
           </a:p>
@@ -26405,7 +26405,7 @@
                   <a:schemeClr val="tx1"/>
                 </a:solidFill>
               </a:rPr>
-              <a:t>nc:PersonType</a:t>
+              <a:t>msg:RequestType</a:t>
             </a:r>
           </a:p>
         </p:txBody>
@@ -26621,7 +26621,7 @@
                   <a:schemeClr val="tx1"/>
                 </a:solidFill>
               </a:rPr>
-              <a:t>nc:PersonName</a:t>
+              <a:t>nc:requestedItem</a:t>
             </a:r>
           </a:p>
         </p:txBody>
@@ -26776,7 +26776,7 @@
                   <a:schemeClr val="tx1"/>
                 </a:solidFill>
               </a:rPr>
-              <a:t>nc:PersonNameType</a:t>
+              <a:t>nc:ItemType</a:t>
             </a:r>
           </a:p>
         </p:txBody>
@@ -26931,7 +26931,7 @@
                   <a:schemeClr val="tx1"/>
                 </a:solidFill>
               </a:rPr>
-              <a:t>nc:PersonFullName</a:t>
+              <a:t>nc:ItemName</a:t>
             </a:r>
           </a:p>
         </p:txBody>
@@ -27216,7 +27216,22 @@
                   <a:srgbClr val="1C0054"/>
                 </a:solidFill>
               </a:rPr>
-              <a:t>NIEM data model </a:t>
+              <a:t>Message</a:t>
+            </a:r>
+            <a:br>
+              <a:rPr lang="en-US" sz="1200" b="1">
+                <a:solidFill>
+                  <a:srgbClr val="1C0054"/>
+                </a:solidFill>
+              </a:rPr>
+            </a:br>
+            <a:r>
+              <a:rPr lang="en-US" sz="1200" b="1">
+                <a:solidFill>
+                  <a:srgbClr val="1C0054"/>
+                </a:solidFill>
+              </a:rPr>
+              <a:t>model </a:t>
             </a:r>
           </a:p>
         </p:txBody>
@@ -27421,7 +27436,7 @@
                   <a:schemeClr val="tx1"/>
                 </a:solidFill>
               </a:rPr>
-              <a:t>person object</a:t>
+              <a:t>request object</a:t>
             </a:r>
           </a:p>
         </p:txBody>
@@ -27668,7 +27683,7 @@
                   <a:schemeClr val="tx1"/>
                 </a:solidFill>
               </a:rPr>
-              <a:t>name object</a:t>
+              <a:t>item object</a:t>
             </a:r>
           </a:p>
         </p:txBody>
@@ -27687,46 +27702,7 @@
         </p:nvSpPr>
         <p:spPr>
           <a:xfrm>
-            <a:off x="3022079" y="2471682"/>
-            <a:ext cx="916918" cy="153888"/>
-          </a:xfrm>
-          <a:prstGeom prst="rect">
-            <a:avLst/>
-          </a:prstGeom>
-          <a:solidFill>
-            <a:schemeClr val="bg1"/>
-          </a:solidFill>
-        </p:spPr>
-        <p:txBody>
-          <a:bodyPr wrap="none" lIns="0" tIns="0" rIns="0" bIns="0" rtlCol="0">
-            <a:spAutoFit/>
-          </a:bodyPr>
-          <a:lstStyle/>
-          <a:p>
-            <a:r>
-              <a:rPr lang="en-US" sz="1000">
-                <a:latin typeface="Consolas" panose="020B0609020204030204" pitchFamily="49" charset="0"/>
-              </a:rPr>
-              <a:t>nc:PersonName</a:t>
-            </a:r>
-          </a:p>
-        </p:txBody>
-      </p:sp>
-      <p:sp>
-        <p:nvSpPr>
-          <p:cNvPr id="50" name="TextBox 49">
-            <a:extLst>
-              <a:ext uri="{FF2B5EF4-FFF2-40B4-BE49-F238E27FC236}">
-                <a16:creationId xmlns:a16="http://schemas.microsoft.com/office/drawing/2014/main" id="{DE74425D-4536-1C01-9D54-1E306BA9D8D5}"/>
-              </a:ext>
-            </a:extLst>
-          </p:cNvPr>
-          <p:cNvSpPr txBox="1"/>
-          <p:nvPr/>
-        </p:nvSpPr>
-        <p:spPr>
-          <a:xfrm>
-            <a:off x="2897785" y="3750666"/>
+            <a:off x="2902811" y="2471682"/>
             <a:ext cx="1199046" cy="153888"/>
           </a:xfrm>
           <a:prstGeom prst="rect">
@@ -27746,7 +27722,46 @@
               <a:rPr lang="en-US" sz="1000">
                 <a:latin typeface="Consolas" panose="020B0609020204030204" pitchFamily="49" charset="0"/>
               </a:rPr>
-              <a:t>nc:PersonFullName</a:t>
+              <a:t>msg:requestedItem</a:t>
+            </a:r>
+          </a:p>
+        </p:txBody>
+      </p:sp>
+      <p:sp>
+        <p:nvSpPr>
+          <p:cNvPr id="50" name="TextBox 49">
+            <a:extLst>
+              <a:ext uri="{FF2B5EF4-FFF2-40B4-BE49-F238E27FC236}">
+                <a16:creationId xmlns:a16="http://schemas.microsoft.com/office/drawing/2014/main" id="{DE74425D-4536-1C01-9D54-1E306BA9D8D5}"/>
+              </a:ext>
+            </a:extLst>
+          </p:cNvPr>
+          <p:cNvSpPr txBox="1"/>
+          <p:nvPr/>
+        </p:nvSpPr>
+        <p:spPr>
+          <a:xfrm>
+            <a:off x="3116443" y="3750666"/>
+            <a:ext cx="775853" cy="153888"/>
+          </a:xfrm>
+          <a:prstGeom prst="rect">
+            <a:avLst/>
+          </a:prstGeom>
+          <a:solidFill>
+            <a:schemeClr val="bg1"/>
+          </a:solidFill>
+        </p:spPr>
+        <p:txBody>
+          <a:bodyPr wrap="none" lIns="0" tIns="0" rIns="0" bIns="0" rtlCol="0">
+            <a:spAutoFit/>
+          </a:bodyPr>
+          <a:lstStyle/>
+          <a:p>
+            <a:r>
+              <a:rPr lang="en-US" sz="1000">
+                <a:latin typeface="Consolas" panose="020B0609020204030204" pitchFamily="49" charset="0"/>
+              </a:rPr>
+              <a:t>nc:ItemName</a:t>
             </a:r>
           </a:p>
         </p:txBody>
@@ -27865,7 +27880,7 @@
                 </a:solidFill>
                 <a:latin typeface="Consolas" panose="020B0609020204030204" pitchFamily="49" charset="0"/>
               </a:rPr>
-              <a:t>Clark Kent</a:t>
+              <a:t>Wrench</a:t>
             </a:r>
           </a:p>
         </p:txBody>

</xml_diff>

<commit_message>
18 November 2024 draft New section 5.1 on meaning of NIEM data Outline for rest of section 5
</commit_message>
<xml_diff>
--- a/pptx/figures.pptx
+++ b/pptx/figures.pptx
@@ -10,7 +10,8 @@
     <p:sldId id="274" r:id="rId4"/>
     <p:sldId id="276" r:id="rId5"/>
     <p:sldId id="277" r:id="rId6"/>
-    <p:sldId id="278" r:id="rId7"/>
+    <p:sldId id="280" r:id="rId7"/>
+    <p:sldId id="278" r:id="rId8"/>
   </p:sldIdLst>
   <p:sldSz cx="12192000" cy="6858000"/>
   <p:notesSz cx="6858000" cy="9144000"/>
@@ -112,7 +113,7 @@
   <p:extLst>
     <p:ext uri="{EFAFB233-063F-42B5-8137-9DF3F51BA10A}">
       <p15:sldGuideLst xmlns:p15="http://schemas.microsoft.com/office/powerpoint/2012/main">
-        <p15:guide id="1" orient="horz" pos="2856" userDrawn="1">
+        <p15:guide id="1" orient="horz" pos="2208" userDrawn="1">
           <p15:clr>
             <a:srgbClr val="A4A3A4"/>
           </p15:clr>
@@ -275,7 +276,7 @@
           <a:p>
             <a:fld id="{8B6844D7-9723-4963-9A7A-AA67393D1570}" type="datetimeFigureOut">
               <a:rPr lang="en-US" smtClean="0"/>
-              <a:t>10/14/2024</a:t>
+              <a:t>11/13/2024</a:t>
             </a:fld>
             <a:endParaRPr lang="en-US"/>
           </a:p>
@@ -473,7 +474,7 @@
           <a:p>
             <a:fld id="{8B6844D7-9723-4963-9A7A-AA67393D1570}" type="datetimeFigureOut">
               <a:rPr lang="en-US" smtClean="0"/>
-              <a:t>10/14/2024</a:t>
+              <a:t>11/13/2024</a:t>
             </a:fld>
             <a:endParaRPr lang="en-US"/>
           </a:p>
@@ -681,7 +682,7 @@
           <a:p>
             <a:fld id="{8B6844D7-9723-4963-9A7A-AA67393D1570}" type="datetimeFigureOut">
               <a:rPr lang="en-US" smtClean="0"/>
-              <a:t>10/14/2024</a:t>
+              <a:t>11/13/2024</a:t>
             </a:fld>
             <a:endParaRPr lang="en-US"/>
           </a:p>
@@ -879,7 +880,7 @@
           <a:p>
             <a:fld id="{8B6844D7-9723-4963-9A7A-AA67393D1570}" type="datetimeFigureOut">
               <a:rPr lang="en-US" smtClean="0"/>
-              <a:t>10/14/2024</a:t>
+              <a:t>11/13/2024</a:t>
             </a:fld>
             <a:endParaRPr lang="en-US"/>
           </a:p>
@@ -1154,7 +1155,7 @@
           <a:p>
             <a:fld id="{8B6844D7-9723-4963-9A7A-AA67393D1570}" type="datetimeFigureOut">
               <a:rPr lang="en-US" smtClean="0"/>
-              <a:t>10/14/2024</a:t>
+              <a:t>11/13/2024</a:t>
             </a:fld>
             <a:endParaRPr lang="en-US"/>
           </a:p>
@@ -1419,7 +1420,7 @@
           <a:p>
             <a:fld id="{8B6844D7-9723-4963-9A7A-AA67393D1570}" type="datetimeFigureOut">
               <a:rPr lang="en-US" smtClean="0"/>
-              <a:t>10/14/2024</a:t>
+              <a:t>11/13/2024</a:t>
             </a:fld>
             <a:endParaRPr lang="en-US"/>
           </a:p>
@@ -1831,7 +1832,7 @@
           <a:p>
             <a:fld id="{8B6844D7-9723-4963-9A7A-AA67393D1570}" type="datetimeFigureOut">
               <a:rPr lang="en-US" smtClean="0"/>
-              <a:t>10/14/2024</a:t>
+              <a:t>11/13/2024</a:t>
             </a:fld>
             <a:endParaRPr lang="en-US"/>
           </a:p>
@@ -1972,7 +1973,7 @@
           <a:p>
             <a:fld id="{8B6844D7-9723-4963-9A7A-AA67393D1570}" type="datetimeFigureOut">
               <a:rPr lang="en-US" smtClean="0"/>
-              <a:t>10/14/2024</a:t>
+              <a:t>11/13/2024</a:t>
             </a:fld>
             <a:endParaRPr lang="en-US"/>
           </a:p>
@@ -2085,7 +2086,7 @@
           <a:p>
             <a:fld id="{8B6844D7-9723-4963-9A7A-AA67393D1570}" type="datetimeFigureOut">
               <a:rPr lang="en-US" smtClean="0"/>
-              <a:t>10/14/2024</a:t>
+              <a:t>11/13/2024</a:t>
             </a:fld>
             <a:endParaRPr lang="en-US"/>
           </a:p>
@@ -2396,7 +2397,7 @@
           <a:p>
             <a:fld id="{8B6844D7-9723-4963-9A7A-AA67393D1570}" type="datetimeFigureOut">
               <a:rPr lang="en-US" smtClean="0"/>
-              <a:t>10/14/2024</a:t>
+              <a:t>11/13/2024</a:t>
             </a:fld>
             <a:endParaRPr lang="en-US"/>
           </a:p>
@@ -2684,7 +2685,7 @@
           <a:p>
             <a:fld id="{8B6844D7-9723-4963-9A7A-AA67393D1570}" type="datetimeFigureOut">
               <a:rPr lang="en-US" smtClean="0"/>
-              <a:t>10/14/2024</a:t>
+              <a:t>11/13/2024</a:t>
             </a:fld>
             <a:endParaRPr lang="en-US"/>
           </a:p>
@@ -2925,7 +2926,7 @@
           <a:p>
             <a:fld id="{8B6844D7-9723-4963-9A7A-AA67393D1570}" type="datetimeFigureOut">
               <a:rPr lang="en-US" smtClean="0"/>
-              <a:t>10/14/2024</a:t>
+              <a:t>11/13/2024</a:t>
             </a:fld>
             <a:endParaRPr lang="en-US"/>
           </a:p>
@@ -27702,7 +27703,7 @@
         </p:nvSpPr>
         <p:spPr>
           <a:xfrm>
-            <a:off x="2902811" y="2471682"/>
+            <a:off x="2902811" y="2471143"/>
             <a:ext cx="1199046" cy="153888"/>
           </a:xfrm>
           <a:prstGeom prst="rect">
@@ -27741,7 +27742,7 @@
         </p:nvSpPr>
         <p:spPr>
           <a:xfrm>
-            <a:off x="3116443" y="3750666"/>
+            <a:off x="3116443" y="3727800"/>
             <a:ext cx="775853" cy="153888"/>
           </a:xfrm>
           <a:prstGeom prst="rect">
@@ -29874,6 +29875,168 @@
           </a:p>
         </p:txBody>
       </p:sp>
+      <p:cxnSp>
+        <p:nvCxnSpPr>
+          <p:cNvPr id="28" name="Straight Arrow Connector 27">
+            <a:extLst>
+              <a:ext uri="{FF2B5EF4-FFF2-40B4-BE49-F238E27FC236}">
+                <a16:creationId xmlns:a16="http://schemas.microsoft.com/office/drawing/2014/main" id="{D1FE64F1-4CD9-7925-946F-EF8B8BC05608}"/>
+              </a:ext>
+            </a:extLst>
+          </p:cNvPr>
+          <p:cNvCxnSpPr>
+            <a:cxnSpLocks/>
+          </p:cNvCxnSpPr>
+          <p:nvPr/>
+        </p:nvCxnSpPr>
+        <p:spPr>
+          <a:xfrm>
+            <a:off x="4102059" y="2548087"/>
+            <a:ext cx="900524" cy="0"/>
+          </a:xfrm>
+          <a:prstGeom prst="straightConnector1">
+            <a:avLst/>
+          </a:prstGeom>
+          <a:ln>
+            <a:solidFill>
+              <a:schemeClr val="tx1"/>
+            </a:solidFill>
+            <a:tailEnd type="triangle"/>
+          </a:ln>
+        </p:spPr>
+        <p:style>
+          <a:lnRef idx="1">
+            <a:schemeClr val="accent1"/>
+          </a:lnRef>
+          <a:fillRef idx="0">
+            <a:schemeClr val="accent1"/>
+          </a:fillRef>
+          <a:effectRef idx="0">
+            <a:schemeClr val="accent1"/>
+          </a:effectRef>
+          <a:fontRef idx="minor">
+            <a:schemeClr val="tx1"/>
+          </a:fontRef>
+        </p:style>
+      </p:cxnSp>
+      <p:sp>
+        <p:nvSpPr>
+          <p:cNvPr id="38" name="TextBox 37">
+            <a:extLst>
+              <a:ext uri="{FF2B5EF4-FFF2-40B4-BE49-F238E27FC236}">
+                <a16:creationId xmlns:a16="http://schemas.microsoft.com/office/drawing/2014/main" id="{B0F1641E-8B95-C4E1-DBB4-536BF412C37F}"/>
+              </a:ext>
+            </a:extLst>
+          </p:cNvPr>
+          <p:cNvSpPr txBox="1"/>
+          <p:nvPr/>
+        </p:nvSpPr>
+        <p:spPr>
+          <a:xfrm>
+            <a:off x="4179130" y="2389731"/>
+            <a:ext cx="660654" cy="153888"/>
+          </a:xfrm>
+          <a:prstGeom prst="rect">
+            <a:avLst/>
+          </a:prstGeom>
+          <a:solidFill>
+            <a:schemeClr val="bg1"/>
+          </a:solidFill>
+        </p:spPr>
+        <p:txBody>
+          <a:bodyPr wrap="square" lIns="45720" tIns="0" rIns="45720" bIns="0" rtlCol="0">
+            <a:spAutoFit/>
+          </a:bodyPr>
+          <a:lstStyle/>
+          <a:p>
+            <a:r>
+              <a:rPr lang="en-US" sz="1000" i="1"/>
+              <a:t>defined-by</a:t>
+            </a:r>
+          </a:p>
+        </p:txBody>
+      </p:sp>
+      <p:cxnSp>
+        <p:nvCxnSpPr>
+          <p:cNvPr id="40" name="Straight Arrow Connector 39">
+            <a:extLst>
+              <a:ext uri="{FF2B5EF4-FFF2-40B4-BE49-F238E27FC236}">
+                <a16:creationId xmlns:a16="http://schemas.microsoft.com/office/drawing/2014/main" id="{081B2E2B-6B84-8956-852D-6A2FE9600CF4}"/>
+              </a:ext>
+            </a:extLst>
+          </p:cNvPr>
+          <p:cNvCxnSpPr>
+            <a:cxnSpLocks/>
+          </p:cNvCxnSpPr>
+          <p:nvPr/>
+        </p:nvCxnSpPr>
+        <p:spPr>
+          <a:xfrm>
+            <a:off x="3974556" y="3828927"/>
+            <a:ext cx="1033672" cy="0"/>
+          </a:xfrm>
+          <a:prstGeom prst="straightConnector1">
+            <a:avLst/>
+          </a:prstGeom>
+          <a:ln>
+            <a:solidFill>
+              <a:schemeClr val="tx1"/>
+            </a:solidFill>
+            <a:tailEnd type="triangle"/>
+          </a:ln>
+        </p:spPr>
+        <p:style>
+          <a:lnRef idx="1">
+            <a:schemeClr val="accent1"/>
+          </a:lnRef>
+          <a:fillRef idx="0">
+            <a:schemeClr val="accent1"/>
+          </a:fillRef>
+          <a:effectRef idx="0">
+            <a:schemeClr val="accent1"/>
+          </a:effectRef>
+          <a:fontRef idx="minor">
+            <a:schemeClr val="tx1"/>
+          </a:fontRef>
+        </p:style>
+      </p:cxnSp>
+      <p:sp>
+        <p:nvSpPr>
+          <p:cNvPr id="41" name="TextBox 40">
+            <a:extLst>
+              <a:ext uri="{FF2B5EF4-FFF2-40B4-BE49-F238E27FC236}">
+                <a16:creationId xmlns:a16="http://schemas.microsoft.com/office/drawing/2014/main" id="{7E0A62E5-23A6-EC4D-9C55-A3AC3715CB57}"/>
+              </a:ext>
+            </a:extLst>
+          </p:cNvPr>
+          <p:cNvSpPr txBox="1"/>
+          <p:nvPr/>
+        </p:nvSpPr>
+        <p:spPr>
+          <a:xfrm>
+            <a:off x="4159375" y="3670571"/>
+            <a:ext cx="660654" cy="153888"/>
+          </a:xfrm>
+          <a:prstGeom prst="rect">
+            <a:avLst/>
+          </a:prstGeom>
+          <a:solidFill>
+            <a:schemeClr val="bg1"/>
+          </a:solidFill>
+        </p:spPr>
+        <p:txBody>
+          <a:bodyPr wrap="square" lIns="45720" tIns="0" rIns="45720" bIns="0" rtlCol="0">
+            <a:spAutoFit/>
+          </a:bodyPr>
+          <a:lstStyle/>
+          <a:p>
+            <a:r>
+              <a:rPr lang="en-US" sz="1000" i="1"/>
+              <a:t>defined-by</a:t>
+            </a:r>
+          </a:p>
+        </p:txBody>
+      </p:sp>
     </p:spTree>
     <p:extLst>
       <p:ext uri="{BB962C8B-B14F-4D97-AF65-F5344CB8AC3E}">
@@ -29888,6 +30051,1416 @@
 </file>
 
 <file path=ppt/slides/slide6.xml><?xml version="1.0" encoding="utf-8"?>
+<p:sld xmlns:a="http://schemas.openxmlformats.org/drawingml/2006/main" xmlns:r="http://schemas.openxmlformats.org/officeDocument/2006/relationships" xmlns:p="http://schemas.openxmlformats.org/presentationml/2006/main">
+  <p:cSld>
+    <p:spTree>
+      <p:nvGrpSpPr>
+        <p:cNvPr id="1" name=""/>
+        <p:cNvGrpSpPr/>
+        <p:nvPr/>
+      </p:nvGrpSpPr>
+      <p:grpSpPr>
+        <a:xfrm>
+          <a:off x="0" y="0"/>
+          <a:ext cx="0" cy="0"/>
+          <a:chOff x="0" y="0"/>
+          <a:chExt cx="0" cy="0"/>
+        </a:xfrm>
+      </p:grpSpPr>
+      <p:sp>
+        <p:nvSpPr>
+          <p:cNvPr id="2" name="Rectangle 1">
+            <a:extLst>
+              <a:ext uri="{FF2B5EF4-FFF2-40B4-BE49-F238E27FC236}">
+                <a16:creationId xmlns:a16="http://schemas.microsoft.com/office/drawing/2014/main" id="{45326BE1-47DB-BBFB-377C-FCCAD4B443A7}"/>
+              </a:ext>
+            </a:extLst>
+          </p:cNvPr>
+          <p:cNvSpPr/>
+          <p:nvPr/>
+        </p:nvSpPr>
+        <p:spPr>
+          <a:xfrm>
+            <a:off x="196655" y="209706"/>
+            <a:ext cx="1555945" cy="484094"/>
+          </a:xfrm>
+          <a:prstGeom prst="rect">
+            <a:avLst/>
+          </a:prstGeom>
+          <a:solidFill>
+            <a:srgbClr val="FFFF00"/>
+          </a:solidFill>
+          <a:ln>
+            <a:solidFill>
+              <a:schemeClr val="tx1"/>
+            </a:solidFill>
+          </a:ln>
+        </p:spPr>
+        <p:style>
+          <a:lnRef idx="2">
+            <a:schemeClr val="accent1">
+              <a:shade val="15000"/>
+            </a:schemeClr>
+          </a:lnRef>
+          <a:fillRef idx="1">
+            <a:schemeClr val="accent1"/>
+          </a:fillRef>
+          <a:effectRef idx="0">
+            <a:schemeClr val="accent1"/>
+          </a:effectRef>
+          <a:fontRef idx="minor">
+            <a:schemeClr val="lt1"/>
+          </a:fontRef>
+        </p:style>
+        <p:txBody>
+          <a:bodyPr rtlCol="0" anchor="ctr"/>
+          <a:lstStyle/>
+          <a:p>
+            <a:pPr algn="ctr"/>
+            <a:r>
+              <a:rPr lang="en-US">
+                <a:solidFill>
+                  <a:schemeClr val="tx1"/>
+                </a:solidFill>
+              </a:rPr>
+              <a:t>meaning</a:t>
+            </a:r>
+          </a:p>
+        </p:txBody>
+      </p:sp>
+      <p:sp>
+        <p:nvSpPr>
+          <p:cNvPr id="5" name="Rectangle: Rounded Corners 4">
+            <a:extLst>
+              <a:ext uri="{FF2B5EF4-FFF2-40B4-BE49-F238E27FC236}">
+                <a16:creationId xmlns:a16="http://schemas.microsoft.com/office/drawing/2014/main" id="{BC129093-ACDF-563E-728C-602103BB2B09}"/>
+              </a:ext>
+            </a:extLst>
+          </p:cNvPr>
+          <p:cNvSpPr/>
+          <p:nvPr/>
+        </p:nvSpPr>
+        <p:spPr>
+          <a:xfrm>
+            <a:off x="2074419" y="3086998"/>
+            <a:ext cx="615456" cy="404603"/>
+          </a:xfrm>
+          <a:prstGeom prst="roundRect">
+            <a:avLst/>
+          </a:prstGeom>
+          <a:solidFill>
+            <a:srgbClr val="F6F256"/>
+          </a:solidFill>
+          <a:ln>
+            <a:solidFill>
+              <a:schemeClr val="tx1"/>
+            </a:solidFill>
+          </a:ln>
+        </p:spPr>
+        <p:style>
+          <a:lnRef idx="2">
+            <a:schemeClr val="accent1">
+              <a:shade val="50000"/>
+            </a:schemeClr>
+          </a:lnRef>
+          <a:fillRef idx="1">
+            <a:schemeClr val="accent1"/>
+          </a:fillRef>
+          <a:effectRef idx="0">
+            <a:schemeClr val="accent1"/>
+          </a:effectRef>
+          <a:fontRef idx="minor">
+            <a:schemeClr val="lt1"/>
+          </a:fontRef>
+        </p:style>
+        <p:txBody>
+          <a:bodyPr rtlCol="0" anchor="ctr"/>
+          <a:lstStyle>
+            <a:defPPr>
+              <a:defRPr lang="en-US"/>
+            </a:defPPr>
+            <a:lvl1pPr marL="0" algn="l" defTabSz="914400" rtl="0" eaLnBrk="1" latinLnBrk="0" hangingPunct="1">
+              <a:defRPr sz="1800" kern="1200">
+                <a:solidFill>
+                  <a:schemeClr val="lt1"/>
+                </a:solidFill>
+                <a:latin typeface="+mn-lt"/>
+                <a:ea typeface="+mn-ea"/>
+                <a:cs typeface="+mn-cs"/>
+              </a:defRPr>
+            </a:lvl1pPr>
+            <a:lvl2pPr marL="457200" algn="l" defTabSz="914400" rtl="0" eaLnBrk="1" latinLnBrk="0" hangingPunct="1">
+              <a:defRPr sz="1800" kern="1200">
+                <a:solidFill>
+                  <a:schemeClr val="lt1"/>
+                </a:solidFill>
+                <a:latin typeface="+mn-lt"/>
+                <a:ea typeface="+mn-ea"/>
+                <a:cs typeface="+mn-cs"/>
+              </a:defRPr>
+            </a:lvl2pPr>
+            <a:lvl3pPr marL="914400" algn="l" defTabSz="914400" rtl="0" eaLnBrk="1" latinLnBrk="0" hangingPunct="1">
+              <a:defRPr sz="1800" kern="1200">
+                <a:solidFill>
+                  <a:schemeClr val="lt1"/>
+                </a:solidFill>
+                <a:latin typeface="+mn-lt"/>
+                <a:ea typeface="+mn-ea"/>
+                <a:cs typeface="+mn-cs"/>
+              </a:defRPr>
+            </a:lvl3pPr>
+            <a:lvl4pPr marL="1371600" algn="l" defTabSz="914400" rtl="0" eaLnBrk="1" latinLnBrk="0" hangingPunct="1">
+              <a:defRPr sz="1800" kern="1200">
+                <a:solidFill>
+                  <a:schemeClr val="lt1"/>
+                </a:solidFill>
+                <a:latin typeface="+mn-lt"/>
+                <a:ea typeface="+mn-ea"/>
+                <a:cs typeface="+mn-cs"/>
+              </a:defRPr>
+            </a:lvl4pPr>
+            <a:lvl5pPr marL="1828800" algn="l" defTabSz="914400" rtl="0" eaLnBrk="1" latinLnBrk="0" hangingPunct="1">
+              <a:defRPr sz="1800" kern="1200">
+                <a:solidFill>
+                  <a:schemeClr val="lt1"/>
+                </a:solidFill>
+                <a:latin typeface="+mn-lt"/>
+                <a:ea typeface="+mn-ea"/>
+                <a:cs typeface="+mn-cs"/>
+              </a:defRPr>
+            </a:lvl5pPr>
+            <a:lvl6pPr marL="2286000" algn="l" defTabSz="914400" rtl="0" eaLnBrk="1" latinLnBrk="0" hangingPunct="1">
+              <a:defRPr sz="1800" kern="1200">
+                <a:solidFill>
+                  <a:schemeClr val="lt1"/>
+                </a:solidFill>
+                <a:latin typeface="+mn-lt"/>
+                <a:ea typeface="+mn-ea"/>
+                <a:cs typeface="+mn-cs"/>
+              </a:defRPr>
+            </a:lvl6pPr>
+            <a:lvl7pPr marL="2743200" algn="l" defTabSz="914400" rtl="0" eaLnBrk="1" latinLnBrk="0" hangingPunct="1">
+              <a:defRPr sz="1800" kern="1200">
+                <a:solidFill>
+                  <a:schemeClr val="lt1"/>
+                </a:solidFill>
+                <a:latin typeface="+mn-lt"/>
+                <a:ea typeface="+mn-ea"/>
+                <a:cs typeface="+mn-cs"/>
+              </a:defRPr>
+            </a:lvl7pPr>
+            <a:lvl8pPr marL="3200400" algn="l" defTabSz="914400" rtl="0" eaLnBrk="1" latinLnBrk="0" hangingPunct="1">
+              <a:defRPr sz="1800" kern="1200">
+                <a:solidFill>
+                  <a:schemeClr val="lt1"/>
+                </a:solidFill>
+                <a:latin typeface="+mn-lt"/>
+                <a:ea typeface="+mn-ea"/>
+                <a:cs typeface="+mn-cs"/>
+              </a:defRPr>
+            </a:lvl8pPr>
+            <a:lvl9pPr marL="3657600" algn="l" defTabSz="914400" rtl="0" eaLnBrk="1" latinLnBrk="0" hangingPunct="1">
+              <a:defRPr sz="1800" kern="1200">
+                <a:solidFill>
+                  <a:schemeClr val="lt1"/>
+                </a:solidFill>
+                <a:latin typeface="+mn-lt"/>
+                <a:ea typeface="+mn-ea"/>
+                <a:cs typeface="+mn-cs"/>
+              </a:defRPr>
+            </a:lvl9pPr>
+          </a:lstStyle>
+          <a:p>
+            <a:pPr algn="ctr">
+              <a:lnSpc>
+                <a:spcPts val="1000"/>
+              </a:lnSpc>
+            </a:pPr>
+            <a:r>
+              <a:rPr lang="en-US" sz="1000" i="1">
+                <a:solidFill>
+                  <a:schemeClr val="tx1"/>
+                </a:solidFill>
+              </a:rPr>
+              <a:t>_:n1</a:t>
+            </a:r>
+          </a:p>
+        </p:txBody>
+      </p:sp>
+      <p:sp>
+        <p:nvSpPr>
+          <p:cNvPr id="6" name="Rectangle: Rounded Corners 5">
+            <a:extLst>
+              <a:ext uri="{FF2B5EF4-FFF2-40B4-BE49-F238E27FC236}">
+                <a16:creationId xmlns:a16="http://schemas.microsoft.com/office/drawing/2014/main" id="{52635571-186F-02D2-4149-01AF1D2C0A45}"/>
+              </a:ext>
+            </a:extLst>
+          </p:cNvPr>
+          <p:cNvSpPr/>
+          <p:nvPr/>
+        </p:nvSpPr>
+        <p:spPr>
+          <a:xfrm>
+            <a:off x="1811095" y="1888673"/>
+            <a:ext cx="1141655" cy="405676"/>
+          </a:xfrm>
+          <a:prstGeom prst="roundRect">
+            <a:avLst/>
+          </a:prstGeom>
+          <a:solidFill>
+            <a:srgbClr val="D0B9FF"/>
+          </a:solidFill>
+          <a:ln>
+            <a:solidFill>
+              <a:schemeClr val="tx1"/>
+            </a:solidFill>
+          </a:ln>
+        </p:spPr>
+        <p:style>
+          <a:lnRef idx="2">
+            <a:schemeClr val="accent1">
+              <a:shade val="50000"/>
+            </a:schemeClr>
+          </a:lnRef>
+          <a:fillRef idx="1">
+            <a:schemeClr val="accent1"/>
+          </a:fillRef>
+          <a:effectRef idx="0">
+            <a:schemeClr val="accent1"/>
+          </a:effectRef>
+          <a:fontRef idx="minor">
+            <a:schemeClr val="lt1"/>
+          </a:fontRef>
+        </p:style>
+        <p:txBody>
+          <a:bodyPr rtlCol="0" anchor="ctr"/>
+          <a:lstStyle>
+            <a:defPPr>
+              <a:defRPr lang="en-US"/>
+            </a:defPPr>
+            <a:lvl1pPr marL="0" algn="l" defTabSz="914400" rtl="0" eaLnBrk="1" latinLnBrk="0" hangingPunct="1">
+              <a:defRPr sz="1800" kern="1200">
+                <a:solidFill>
+                  <a:schemeClr val="lt1"/>
+                </a:solidFill>
+                <a:latin typeface="+mn-lt"/>
+                <a:ea typeface="+mn-ea"/>
+                <a:cs typeface="+mn-cs"/>
+              </a:defRPr>
+            </a:lvl1pPr>
+            <a:lvl2pPr marL="457200" algn="l" defTabSz="914400" rtl="0" eaLnBrk="1" latinLnBrk="0" hangingPunct="1">
+              <a:defRPr sz="1800" kern="1200">
+                <a:solidFill>
+                  <a:schemeClr val="lt1"/>
+                </a:solidFill>
+                <a:latin typeface="+mn-lt"/>
+                <a:ea typeface="+mn-ea"/>
+                <a:cs typeface="+mn-cs"/>
+              </a:defRPr>
+            </a:lvl2pPr>
+            <a:lvl3pPr marL="914400" algn="l" defTabSz="914400" rtl="0" eaLnBrk="1" latinLnBrk="0" hangingPunct="1">
+              <a:defRPr sz="1800" kern="1200">
+                <a:solidFill>
+                  <a:schemeClr val="lt1"/>
+                </a:solidFill>
+                <a:latin typeface="+mn-lt"/>
+                <a:ea typeface="+mn-ea"/>
+                <a:cs typeface="+mn-cs"/>
+              </a:defRPr>
+            </a:lvl3pPr>
+            <a:lvl4pPr marL="1371600" algn="l" defTabSz="914400" rtl="0" eaLnBrk="1" latinLnBrk="0" hangingPunct="1">
+              <a:defRPr sz="1800" kern="1200">
+                <a:solidFill>
+                  <a:schemeClr val="lt1"/>
+                </a:solidFill>
+                <a:latin typeface="+mn-lt"/>
+                <a:ea typeface="+mn-ea"/>
+                <a:cs typeface="+mn-cs"/>
+              </a:defRPr>
+            </a:lvl4pPr>
+            <a:lvl5pPr marL="1828800" algn="l" defTabSz="914400" rtl="0" eaLnBrk="1" latinLnBrk="0" hangingPunct="1">
+              <a:defRPr sz="1800" kern="1200">
+                <a:solidFill>
+                  <a:schemeClr val="lt1"/>
+                </a:solidFill>
+                <a:latin typeface="+mn-lt"/>
+                <a:ea typeface="+mn-ea"/>
+                <a:cs typeface="+mn-cs"/>
+              </a:defRPr>
+            </a:lvl5pPr>
+            <a:lvl6pPr marL="2286000" algn="l" defTabSz="914400" rtl="0" eaLnBrk="1" latinLnBrk="0" hangingPunct="1">
+              <a:defRPr sz="1800" kern="1200">
+                <a:solidFill>
+                  <a:schemeClr val="lt1"/>
+                </a:solidFill>
+                <a:latin typeface="+mn-lt"/>
+                <a:ea typeface="+mn-ea"/>
+                <a:cs typeface="+mn-cs"/>
+              </a:defRPr>
+            </a:lvl6pPr>
+            <a:lvl7pPr marL="2743200" algn="l" defTabSz="914400" rtl="0" eaLnBrk="1" latinLnBrk="0" hangingPunct="1">
+              <a:defRPr sz="1800" kern="1200">
+                <a:solidFill>
+                  <a:schemeClr val="lt1"/>
+                </a:solidFill>
+                <a:latin typeface="+mn-lt"/>
+                <a:ea typeface="+mn-ea"/>
+                <a:cs typeface="+mn-cs"/>
+              </a:defRPr>
+            </a:lvl7pPr>
+            <a:lvl8pPr marL="3200400" algn="l" defTabSz="914400" rtl="0" eaLnBrk="1" latinLnBrk="0" hangingPunct="1">
+              <a:defRPr sz="1800" kern="1200">
+                <a:solidFill>
+                  <a:schemeClr val="lt1"/>
+                </a:solidFill>
+                <a:latin typeface="+mn-lt"/>
+                <a:ea typeface="+mn-ea"/>
+                <a:cs typeface="+mn-cs"/>
+              </a:defRPr>
+            </a:lvl8pPr>
+            <a:lvl9pPr marL="3657600" algn="l" defTabSz="914400" rtl="0" eaLnBrk="1" latinLnBrk="0" hangingPunct="1">
+              <a:defRPr sz="1800" kern="1200">
+                <a:solidFill>
+                  <a:schemeClr val="lt1"/>
+                </a:solidFill>
+                <a:latin typeface="+mn-lt"/>
+                <a:ea typeface="+mn-ea"/>
+                <a:cs typeface="+mn-cs"/>
+              </a:defRPr>
+            </a:lvl9pPr>
+          </a:lstStyle>
+          <a:p>
+            <a:pPr algn="ctr"/>
+            <a:r>
+              <a:rPr lang="en-US" sz="1000">
+                <a:solidFill>
+                  <a:schemeClr val="tx1"/>
+                </a:solidFill>
+              </a:rPr>
+              <a:t>msg:RequestType</a:t>
+            </a:r>
+          </a:p>
+        </p:txBody>
+      </p:sp>
+      <p:sp>
+        <p:nvSpPr>
+          <p:cNvPr id="7" name="Rectangle: Rounded Corners 6">
+            <a:extLst>
+              <a:ext uri="{FF2B5EF4-FFF2-40B4-BE49-F238E27FC236}">
+                <a16:creationId xmlns:a16="http://schemas.microsoft.com/office/drawing/2014/main" id="{BCED2203-DE0D-1846-0CE9-F4656ED976EC}"/>
+              </a:ext>
+            </a:extLst>
+          </p:cNvPr>
+          <p:cNvSpPr/>
+          <p:nvPr/>
+        </p:nvSpPr>
+        <p:spPr>
+          <a:xfrm>
+            <a:off x="3603103" y="1888673"/>
+            <a:ext cx="1141655" cy="405676"/>
+          </a:xfrm>
+          <a:prstGeom prst="roundRect">
+            <a:avLst/>
+          </a:prstGeom>
+          <a:solidFill>
+            <a:srgbClr val="D0B9FF"/>
+          </a:solidFill>
+          <a:ln>
+            <a:solidFill>
+              <a:schemeClr val="tx1"/>
+            </a:solidFill>
+          </a:ln>
+        </p:spPr>
+        <p:style>
+          <a:lnRef idx="2">
+            <a:schemeClr val="accent1">
+              <a:shade val="50000"/>
+            </a:schemeClr>
+          </a:lnRef>
+          <a:fillRef idx="1">
+            <a:schemeClr val="accent1"/>
+          </a:fillRef>
+          <a:effectRef idx="0">
+            <a:schemeClr val="accent1"/>
+          </a:effectRef>
+          <a:fontRef idx="minor">
+            <a:schemeClr val="lt1"/>
+          </a:fontRef>
+        </p:style>
+        <p:txBody>
+          <a:bodyPr rtlCol="0" anchor="ctr"/>
+          <a:lstStyle>
+            <a:defPPr>
+              <a:defRPr lang="en-US"/>
+            </a:defPPr>
+            <a:lvl1pPr marL="0" algn="l" defTabSz="914400" rtl="0" eaLnBrk="1" latinLnBrk="0" hangingPunct="1">
+              <a:defRPr sz="1800" kern="1200">
+                <a:solidFill>
+                  <a:schemeClr val="lt1"/>
+                </a:solidFill>
+                <a:latin typeface="+mn-lt"/>
+                <a:ea typeface="+mn-ea"/>
+                <a:cs typeface="+mn-cs"/>
+              </a:defRPr>
+            </a:lvl1pPr>
+            <a:lvl2pPr marL="457200" algn="l" defTabSz="914400" rtl="0" eaLnBrk="1" latinLnBrk="0" hangingPunct="1">
+              <a:defRPr sz="1800" kern="1200">
+                <a:solidFill>
+                  <a:schemeClr val="lt1"/>
+                </a:solidFill>
+                <a:latin typeface="+mn-lt"/>
+                <a:ea typeface="+mn-ea"/>
+                <a:cs typeface="+mn-cs"/>
+              </a:defRPr>
+            </a:lvl2pPr>
+            <a:lvl3pPr marL="914400" algn="l" defTabSz="914400" rtl="0" eaLnBrk="1" latinLnBrk="0" hangingPunct="1">
+              <a:defRPr sz="1800" kern="1200">
+                <a:solidFill>
+                  <a:schemeClr val="lt1"/>
+                </a:solidFill>
+                <a:latin typeface="+mn-lt"/>
+                <a:ea typeface="+mn-ea"/>
+                <a:cs typeface="+mn-cs"/>
+              </a:defRPr>
+            </a:lvl3pPr>
+            <a:lvl4pPr marL="1371600" algn="l" defTabSz="914400" rtl="0" eaLnBrk="1" latinLnBrk="0" hangingPunct="1">
+              <a:defRPr sz="1800" kern="1200">
+                <a:solidFill>
+                  <a:schemeClr val="lt1"/>
+                </a:solidFill>
+                <a:latin typeface="+mn-lt"/>
+                <a:ea typeface="+mn-ea"/>
+                <a:cs typeface="+mn-cs"/>
+              </a:defRPr>
+            </a:lvl4pPr>
+            <a:lvl5pPr marL="1828800" algn="l" defTabSz="914400" rtl="0" eaLnBrk="1" latinLnBrk="0" hangingPunct="1">
+              <a:defRPr sz="1800" kern="1200">
+                <a:solidFill>
+                  <a:schemeClr val="lt1"/>
+                </a:solidFill>
+                <a:latin typeface="+mn-lt"/>
+                <a:ea typeface="+mn-ea"/>
+                <a:cs typeface="+mn-cs"/>
+              </a:defRPr>
+            </a:lvl5pPr>
+            <a:lvl6pPr marL="2286000" algn="l" defTabSz="914400" rtl="0" eaLnBrk="1" latinLnBrk="0" hangingPunct="1">
+              <a:defRPr sz="1800" kern="1200">
+                <a:solidFill>
+                  <a:schemeClr val="lt1"/>
+                </a:solidFill>
+                <a:latin typeface="+mn-lt"/>
+                <a:ea typeface="+mn-ea"/>
+                <a:cs typeface="+mn-cs"/>
+              </a:defRPr>
+            </a:lvl6pPr>
+            <a:lvl7pPr marL="2743200" algn="l" defTabSz="914400" rtl="0" eaLnBrk="1" latinLnBrk="0" hangingPunct="1">
+              <a:defRPr sz="1800" kern="1200">
+                <a:solidFill>
+                  <a:schemeClr val="lt1"/>
+                </a:solidFill>
+                <a:latin typeface="+mn-lt"/>
+                <a:ea typeface="+mn-ea"/>
+                <a:cs typeface="+mn-cs"/>
+              </a:defRPr>
+            </a:lvl7pPr>
+            <a:lvl8pPr marL="3200400" algn="l" defTabSz="914400" rtl="0" eaLnBrk="1" latinLnBrk="0" hangingPunct="1">
+              <a:defRPr sz="1800" kern="1200">
+                <a:solidFill>
+                  <a:schemeClr val="lt1"/>
+                </a:solidFill>
+                <a:latin typeface="+mn-lt"/>
+                <a:ea typeface="+mn-ea"/>
+                <a:cs typeface="+mn-cs"/>
+              </a:defRPr>
+            </a:lvl8pPr>
+            <a:lvl9pPr marL="3657600" algn="l" defTabSz="914400" rtl="0" eaLnBrk="1" latinLnBrk="0" hangingPunct="1">
+              <a:defRPr sz="1800" kern="1200">
+                <a:solidFill>
+                  <a:schemeClr val="lt1"/>
+                </a:solidFill>
+                <a:latin typeface="+mn-lt"/>
+                <a:ea typeface="+mn-ea"/>
+                <a:cs typeface="+mn-cs"/>
+              </a:defRPr>
+            </a:lvl9pPr>
+          </a:lstStyle>
+          <a:p>
+            <a:pPr algn="ctr"/>
+            <a:r>
+              <a:rPr lang="en-US" sz="1000">
+                <a:solidFill>
+                  <a:schemeClr val="tx1"/>
+                </a:solidFill>
+              </a:rPr>
+              <a:t>nc:ItemType</a:t>
+            </a:r>
+          </a:p>
+        </p:txBody>
+      </p:sp>
+      <p:sp>
+        <p:nvSpPr>
+          <p:cNvPr id="8" name="Rectangle: Rounded Corners 7">
+            <a:extLst>
+              <a:ext uri="{FF2B5EF4-FFF2-40B4-BE49-F238E27FC236}">
+                <a16:creationId xmlns:a16="http://schemas.microsoft.com/office/drawing/2014/main" id="{5869883C-17DD-B042-572D-9DF483F87661}"/>
+              </a:ext>
+            </a:extLst>
+          </p:cNvPr>
+          <p:cNvSpPr/>
+          <p:nvPr/>
+        </p:nvSpPr>
+        <p:spPr>
+          <a:xfrm>
+            <a:off x="3865119" y="3086998"/>
+            <a:ext cx="615456" cy="404603"/>
+          </a:xfrm>
+          <a:prstGeom prst="roundRect">
+            <a:avLst/>
+          </a:prstGeom>
+          <a:solidFill>
+            <a:srgbClr val="F6F256"/>
+          </a:solidFill>
+          <a:ln>
+            <a:solidFill>
+              <a:schemeClr val="tx1"/>
+            </a:solidFill>
+          </a:ln>
+        </p:spPr>
+        <p:style>
+          <a:lnRef idx="2">
+            <a:schemeClr val="accent1">
+              <a:shade val="50000"/>
+            </a:schemeClr>
+          </a:lnRef>
+          <a:fillRef idx="1">
+            <a:schemeClr val="accent1"/>
+          </a:fillRef>
+          <a:effectRef idx="0">
+            <a:schemeClr val="accent1"/>
+          </a:effectRef>
+          <a:fontRef idx="minor">
+            <a:schemeClr val="lt1"/>
+          </a:fontRef>
+        </p:style>
+        <p:txBody>
+          <a:bodyPr rtlCol="0" anchor="ctr"/>
+          <a:lstStyle>
+            <a:defPPr>
+              <a:defRPr lang="en-US"/>
+            </a:defPPr>
+            <a:lvl1pPr marL="0" algn="l" defTabSz="914400" rtl="0" eaLnBrk="1" latinLnBrk="0" hangingPunct="1">
+              <a:defRPr sz="1800" kern="1200">
+                <a:solidFill>
+                  <a:schemeClr val="lt1"/>
+                </a:solidFill>
+                <a:latin typeface="+mn-lt"/>
+                <a:ea typeface="+mn-ea"/>
+                <a:cs typeface="+mn-cs"/>
+              </a:defRPr>
+            </a:lvl1pPr>
+            <a:lvl2pPr marL="457200" algn="l" defTabSz="914400" rtl="0" eaLnBrk="1" latinLnBrk="0" hangingPunct="1">
+              <a:defRPr sz="1800" kern="1200">
+                <a:solidFill>
+                  <a:schemeClr val="lt1"/>
+                </a:solidFill>
+                <a:latin typeface="+mn-lt"/>
+                <a:ea typeface="+mn-ea"/>
+                <a:cs typeface="+mn-cs"/>
+              </a:defRPr>
+            </a:lvl2pPr>
+            <a:lvl3pPr marL="914400" algn="l" defTabSz="914400" rtl="0" eaLnBrk="1" latinLnBrk="0" hangingPunct="1">
+              <a:defRPr sz="1800" kern="1200">
+                <a:solidFill>
+                  <a:schemeClr val="lt1"/>
+                </a:solidFill>
+                <a:latin typeface="+mn-lt"/>
+                <a:ea typeface="+mn-ea"/>
+                <a:cs typeface="+mn-cs"/>
+              </a:defRPr>
+            </a:lvl3pPr>
+            <a:lvl4pPr marL="1371600" algn="l" defTabSz="914400" rtl="0" eaLnBrk="1" latinLnBrk="0" hangingPunct="1">
+              <a:defRPr sz="1800" kern="1200">
+                <a:solidFill>
+                  <a:schemeClr val="lt1"/>
+                </a:solidFill>
+                <a:latin typeface="+mn-lt"/>
+                <a:ea typeface="+mn-ea"/>
+                <a:cs typeface="+mn-cs"/>
+              </a:defRPr>
+            </a:lvl4pPr>
+            <a:lvl5pPr marL="1828800" algn="l" defTabSz="914400" rtl="0" eaLnBrk="1" latinLnBrk="0" hangingPunct="1">
+              <a:defRPr sz="1800" kern="1200">
+                <a:solidFill>
+                  <a:schemeClr val="lt1"/>
+                </a:solidFill>
+                <a:latin typeface="+mn-lt"/>
+                <a:ea typeface="+mn-ea"/>
+                <a:cs typeface="+mn-cs"/>
+              </a:defRPr>
+            </a:lvl5pPr>
+            <a:lvl6pPr marL="2286000" algn="l" defTabSz="914400" rtl="0" eaLnBrk="1" latinLnBrk="0" hangingPunct="1">
+              <a:defRPr sz="1800" kern="1200">
+                <a:solidFill>
+                  <a:schemeClr val="lt1"/>
+                </a:solidFill>
+                <a:latin typeface="+mn-lt"/>
+                <a:ea typeface="+mn-ea"/>
+                <a:cs typeface="+mn-cs"/>
+              </a:defRPr>
+            </a:lvl6pPr>
+            <a:lvl7pPr marL="2743200" algn="l" defTabSz="914400" rtl="0" eaLnBrk="1" latinLnBrk="0" hangingPunct="1">
+              <a:defRPr sz="1800" kern="1200">
+                <a:solidFill>
+                  <a:schemeClr val="lt1"/>
+                </a:solidFill>
+                <a:latin typeface="+mn-lt"/>
+                <a:ea typeface="+mn-ea"/>
+                <a:cs typeface="+mn-cs"/>
+              </a:defRPr>
+            </a:lvl7pPr>
+            <a:lvl8pPr marL="3200400" algn="l" defTabSz="914400" rtl="0" eaLnBrk="1" latinLnBrk="0" hangingPunct="1">
+              <a:defRPr sz="1800" kern="1200">
+                <a:solidFill>
+                  <a:schemeClr val="lt1"/>
+                </a:solidFill>
+                <a:latin typeface="+mn-lt"/>
+                <a:ea typeface="+mn-ea"/>
+                <a:cs typeface="+mn-cs"/>
+              </a:defRPr>
+            </a:lvl8pPr>
+            <a:lvl9pPr marL="3657600" algn="l" defTabSz="914400" rtl="0" eaLnBrk="1" latinLnBrk="0" hangingPunct="1">
+              <a:defRPr sz="1800" kern="1200">
+                <a:solidFill>
+                  <a:schemeClr val="lt1"/>
+                </a:solidFill>
+                <a:latin typeface="+mn-lt"/>
+                <a:ea typeface="+mn-ea"/>
+                <a:cs typeface="+mn-cs"/>
+              </a:defRPr>
+            </a:lvl9pPr>
+          </a:lstStyle>
+          <a:p>
+            <a:pPr algn="ctr">
+              <a:lnSpc>
+                <a:spcPts val="1000"/>
+              </a:lnSpc>
+            </a:pPr>
+            <a:r>
+              <a:rPr lang="en-US" sz="1000" i="1">
+                <a:solidFill>
+                  <a:schemeClr val="tx1"/>
+                </a:solidFill>
+              </a:rPr>
+              <a:t>_:n2</a:t>
+            </a:r>
+          </a:p>
+        </p:txBody>
+      </p:sp>
+      <p:sp>
+        <p:nvSpPr>
+          <p:cNvPr id="9" name="TextBox 8">
+            <a:extLst>
+              <a:ext uri="{FF2B5EF4-FFF2-40B4-BE49-F238E27FC236}">
+                <a16:creationId xmlns:a16="http://schemas.microsoft.com/office/drawing/2014/main" id="{82D83FE2-CBED-2914-79D0-0D4BBCFCCA57}"/>
+              </a:ext>
+            </a:extLst>
+          </p:cNvPr>
+          <p:cNvSpPr txBox="1"/>
+          <p:nvPr/>
+        </p:nvSpPr>
+        <p:spPr>
+          <a:xfrm>
+            <a:off x="2722252" y="3075052"/>
+            <a:ext cx="1121461" cy="246221"/>
+          </a:xfrm>
+          <a:prstGeom prst="rect">
+            <a:avLst/>
+          </a:prstGeom>
+          <a:noFill/>
+        </p:spPr>
+        <p:txBody>
+          <a:bodyPr wrap="none" lIns="45720" rIns="45720" rtlCol="0">
+            <a:spAutoFit/>
+          </a:bodyPr>
+          <a:lstStyle/>
+          <a:p>
+            <a:r>
+              <a:rPr lang="en-US" sz="1000" i="1"/>
+              <a:t>msg:RequestedItem</a:t>
+            </a:r>
+          </a:p>
+        </p:txBody>
+      </p:sp>
+      <p:cxnSp>
+        <p:nvCxnSpPr>
+          <p:cNvPr id="11" name="Straight Arrow Connector 10">
+            <a:extLst>
+              <a:ext uri="{FF2B5EF4-FFF2-40B4-BE49-F238E27FC236}">
+                <a16:creationId xmlns:a16="http://schemas.microsoft.com/office/drawing/2014/main" id="{1E291DC5-24C4-5728-2510-BAF5B1A6F81B}"/>
+              </a:ext>
+            </a:extLst>
+          </p:cNvPr>
+          <p:cNvCxnSpPr>
+            <a:cxnSpLocks/>
+            <a:endCxn id="8" idx="1"/>
+          </p:cNvCxnSpPr>
+          <p:nvPr/>
+        </p:nvCxnSpPr>
+        <p:spPr>
+          <a:xfrm>
+            <a:off x="2708271" y="3289300"/>
+            <a:ext cx="1156848" cy="0"/>
+          </a:xfrm>
+          <a:prstGeom prst="straightConnector1">
+            <a:avLst/>
+          </a:prstGeom>
+          <a:ln>
+            <a:solidFill>
+              <a:schemeClr val="tx1"/>
+            </a:solidFill>
+            <a:tailEnd type="triangle"/>
+          </a:ln>
+        </p:spPr>
+        <p:style>
+          <a:lnRef idx="1">
+            <a:schemeClr val="accent1"/>
+          </a:lnRef>
+          <a:fillRef idx="0">
+            <a:schemeClr val="accent1"/>
+          </a:fillRef>
+          <a:effectRef idx="0">
+            <a:schemeClr val="accent1"/>
+          </a:effectRef>
+          <a:fontRef idx="minor">
+            <a:schemeClr val="tx1"/>
+          </a:fontRef>
+        </p:style>
+      </p:cxnSp>
+      <p:sp>
+        <p:nvSpPr>
+          <p:cNvPr id="13" name="Rectangle 12">
+            <a:extLst>
+              <a:ext uri="{FF2B5EF4-FFF2-40B4-BE49-F238E27FC236}">
+                <a16:creationId xmlns:a16="http://schemas.microsoft.com/office/drawing/2014/main" id="{56783E9F-D615-27A8-EE21-037F448C6358}"/>
+              </a:ext>
+            </a:extLst>
+          </p:cNvPr>
+          <p:cNvSpPr/>
+          <p:nvPr/>
+        </p:nvSpPr>
+        <p:spPr>
+          <a:xfrm>
+            <a:off x="5665684" y="3102969"/>
+            <a:ext cx="615456" cy="389109"/>
+          </a:xfrm>
+          <a:prstGeom prst="rect">
+            <a:avLst/>
+          </a:prstGeom>
+          <a:solidFill>
+            <a:srgbClr val="F6F256"/>
+          </a:solidFill>
+          <a:ln>
+            <a:solidFill>
+              <a:schemeClr val="tx1"/>
+            </a:solidFill>
+          </a:ln>
+        </p:spPr>
+        <p:style>
+          <a:lnRef idx="2">
+            <a:schemeClr val="accent1">
+              <a:shade val="50000"/>
+            </a:schemeClr>
+          </a:lnRef>
+          <a:fillRef idx="1">
+            <a:schemeClr val="accent1"/>
+          </a:fillRef>
+          <a:effectRef idx="0">
+            <a:schemeClr val="accent1"/>
+          </a:effectRef>
+          <a:fontRef idx="minor">
+            <a:schemeClr val="lt1"/>
+          </a:fontRef>
+        </p:style>
+        <p:txBody>
+          <a:bodyPr rtlCol="0" anchor="ctr"/>
+          <a:lstStyle/>
+          <a:p>
+            <a:pPr algn="ctr"/>
+            <a:r>
+              <a:rPr lang="en-US" sz="1000">
+                <a:solidFill>
+                  <a:schemeClr val="tx1"/>
+                </a:solidFill>
+                <a:latin typeface="Consolas" panose="020B0609020204030204" pitchFamily="49" charset="0"/>
+              </a:rPr>
+              <a:t>Wrench</a:t>
+            </a:r>
+          </a:p>
+        </p:txBody>
+      </p:sp>
+      <p:sp>
+        <p:nvSpPr>
+          <p:cNvPr id="14" name="Rectangle 13">
+            <a:extLst>
+              <a:ext uri="{FF2B5EF4-FFF2-40B4-BE49-F238E27FC236}">
+                <a16:creationId xmlns:a16="http://schemas.microsoft.com/office/drawing/2014/main" id="{DA43E6B1-8A8E-19C2-4C35-C605ADDD6632}"/>
+              </a:ext>
+            </a:extLst>
+          </p:cNvPr>
+          <p:cNvSpPr/>
+          <p:nvPr/>
+        </p:nvSpPr>
+        <p:spPr>
+          <a:xfrm>
+            <a:off x="3847153" y="3810898"/>
+            <a:ext cx="615456" cy="389109"/>
+          </a:xfrm>
+          <a:prstGeom prst="rect">
+            <a:avLst/>
+          </a:prstGeom>
+          <a:solidFill>
+            <a:srgbClr val="F6F256"/>
+          </a:solidFill>
+          <a:ln>
+            <a:solidFill>
+              <a:schemeClr val="tx1"/>
+            </a:solidFill>
+          </a:ln>
+        </p:spPr>
+        <p:style>
+          <a:lnRef idx="2">
+            <a:schemeClr val="accent1">
+              <a:shade val="50000"/>
+            </a:schemeClr>
+          </a:lnRef>
+          <a:fillRef idx="1">
+            <a:schemeClr val="accent1"/>
+          </a:fillRef>
+          <a:effectRef idx="0">
+            <a:schemeClr val="accent1"/>
+          </a:effectRef>
+          <a:fontRef idx="minor">
+            <a:schemeClr val="lt1"/>
+          </a:fontRef>
+        </p:style>
+        <p:txBody>
+          <a:bodyPr rtlCol="0" anchor="ctr"/>
+          <a:lstStyle/>
+          <a:p>
+            <a:pPr algn="ctr"/>
+            <a:r>
+              <a:rPr lang="en-US" sz="1000">
+                <a:solidFill>
+                  <a:schemeClr val="tx1"/>
+                </a:solidFill>
+                <a:latin typeface="Consolas" panose="020B0609020204030204" pitchFamily="49" charset="0"/>
+              </a:rPr>
+              <a:t>RQ001</a:t>
+            </a:r>
+          </a:p>
+        </p:txBody>
+      </p:sp>
+      <p:sp>
+        <p:nvSpPr>
+          <p:cNvPr id="15" name="Rectangle 14">
+            <a:extLst>
+              <a:ext uri="{FF2B5EF4-FFF2-40B4-BE49-F238E27FC236}">
+                <a16:creationId xmlns:a16="http://schemas.microsoft.com/office/drawing/2014/main" id="{3665BC90-44C5-2C71-8E3C-6018C5CF1C8E}"/>
+              </a:ext>
+            </a:extLst>
+          </p:cNvPr>
+          <p:cNvSpPr/>
+          <p:nvPr/>
+        </p:nvSpPr>
+        <p:spPr>
+          <a:xfrm>
+            <a:off x="5665684" y="3799595"/>
+            <a:ext cx="615456" cy="389109"/>
+          </a:xfrm>
+          <a:prstGeom prst="rect">
+            <a:avLst/>
+          </a:prstGeom>
+          <a:solidFill>
+            <a:srgbClr val="F6F256"/>
+          </a:solidFill>
+          <a:ln>
+            <a:solidFill>
+              <a:schemeClr val="tx1"/>
+            </a:solidFill>
+          </a:ln>
+        </p:spPr>
+        <p:style>
+          <a:lnRef idx="2">
+            <a:schemeClr val="accent1">
+              <a:shade val="50000"/>
+            </a:schemeClr>
+          </a:lnRef>
+          <a:fillRef idx="1">
+            <a:schemeClr val="accent1"/>
+          </a:fillRef>
+          <a:effectRef idx="0">
+            <a:schemeClr val="accent1"/>
+          </a:effectRef>
+          <a:fontRef idx="minor">
+            <a:schemeClr val="lt1"/>
+          </a:fontRef>
+        </p:style>
+        <p:txBody>
+          <a:bodyPr rtlCol="0" anchor="ctr"/>
+          <a:lstStyle/>
+          <a:p>
+            <a:pPr algn="ctr"/>
+            <a:r>
+              <a:rPr lang="en-US" sz="1000">
+                <a:solidFill>
+                  <a:schemeClr val="tx1"/>
+                </a:solidFill>
+                <a:latin typeface="Consolas" panose="020B0609020204030204" pitchFamily="49" charset="0"/>
+              </a:rPr>
+              <a:t>10</a:t>
+            </a:r>
+          </a:p>
+        </p:txBody>
+      </p:sp>
+      <p:cxnSp>
+        <p:nvCxnSpPr>
+          <p:cNvPr id="17" name="Straight Arrow Connector 16">
+            <a:extLst>
+              <a:ext uri="{FF2B5EF4-FFF2-40B4-BE49-F238E27FC236}">
+                <a16:creationId xmlns:a16="http://schemas.microsoft.com/office/drawing/2014/main" id="{0D2FEBFF-A2C8-C76F-B589-F6F29D6037D1}"/>
+              </a:ext>
+            </a:extLst>
+          </p:cNvPr>
+          <p:cNvCxnSpPr>
+            <a:cxnSpLocks/>
+          </p:cNvCxnSpPr>
+          <p:nvPr/>
+        </p:nvCxnSpPr>
+        <p:spPr>
+          <a:xfrm>
+            <a:off x="4461300" y="3287902"/>
+            <a:ext cx="1204384" cy="9622"/>
+          </a:xfrm>
+          <a:prstGeom prst="straightConnector1">
+            <a:avLst/>
+          </a:prstGeom>
+          <a:ln>
+            <a:solidFill>
+              <a:schemeClr val="tx1"/>
+            </a:solidFill>
+            <a:tailEnd type="triangle"/>
+          </a:ln>
+        </p:spPr>
+        <p:style>
+          <a:lnRef idx="1">
+            <a:schemeClr val="accent1"/>
+          </a:lnRef>
+          <a:fillRef idx="0">
+            <a:schemeClr val="accent1"/>
+          </a:fillRef>
+          <a:effectRef idx="0">
+            <a:schemeClr val="accent1"/>
+          </a:effectRef>
+          <a:fontRef idx="minor">
+            <a:schemeClr val="tx1"/>
+          </a:fontRef>
+        </p:style>
+      </p:cxnSp>
+      <p:sp>
+        <p:nvSpPr>
+          <p:cNvPr id="18" name="TextBox 17">
+            <a:extLst>
+              <a:ext uri="{FF2B5EF4-FFF2-40B4-BE49-F238E27FC236}">
+                <a16:creationId xmlns:a16="http://schemas.microsoft.com/office/drawing/2014/main" id="{1F3B606A-A727-B4A0-F34F-98EC0470782A}"/>
+              </a:ext>
+            </a:extLst>
+          </p:cNvPr>
+          <p:cNvSpPr txBox="1"/>
+          <p:nvPr/>
+        </p:nvSpPr>
+        <p:spPr>
+          <a:xfrm>
+            <a:off x="4625608" y="3075052"/>
+            <a:ext cx="885179" cy="246221"/>
+          </a:xfrm>
+          <a:prstGeom prst="rect">
+            <a:avLst/>
+          </a:prstGeom>
+          <a:noFill/>
+        </p:spPr>
+        <p:txBody>
+          <a:bodyPr wrap="none" rtlCol="0">
+            <a:spAutoFit/>
+          </a:bodyPr>
+          <a:lstStyle/>
+          <a:p>
+            <a:r>
+              <a:rPr lang="en-US" sz="1000" i="1"/>
+              <a:t>nc:ItemName</a:t>
+            </a:r>
+          </a:p>
+        </p:txBody>
+      </p:sp>
+      <p:sp>
+        <p:nvSpPr>
+          <p:cNvPr id="25" name="Arc 24">
+            <a:extLst>
+              <a:ext uri="{FF2B5EF4-FFF2-40B4-BE49-F238E27FC236}">
+                <a16:creationId xmlns:a16="http://schemas.microsoft.com/office/drawing/2014/main" id="{B0321AAD-94F7-D86C-39C8-040B82BDF3F3}"/>
+              </a:ext>
+            </a:extLst>
+          </p:cNvPr>
+          <p:cNvSpPr/>
+          <p:nvPr/>
+        </p:nvSpPr>
+        <p:spPr>
+          <a:xfrm flipH="1">
+            <a:off x="2354902" y="2832100"/>
+            <a:ext cx="2794947" cy="1136650"/>
+          </a:xfrm>
+          <a:prstGeom prst="arc">
+            <a:avLst>
+              <a:gd name="adj1" fmla="val 326439"/>
+              <a:gd name="adj2" fmla="val 5890037"/>
+            </a:avLst>
+          </a:prstGeom>
+          <a:ln>
+            <a:solidFill>
+              <a:schemeClr val="tx1"/>
+            </a:solidFill>
+            <a:tailEnd type="triangle"/>
+          </a:ln>
+        </p:spPr>
+        <p:style>
+          <a:lnRef idx="1">
+            <a:schemeClr val="accent1"/>
+          </a:lnRef>
+          <a:fillRef idx="0">
+            <a:schemeClr val="accent1"/>
+          </a:fillRef>
+          <a:effectRef idx="0">
+            <a:schemeClr val="accent1"/>
+          </a:effectRef>
+          <a:fontRef idx="minor">
+            <a:schemeClr val="tx1"/>
+          </a:fontRef>
+        </p:style>
+        <p:txBody>
+          <a:bodyPr rtlCol="0" anchor="ctr"/>
+          <a:lstStyle/>
+          <a:p>
+            <a:pPr algn="ctr"/>
+            <a:endParaRPr lang="en-US"/>
+          </a:p>
+        </p:txBody>
+      </p:sp>
+      <p:sp>
+        <p:nvSpPr>
+          <p:cNvPr id="27" name="Arc 26">
+            <a:extLst>
+              <a:ext uri="{FF2B5EF4-FFF2-40B4-BE49-F238E27FC236}">
+                <a16:creationId xmlns:a16="http://schemas.microsoft.com/office/drawing/2014/main" id="{5829B7D9-7DCC-CD83-64E9-6B359DAF3CFC}"/>
+              </a:ext>
+            </a:extLst>
+          </p:cNvPr>
+          <p:cNvSpPr/>
+          <p:nvPr/>
+        </p:nvSpPr>
+        <p:spPr>
+          <a:xfrm flipH="1">
+            <a:off x="4183481" y="2851150"/>
+            <a:ext cx="2794947" cy="1136650"/>
+          </a:xfrm>
+          <a:prstGeom prst="arc">
+            <a:avLst>
+              <a:gd name="adj1" fmla="val 326439"/>
+              <a:gd name="adj2" fmla="val 5890037"/>
+            </a:avLst>
+          </a:prstGeom>
+          <a:ln>
+            <a:solidFill>
+              <a:schemeClr val="tx1"/>
+            </a:solidFill>
+            <a:tailEnd type="triangle"/>
+          </a:ln>
+        </p:spPr>
+        <p:style>
+          <a:lnRef idx="1">
+            <a:schemeClr val="accent1"/>
+          </a:lnRef>
+          <a:fillRef idx="0">
+            <a:schemeClr val="accent1"/>
+          </a:fillRef>
+          <a:effectRef idx="0">
+            <a:schemeClr val="accent1"/>
+          </a:effectRef>
+          <a:fontRef idx="minor">
+            <a:schemeClr val="tx1"/>
+          </a:fontRef>
+        </p:style>
+        <p:txBody>
+          <a:bodyPr rtlCol="0" anchor="ctr"/>
+          <a:lstStyle/>
+          <a:p>
+            <a:pPr algn="ctr"/>
+            <a:endParaRPr lang="en-US"/>
+          </a:p>
+        </p:txBody>
+      </p:sp>
+      <p:sp>
+        <p:nvSpPr>
+          <p:cNvPr id="28" name="TextBox 27">
+            <a:extLst>
+              <a:ext uri="{FF2B5EF4-FFF2-40B4-BE49-F238E27FC236}">
+                <a16:creationId xmlns:a16="http://schemas.microsoft.com/office/drawing/2014/main" id="{758A03CB-F9B9-D488-0972-4C34F6DC77C2}"/>
+              </a:ext>
+            </a:extLst>
+          </p:cNvPr>
+          <p:cNvSpPr txBox="1"/>
+          <p:nvPr/>
+        </p:nvSpPr>
+        <p:spPr>
+          <a:xfrm>
+            <a:off x="4645806" y="3738077"/>
+            <a:ext cx="844783" cy="153888"/>
+          </a:xfrm>
+          <a:prstGeom prst="rect">
+            <a:avLst/>
+          </a:prstGeom>
+          <a:solidFill>
+            <a:schemeClr val="bg1"/>
+          </a:solidFill>
+        </p:spPr>
+        <p:txBody>
+          <a:bodyPr wrap="none" lIns="0" tIns="0" rIns="0" bIns="0" rtlCol="0">
+            <a:spAutoFit/>
+          </a:bodyPr>
+          <a:lstStyle/>
+          <a:p>
+            <a:r>
+              <a:rPr lang="en-US" sz="1000" i="1"/>
+              <a:t>nc:ItemQuantity</a:t>
+            </a:r>
+          </a:p>
+        </p:txBody>
+      </p:sp>
+      <p:sp>
+        <p:nvSpPr>
+          <p:cNvPr id="29" name="TextBox 28">
+            <a:extLst>
+              <a:ext uri="{FF2B5EF4-FFF2-40B4-BE49-F238E27FC236}">
+                <a16:creationId xmlns:a16="http://schemas.microsoft.com/office/drawing/2014/main" id="{FB0D4BAA-FC56-CF69-1004-BCD24A01AC45}"/>
+              </a:ext>
+            </a:extLst>
+          </p:cNvPr>
+          <p:cNvSpPr txBox="1"/>
+          <p:nvPr/>
+        </p:nvSpPr>
+        <p:spPr>
+          <a:xfrm>
+            <a:off x="2895056" y="3733954"/>
+            <a:ext cx="775853" cy="153888"/>
+          </a:xfrm>
+          <a:prstGeom prst="rect">
+            <a:avLst/>
+          </a:prstGeom>
+          <a:solidFill>
+            <a:schemeClr val="bg1"/>
+          </a:solidFill>
+        </p:spPr>
+        <p:txBody>
+          <a:bodyPr wrap="none" lIns="0" tIns="0" rIns="0" bIns="0" rtlCol="0">
+            <a:spAutoFit/>
+          </a:bodyPr>
+          <a:lstStyle/>
+          <a:p>
+            <a:r>
+              <a:rPr lang="en-US" sz="1000" i="1"/>
+              <a:t>msg:RequestID</a:t>
+            </a:r>
+          </a:p>
+        </p:txBody>
+      </p:sp>
+      <p:cxnSp>
+        <p:nvCxnSpPr>
+          <p:cNvPr id="32" name="Straight Arrow Connector 31">
+            <a:extLst>
+              <a:ext uri="{FF2B5EF4-FFF2-40B4-BE49-F238E27FC236}">
+                <a16:creationId xmlns:a16="http://schemas.microsoft.com/office/drawing/2014/main" id="{35272B3B-894C-F8E6-84A4-30F0B5967D0B}"/>
+              </a:ext>
+            </a:extLst>
+          </p:cNvPr>
+          <p:cNvCxnSpPr>
+            <a:cxnSpLocks/>
+            <a:stCxn id="5" idx="0"/>
+            <a:endCxn id="6" idx="2"/>
+          </p:cNvCxnSpPr>
+          <p:nvPr/>
+        </p:nvCxnSpPr>
+        <p:spPr>
+          <a:xfrm flipH="1" flipV="1">
+            <a:off x="2381923" y="2294349"/>
+            <a:ext cx="224" cy="792649"/>
+          </a:xfrm>
+          <a:prstGeom prst="straightConnector1">
+            <a:avLst/>
+          </a:prstGeom>
+          <a:ln>
+            <a:solidFill>
+              <a:schemeClr val="tx1"/>
+            </a:solidFill>
+            <a:tailEnd type="triangle"/>
+          </a:ln>
+        </p:spPr>
+        <p:style>
+          <a:lnRef idx="1">
+            <a:schemeClr val="accent1"/>
+          </a:lnRef>
+          <a:fillRef idx="0">
+            <a:schemeClr val="accent1"/>
+          </a:fillRef>
+          <a:effectRef idx="0">
+            <a:schemeClr val="accent1"/>
+          </a:effectRef>
+          <a:fontRef idx="minor">
+            <a:schemeClr val="tx1"/>
+          </a:fontRef>
+        </p:style>
+      </p:cxnSp>
+      <p:cxnSp>
+        <p:nvCxnSpPr>
+          <p:cNvPr id="34" name="Straight Arrow Connector 33">
+            <a:extLst>
+              <a:ext uri="{FF2B5EF4-FFF2-40B4-BE49-F238E27FC236}">
+                <a16:creationId xmlns:a16="http://schemas.microsoft.com/office/drawing/2014/main" id="{F993EB14-00A7-B7EF-A0CE-1342FE506A83}"/>
+              </a:ext>
+            </a:extLst>
+          </p:cNvPr>
+          <p:cNvCxnSpPr>
+            <a:cxnSpLocks/>
+            <a:stCxn id="8" idx="0"/>
+            <a:endCxn id="7" idx="2"/>
+          </p:cNvCxnSpPr>
+          <p:nvPr/>
+        </p:nvCxnSpPr>
+        <p:spPr>
+          <a:xfrm flipV="1">
+            <a:off x="4172847" y="2294349"/>
+            <a:ext cx="1084" cy="792649"/>
+          </a:xfrm>
+          <a:prstGeom prst="straightConnector1">
+            <a:avLst/>
+          </a:prstGeom>
+          <a:ln>
+            <a:solidFill>
+              <a:schemeClr val="tx1"/>
+            </a:solidFill>
+            <a:tailEnd type="triangle"/>
+          </a:ln>
+        </p:spPr>
+        <p:style>
+          <a:lnRef idx="1">
+            <a:schemeClr val="accent1"/>
+          </a:lnRef>
+          <a:fillRef idx="0">
+            <a:schemeClr val="accent1"/>
+          </a:fillRef>
+          <a:effectRef idx="0">
+            <a:schemeClr val="accent1"/>
+          </a:effectRef>
+          <a:fontRef idx="minor">
+            <a:schemeClr val="tx1"/>
+          </a:fontRef>
+        </p:style>
+      </p:cxnSp>
+      <p:sp>
+        <p:nvSpPr>
+          <p:cNvPr id="38" name="TextBox 37">
+            <a:extLst>
+              <a:ext uri="{FF2B5EF4-FFF2-40B4-BE49-F238E27FC236}">
+                <a16:creationId xmlns:a16="http://schemas.microsoft.com/office/drawing/2014/main" id="{21D97E23-81C9-8985-EC1D-57C1E125FE3E}"/>
+              </a:ext>
+            </a:extLst>
+          </p:cNvPr>
+          <p:cNvSpPr txBox="1"/>
+          <p:nvPr/>
+        </p:nvSpPr>
+        <p:spPr>
+          <a:xfrm>
+            <a:off x="3969547" y="2611325"/>
+            <a:ext cx="408766" cy="153888"/>
+          </a:xfrm>
+          <a:prstGeom prst="rect">
+            <a:avLst/>
+          </a:prstGeom>
+          <a:solidFill>
+            <a:schemeClr val="bg1"/>
+          </a:solidFill>
+        </p:spPr>
+        <p:txBody>
+          <a:bodyPr wrap="none" lIns="0" tIns="0" rIns="0" bIns="0" rtlCol="0">
+            <a:spAutoFit/>
+          </a:bodyPr>
+          <a:lstStyle/>
+          <a:p>
+            <a:r>
+              <a:rPr lang="en-US" sz="1000" i="1"/>
+              <a:t>rdf:type</a:t>
+            </a:r>
+          </a:p>
+        </p:txBody>
+      </p:sp>
+      <p:sp>
+        <p:nvSpPr>
+          <p:cNvPr id="39" name="TextBox 38">
+            <a:extLst>
+              <a:ext uri="{FF2B5EF4-FFF2-40B4-BE49-F238E27FC236}">
+                <a16:creationId xmlns:a16="http://schemas.microsoft.com/office/drawing/2014/main" id="{90B3A32A-E05F-ACF4-8DD1-F7B90205429F}"/>
+              </a:ext>
+            </a:extLst>
+          </p:cNvPr>
+          <p:cNvSpPr txBox="1"/>
+          <p:nvPr/>
+        </p:nvSpPr>
+        <p:spPr>
+          <a:xfrm>
+            <a:off x="2177539" y="2611325"/>
+            <a:ext cx="408766" cy="153888"/>
+          </a:xfrm>
+          <a:prstGeom prst="rect">
+            <a:avLst/>
+          </a:prstGeom>
+          <a:solidFill>
+            <a:schemeClr val="bg1"/>
+          </a:solidFill>
+        </p:spPr>
+        <p:txBody>
+          <a:bodyPr wrap="none" lIns="0" tIns="0" rIns="0" bIns="0" rtlCol="0">
+            <a:spAutoFit/>
+          </a:bodyPr>
+          <a:lstStyle/>
+          <a:p>
+            <a:r>
+              <a:rPr lang="en-US" sz="1000" i="1"/>
+              <a:t>rdf:type</a:t>
+            </a:r>
+          </a:p>
+        </p:txBody>
+      </p:sp>
+    </p:spTree>
+    <p:extLst>
+      <p:ext uri="{BB962C8B-B14F-4D97-AF65-F5344CB8AC3E}">
+        <p14:creationId xmlns:p14="http://schemas.microsoft.com/office/powerpoint/2010/main" val="2947545472"/>
+      </p:ext>
+    </p:extLst>
+  </p:cSld>
+  <p:clrMapOvr>
+    <a:masterClrMapping/>
+  </p:clrMapOvr>
+</p:sld>
+</file>
+
+<file path=ppt/slides/slide7.xml><?xml version="1.0" encoding="utf-8"?>
 <p:sld xmlns:a="http://schemas.openxmlformats.org/drawingml/2006/main" xmlns:r="http://schemas.openxmlformats.org/officeDocument/2006/relationships" xmlns:p="http://schemas.openxmlformats.org/presentationml/2006/main">
   <p:cSld>
     <p:spTree>
@@ -29927,7 +31500,7 @@
           <a:p>
             <a:fld id="{BECF63ED-5365-0347-943C-46237B9951C9}" type="slidenum">
               <a:rPr lang="en-US" sz="1000" smtClean="0"/>
-              <a:t>6</a:t>
+              <a:t>7</a:t>
             </a:fld>
             <a:endParaRPr lang="en-US" sz="1000"/>
           </a:p>

</xml_diff>

<commit_message>
22 December 2024 draft
</commit_message>
<xml_diff>
--- a/pptx/figures.pptx
+++ b/pptx/figures.pptx
@@ -12,6 +12,7 @@
     <p:sldId id="277" r:id="rId6"/>
     <p:sldId id="280" r:id="rId7"/>
     <p:sldId id="278" r:id="rId8"/>
+    <p:sldId id="281" r:id="rId9"/>
   </p:sldIdLst>
   <p:sldSz cx="12192000" cy="6858000"/>
   <p:notesSz cx="6858000" cy="9144000"/>
@@ -276,7 +277,7 @@
           <a:p>
             <a:fld id="{8B6844D7-9723-4963-9A7A-AA67393D1570}" type="datetimeFigureOut">
               <a:rPr lang="en-US" smtClean="0"/>
-              <a:t>11/13/2024</a:t>
+              <a:t>12/22/2024</a:t>
             </a:fld>
             <a:endParaRPr lang="en-US"/>
           </a:p>
@@ -474,7 +475,7 @@
           <a:p>
             <a:fld id="{8B6844D7-9723-4963-9A7A-AA67393D1570}" type="datetimeFigureOut">
               <a:rPr lang="en-US" smtClean="0"/>
-              <a:t>11/13/2024</a:t>
+              <a:t>12/22/2024</a:t>
             </a:fld>
             <a:endParaRPr lang="en-US"/>
           </a:p>
@@ -682,7 +683,7 @@
           <a:p>
             <a:fld id="{8B6844D7-9723-4963-9A7A-AA67393D1570}" type="datetimeFigureOut">
               <a:rPr lang="en-US" smtClean="0"/>
-              <a:t>11/13/2024</a:t>
+              <a:t>12/22/2024</a:t>
             </a:fld>
             <a:endParaRPr lang="en-US"/>
           </a:p>
@@ -880,7 +881,7 @@
           <a:p>
             <a:fld id="{8B6844D7-9723-4963-9A7A-AA67393D1570}" type="datetimeFigureOut">
               <a:rPr lang="en-US" smtClean="0"/>
-              <a:t>11/13/2024</a:t>
+              <a:t>12/22/2024</a:t>
             </a:fld>
             <a:endParaRPr lang="en-US"/>
           </a:p>
@@ -1155,7 +1156,7 @@
           <a:p>
             <a:fld id="{8B6844D7-9723-4963-9A7A-AA67393D1570}" type="datetimeFigureOut">
               <a:rPr lang="en-US" smtClean="0"/>
-              <a:t>11/13/2024</a:t>
+              <a:t>12/22/2024</a:t>
             </a:fld>
             <a:endParaRPr lang="en-US"/>
           </a:p>
@@ -1420,7 +1421,7 @@
           <a:p>
             <a:fld id="{8B6844D7-9723-4963-9A7A-AA67393D1570}" type="datetimeFigureOut">
               <a:rPr lang="en-US" smtClean="0"/>
-              <a:t>11/13/2024</a:t>
+              <a:t>12/22/2024</a:t>
             </a:fld>
             <a:endParaRPr lang="en-US"/>
           </a:p>
@@ -1832,7 +1833,7 @@
           <a:p>
             <a:fld id="{8B6844D7-9723-4963-9A7A-AA67393D1570}" type="datetimeFigureOut">
               <a:rPr lang="en-US" smtClean="0"/>
-              <a:t>11/13/2024</a:t>
+              <a:t>12/22/2024</a:t>
             </a:fld>
             <a:endParaRPr lang="en-US"/>
           </a:p>
@@ -1973,7 +1974,7 @@
           <a:p>
             <a:fld id="{8B6844D7-9723-4963-9A7A-AA67393D1570}" type="datetimeFigureOut">
               <a:rPr lang="en-US" smtClean="0"/>
-              <a:t>11/13/2024</a:t>
+              <a:t>12/22/2024</a:t>
             </a:fld>
             <a:endParaRPr lang="en-US"/>
           </a:p>
@@ -2086,7 +2087,7 @@
           <a:p>
             <a:fld id="{8B6844D7-9723-4963-9A7A-AA67393D1570}" type="datetimeFigureOut">
               <a:rPr lang="en-US" smtClean="0"/>
-              <a:t>11/13/2024</a:t>
+              <a:t>12/22/2024</a:t>
             </a:fld>
             <a:endParaRPr lang="en-US"/>
           </a:p>
@@ -2397,7 +2398,7 @@
           <a:p>
             <a:fld id="{8B6844D7-9723-4963-9A7A-AA67393D1570}" type="datetimeFigureOut">
               <a:rPr lang="en-US" smtClean="0"/>
-              <a:t>11/13/2024</a:t>
+              <a:t>12/22/2024</a:t>
             </a:fld>
             <a:endParaRPr lang="en-US"/>
           </a:p>
@@ -2685,7 +2686,7 @@
           <a:p>
             <a:fld id="{8B6844D7-9723-4963-9A7A-AA67393D1570}" type="datetimeFigureOut">
               <a:rPr lang="en-US" smtClean="0"/>
-              <a:t>11/13/2024</a:t>
+              <a:t>12/22/2024</a:t>
             </a:fld>
             <a:endParaRPr lang="en-US"/>
           </a:p>
@@ -2926,7 +2927,7 @@
           <a:p>
             <a:fld id="{8B6844D7-9723-4963-9A7A-AA67393D1570}" type="datetimeFigureOut">
               <a:rPr lang="en-US" smtClean="0"/>
-              <a:t>11/13/2024</a:t>
+              <a:t>12/22/2024</a:t>
             </a:fld>
             <a:endParaRPr lang="en-US"/>
           </a:p>
@@ -4188,12 +4189,12 @@
           <a:graphicData uri="http://schemas.openxmlformats.org/presentationml/2006/ole">
             <mc:AlternateContent xmlns:mc="http://schemas.openxmlformats.org/markup-compatibility/2006">
               <mc:Choice xmlns:v="urn:schemas-microsoft-com:vml" Requires="v">
-                <p:oleObj name="Clip" r:id="rId4" imgW="944280" imgH="1180440" progId="MS_ClipArt_Gallery.2">
+                <p:oleObj name="Clip" r:id="rId2" imgW="944280" imgH="1180440" progId="MS_ClipArt_Gallery.2">
                   <p:embed/>
                 </p:oleObj>
               </mc:Choice>
               <mc:Fallback>
-                <p:oleObj name="Clip" r:id="rId4" imgW="944280" imgH="1180440" progId="MS_ClipArt_Gallery.2">
+                <p:oleObj name="Clip" r:id="rId2" imgW="944280" imgH="1180440" progId="MS_ClipArt_Gallery.2">
                   <p:embed/>
                   <p:pic>
                     <p:nvPicPr>
@@ -12282,7 +12283,7 @@
           <p:nvPr/>
         </p:nvPicPr>
         <p:blipFill>
-          <a:blip r:embed="rId5" cstate="print"/>
+          <a:blip r:embed="rId4" cstate="print"/>
           <a:srcRect/>
           <a:stretch>
             <a:fillRect/>
@@ -12395,7 +12396,7 @@
           <p:nvPr/>
         </p:nvPicPr>
         <p:blipFill>
-          <a:blip r:embed="rId5" cstate="print"/>
+          <a:blip r:embed="rId4" cstate="print"/>
           <a:srcRect/>
           <a:stretch>
             <a:fillRect/>
@@ -13449,12 +13450,12 @@
           <a:graphicData uri="http://schemas.openxmlformats.org/presentationml/2006/ole">
             <mc:AlternateContent xmlns:mc="http://schemas.openxmlformats.org/markup-compatibility/2006">
               <mc:Choice xmlns:v="urn:schemas-microsoft-com:vml" Requires="v">
-                <p:oleObj name="Clip" r:id="rId4" imgW="944280" imgH="1180440" progId="MS_ClipArt_Gallery.2">
+                <p:oleObj name="Clip" r:id="rId2" imgW="944280" imgH="1180440" progId="MS_ClipArt_Gallery.2">
                   <p:embed/>
                 </p:oleObj>
               </mc:Choice>
               <mc:Fallback>
-                <p:oleObj name="Clip" r:id="rId4" imgW="944280" imgH="1180440" progId="MS_ClipArt_Gallery.2">
+                <p:oleObj name="Clip" r:id="rId2" imgW="944280" imgH="1180440" progId="MS_ClipArt_Gallery.2">
                   <p:embed/>
                   <p:pic>
                     <p:nvPicPr>
@@ -32835,6 +32836,1235 @@
 </p:sld>
 </file>
 
+<file path=ppt/slides/slide8.xml><?xml version="1.0" encoding="utf-8"?>
+<p:sld xmlns:a="http://schemas.openxmlformats.org/drawingml/2006/main" xmlns:r="http://schemas.openxmlformats.org/officeDocument/2006/relationships" xmlns:p="http://schemas.openxmlformats.org/presentationml/2006/main">
+  <p:cSld>
+    <p:spTree>
+      <p:nvGrpSpPr>
+        <p:cNvPr id="1" name=""/>
+        <p:cNvGrpSpPr/>
+        <p:nvPr/>
+      </p:nvGrpSpPr>
+      <p:grpSpPr>
+        <a:xfrm>
+          <a:off x="0" y="0"/>
+          <a:ext cx="0" cy="0"/>
+          <a:chOff x="0" y="0"/>
+          <a:chExt cx="0" cy="0"/>
+        </a:xfrm>
+      </p:grpSpPr>
+      <p:sp>
+        <p:nvSpPr>
+          <p:cNvPr id="14" name="Rectangle: Rounded Corners 13">
+            <a:extLst>
+              <a:ext uri="{FF2B5EF4-FFF2-40B4-BE49-F238E27FC236}">
+                <a16:creationId xmlns:a16="http://schemas.microsoft.com/office/drawing/2014/main" id="{97E06360-B687-1FE4-5E74-E44519A50AF6}"/>
+              </a:ext>
+            </a:extLst>
+          </p:cNvPr>
+          <p:cNvSpPr/>
+          <p:nvPr/>
+        </p:nvSpPr>
+        <p:spPr>
+          <a:xfrm>
+            <a:off x="1864190" y="2990218"/>
+            <a:ext cx="2612468" cy="591182"/>
+          </a:xfrm>
+          <a:prstGeom prst="roundRect">
+            <a:avLst/>
+          </a:prstGeom>
+          <a:solidFill>
+            <a:schemeClr val="accent4">
+              <a:lumMod val="20000"/>
+              <a:lumOff val="80000"/>
+            </a:schemeClr>
+          </a:solidFill>
+          <a:ln>
+            <a:solidFill>
+              <a:schemeClr val="tx1"/>
+            </a:solidFill>
+          </a:ln>
+        </p:spPr>
+        <p:style>
+          <a:lnRef idx="2">
+            <a:schemeClr val="accent1">
+              <a:shade val="15000"/>
+            </a:schemeClr>
+          </a:lnRef>
+          <a:fillRef idx="1">
+            <a:schemeClr val="accent1"/>
+          </a:fillRef>
+          <a:effectRef idx="0">
+            <a:schemeClr val="accent1"/>
+          </a:effectRef>
+          <a:fontRef idx="minor">
+            <a:schemeClr val="lt1"/>
+          </a:fontRef>
+        </p:style>
+        <p:txBody>
+          <a:bodyPr lIns="91440" tIns="91440" rIns="91440" bIns="91440" rtlCol="0" anchor="ctr"/>
+          <a:lstStyle/>
+          <a:p>
+            <a:pPr algn="ctr"/>
+            <a:endParaRPr lang="en-US" sz="1000">
+              <a:solidFill>
+                <a:schemeClr val="tx1"/>
+              </a:solidFill>
+            </a:endParaRPr>
+          </a:p>
+        </p:txBody>
+      </p:sp>
+      <p:sp>
+        <p:nvSpPr>
+          <p:cNvPr id="2" name="Rectangle: Rounded Corners 1">
+            <a:extLst>
+              <a:ext uri="{FF2B5EF4-FFF2-40B4-BE49-F238E27FC236}">
+                <a16:creationId xmlns:a16="http://schemas.microsoft.com/office/drawing/2014/main" id="{1B40EF4B-2016-8E91-C592-987F6AE4A194}"/>
+              </a:ext>
+            </a:extLst>
+          </p:cNvPr>
+          <p:cNvSpPr/>
+          <p:nvPr/>
+        </p:nvSpPr>
+        <p:spPr>
+          <a:xfrm>
+            <a:off x="1957409" y="3086998"/>
+            <a:ext cx="615456" cy="404603"/>
+          </a:xfrm>
+          <a:prstGeom prst="roundRect">
+            <a:avLst/>
+          </a:prstGeom>
+          <a:solidFill>
+            <a:srgbClr val="F6F256"/>
+          </a:solidFill>
+          <a:ln>
+            <a:solidFill>
+              <a:schemeClr val="tx1"/>
+            </a:solidFill>
+          </a:ln>
+        </p:spPr>
+        <p:style>
+          <a:lnRef idx="2">
+            <a:schemeClr val="accent1">
+              <a:shade val="50000"/>
+            </a:schemeClr>
+          </a:lnRef>
+          <a:fillRef idx="1">
+            <a:schemeClr val="accent1"/>
+          </a:fillRef>
+          <a:effectRef idx="0">
+            <a:schemeClr val="accent1"/>
+          </a:effectRef>
+          <a:fontRef idx="minor">
+            <a:schemeClr val="lt1"/>
+          </a:fontRef>
+        </p:style>
+        <p:txBody>
+          <a:bodyPr rtlCol="0" anchor="ctr"/>
+          <a:lstStyle>
+            <a:defPPr>
+              <a:defRPr lang="en-US"/>
+            </a:defPPr>
+            <a:lvl1pPr marL="0" algn="l" defTabSz="914400" rtl="0" eaLnBrk="1" latinLnBrk="0" hangingPunct="1">
+              <a:defRPr sz="1800" kern="1200">
+                <a:solidFill>
+                  <a:schemeClr val="lt1"/>
+                </a:solidFill>
+                <a:latin typeface="+mn-lt"/>
+                <a:ea typeface="+mn-ea"/>
+                <a:cs typeface="+mn-cs"/>
+              </a:defRPr>
+            </a:lvl1pPr>
+            <a:lvl2pPr marL="457200" algn="l" defTabSz="914400" rtl="0" eaLnBrk="1" latinLnBrk="0" hangingPunct="1">
+              <a:defRPr sz="1800" kern="1200">
+                <a:solidFill>
+                  <a:schemeClr val="lt1"/>
+                </a:solidFill>
+                <a:latin typeface="+mn-lt"/>
+                <a:ea typeface="+mn-ea"/>
+                <a:cs typeface="+mn-cs"/>
+              </a:defRPr>
+            </a:lvl2pPr>
+            <a:lvl3pPr marL="914400" algn="l" defTabSz="914400" rtl="0" eaLnBrk="1" latinLnBrk="0" hangingPunct="1">
+              <a:defRPr sz="1800" kern="1200">
+                <a:solidFill>
+                  <a:schemeClr val="lt1"/>
+                </a:solidFill>
+                <a:latin typeface="+mn-lt"/>
+                <a:ea typeface="+mn-ea"/>
+                <a:cs typeface="+mn-cs"/>
+              </a:defRPr>
+            </a:lvl3pPr>
+            <a:lvl4pPr marL="1371600" algn="l" defTabSz="914400" rtl="0" eaLnBrk="1" latinLnBrk="0" hangingPunct="1">
+              <a:defRPr sz="1800" kern="1200">
+                <a:solidFill>
+                  <a:schemeClr val="lt1"/>
+                </a:solidFill>
+                <a:latin typeface="+mn-lt"/>
+                <a:ea typeface="+mn-ea"/>
+                <a:cs typeface="+mn-cs"/>
+              </a:defRPr>
+            </a:lvl4pPr>
+            <a:lvl5pPr marL="1828800" algn="l" defTabSz="914400" rtl="0" eaLnBrk="1" latinLnBrk="0" hangingPunct="1">
+              <a:defRPr sz="1800" kern="1200">
+                <a:solidFill>
+                  <a:schemeClr val="lt1"/>
+                </a:solidFill>
+                <a:latin typeface="+mn-lt"/>
+                <a:ea typeface="+mn-ea"/>
+                <a:cs typeface="+mn-cs"/>
+              </a:defRPr>
+            </a:lvl5pPr>
+            <a:lvl6pPr marL="2286000" algn="l" defTabSz="914400" rtl="0" eaLnBrk="1" latinLnBrk="0" hangingPunct="1">
+              <a:defRPr sz="1800" kern="1200">
+                <a:solidFill>
+                  <a:schemeClr val="lt1"/>
+                </a:solidFill>
+                <a:latin typeface="+mn-lt"/>
+                <a:ea typeface="+mn-ea"/>
+                <a:cs typeface="+mn-cs"/>
+              </a:defRPr>
+            </a:lvl6pPr>
+            <a:lvl7pPr marL="2743200" algn="l" defTabSz="914400" rtl="0" eaLnBrk="1" latinLnBrk="0" hangingPunct="1">
+              <a:defRPr sz="1800" kern="1200">
+                <a:solidFill>
+                  <a:schemeClr val="lt1"/>
+                </a:solidFill>
+                <a:latin typeface="+mn-lt"/>
+                <a:ea typeface="+mn-ea"/>
+                <a:cs typeface="+mn-cs"/>
+              </a:defRPr>
+            </a:lvl7pPr>
+            <a:lvl8pPr marL="3200400" algn="l" defTabSz="914400" rtl="0" eaLnBrk="1" latinLnBrk="0" hangingPunct="1">
+              <a:defRPr sz="1800" kern="1200">
+                <a:solidFill>
+                  <a:schemeClr val="lt1"/>
+                </a:solidFill>
+                <a:latin typeface="+mn-lt"/>
+                <a:ea typeface="+mn-ea"/>
+                <a:cs typeface="+mn-cs"/>
+              </a:defRPr>
+            </a:lvl8pPr>
+            <a:lvl9pPr marL="3657600" algn="l" defTabSz="914400" rtl="0" eaLnBrk="1" latinLnBrk="0" hangingPunct="1">
+              <a:defRPr sz="1800" kern="1200">
+                <a:solidFill>
+                  <a:schemeClr val="lt1"/>
+                </a:solidFill>
+                <a:latin typeface="+mn-lt"/>
+                <a:ea typeface="+mn-ea"/>
+                <a:cs typeface="+mn-cs"/>
+              </a:defRPr>
+            </a:lvl9pPr>
+          </a:lstStyle>
+          <a:p>
+            <a:pPr algn="ctr">
+              <a:lnSpc>
+                <a:spcPts val="1000"/>
+              </a:lnSpc>
+            </a:pPr>
+            <a:r>
+              <a:rPr lang="en-US" sz="1000" i="1">
+                <a:solidFill>
+                  <a:schemeClr val="tx1"/>
+                </a:solidFill>
+              </a:rPr>
+              <a:t>_:n1</a:t>
+            </a:r>
+          </a:p>
+        </p:txBody>
+      </p:sp>
+      <p:sp>
+        <p:nvSpPr>
+          <p:cNvPr id="3" name="Rectangle: Rounded Corners 2">
+            <a:extLst>
+              <a:ext uri="{FF2B5EF4-FFF2-40B4-BE49-F238E27FC236}">
+                <a16:creationId xmlns:a16="http://schemas.microsoft.com/office/drawing/2014/main" id="{48E4886E-41E7-EEB4-C04E-1855B9D6DAD7}"/>
+              </a:ext>
+            </a:extLst>
+          </p:cNvPr>
+          <p:cNvSpPr/>
+          <p:nvPr/>
+        </p:nvSpPr>
+        <p:spPr>
+          <a:xfrm>
+            <a:off x="3748109" y="3086998"/>
+            <a:ext cx="615456" cy="404603"/>
+          </a:xfrm>
+          <a:prstGeom prst="roundRect">
+            <a:avLst/>
+          </a:prstGeom>
+          <a:solidFill>
+            <a:srgbClr val="F6F256"/>
+          </a:solidFill>
+          <a:ln>
+            <a:solidFill>
+              <a:schemeClr val="tx1"/>
+            </a:solidFill>
+          </a:ln>
+        </p:spPr>
+        <p:style>
+          <a:lnRef idx="2">
+            <a:schemeClr val="accent1">
+              <a:shade val="50000"/>
+            </a:schemeClr>
+          </a:lnRef>
+          <a:fillRef idx="1">
+            <a:schemeClr val="accent1"/>
+          </a:fillRef>
+          <a:effectRef idx="0">
+            <a:schemeClr val="accent1"/>
+          </a:effectRef>
+          <a:fontRef idx="minor">
+            <a:schemeClr val="lt1"/>
+          </a:fontRef>
+        </p:style>
+        <p:txBody>
+          <a:bodyPr rtlCol="0" anchor="ctr"/>
+          <a:lstStyle>
+            <a:defPPr>
+              <a:defRPr lang="en-US"/>
+            </a:defPPr>
+            <a:lvl1pPr marL="0" algn="l" defTabSz="914400" rtl="0" eaLnBrk="1" latinLnBrk="0" hangingPunct="1">
+              <a:defRPr sz="1800" kern="1200">
+                <a:solidFill>
+                  <a:schemeClr val="lt1"/>
+                </a:solidFill>
+                <a:latin typeface="+mn-lt"/>
+                <a:ea typeface="+mn-ea"/>
+                <a:cs typeface="+mn-cs"/>
+              </a:defRPr>
+            </a:lvl1pPr>
+            <a:lvl2pPr marL="457200" algn="l" defTabSz="914400" rtl="0" eaLnBrk="1" latinLnBrk="0" hangingPunct="1">
+              <a:defRPr sz="1800" kern="1200">
+                <a:solidFill>
+                  <a:schemeClr val="lt1"/>
+                </a:solidFill>
+                <a:latin typeface="+mn-lt"/>
+                <a:ea typeface="+mn-ea"/>
+                <a:cs typeface="+mn-cs"/>
+              </a:defRPr>
+            </a:lvl2pPr>
+            <a:lvl3pPr marL="914400" algn="l" defTabSz="914400" rtl="0" eaLnBrk="1" latinLnBrk="0" hangingPunct="1">
+              <a:defRPr sz="1800" kern="1200">
+                <a:solidFill>
+                  <a:schemeClr val="lt1"/>
+                </a:solidFill>
+                <a:latin typeface="+mn-lt"/>
+                <a:ea typeface="+mn-ea"/>
+                <a:cs typeface="+mn-cs"/>
+              </a:defRPr>
+            </a:lvl3pPr>
+            <a:lvl4pPr marL="1371600" algn="l" defTabSz="914400" rtl="0" eaLnBrk="1" latinLnBrk="0" hangingPunct="1">
+              <a:defRPr sz="1800" kern="1200">
+                <a:solidFill>
+                  <a:schemeClr val="lt1"/>
+                </a:solidFill>
+                <a:latin typeface="+mn-lt"/>
+                <a:ea typeface="+mn-ea"/>
+                <a:cs typeface="+mn-cs"/>
+              </a:defRPr>
+            </a:lvl4pPr>
+            <a:lvl5pPr marL="1828800" algn="l" defTabSz="914400" rtl="0" eaLnBrk="1" latinLnBrk="0" hangingPunct="1">
+              <a:defRPr sz="1800" kern="1200">
+                <a:solidFill>
+                  <a:schemeClr val="lt1"/>
+                </a:solidFill>
+                <a:latin typeface="+mn-lt"/>
+                <a:ea typeface="+mn-ea"/>
+                <a:cs typeface="+mn-cs"/>
+              </a:defRPr>
+            </a:lvl5pPr>
+            <a:lvl6pPr marL="2286000" algn="l" defTabSz="914400" rtl="0" eaLnBrk="1" latinLnBrk="0" hangingPunct="1">
+              <a:defRPr sz="1800" kern="1200">
+                <a:solidFill>
+                  <a:schemeClr val="lt1"/>
+                </a:solidFill>
+                <a:latin typeface="+mn-lt"/>
+                <a:ea typeface="+mn-ea"/>
+                <a:cs typeface="+mn-cs"/>
+              </a:defRPr>
+            </a:lvl6pPr>
+            <a:lvl7pPr marL="2743200" algn="l" defTabSz="914400" rtl="0" eaLnBrk="1" latinLnBrk="0" hangingPunct="1">
+              <a:defRPr sz="1800" kern="1200">
+                <a:solidFill>
+                  <a:schemeClr val="lt1"/>
+                </a:solidFill>
+                <a:latin typeface="+mn-lt"/>
+                <a:ea typeface="+mn-ea"/>
+                <a:cs typeface="+mn-cs"/>
+              </a:defRPr>
+            </a:lvl7pPr>
+            <a:lvl8pPr marL="3200400" algn="l" defTabSz="914400" rtl="0" eaLnBrk="1" latinLnBrk="0" hangingPunct="1">
+              <a:defRPr sz="1800" kern="1200">
+                <a:solidFill>
+                  <a:schemeClr val="lt1"/>
+                </a:solidFill>
+                <a:latin typeface="+mn-lt"/>
+                <a:ea typeface="+mn-ea"/>
+                <a:cs typeface="+mn-cs"/>
+              </a:defRPr>
+            </a:lvl8pPr>
+            <a:lvl9pPr marL="3657600" algn="l" defTabSz="914400" rtl="0" eaLnBrk="1" latinLnBrk="0" hangingPunct="1">
+              <a:defRPr sz="1800" kern="1200">
+                <a:solidFill>
+                  <a:schemeClr val="lt1"/>
+                </a:solidFill>
+                <a:latin typeface="+mn-lt"/>
+                <a:ea typeface="+mn-ea"/>
+                <a:cs typeface="+mn-cs"/>
+              </a:defRPr>
+            </a:lvl9pPr>
+          </a:lstStyle>
+          <a:p>
+            <a:pPr algn="ctr">
+              <a:lnSpc>
+                <a:spcPts val="1000"/>
+              </a:lnSpc>
+            </a:pPr>
+            <a:r>
+              <a:rPr lang="en-US" sz="1000" i="1">
+                <a:solidFill>
+                  <a:schemeClr val="tx1"/>
+                </a:solidFill>
+              </a:rPr>
+              <a:t>_:n2</a:t>
+            </a:r>
+          </a:p>
+        </p:txBody>
+      </p:sp>
+      <p:sp>
+        <p:nvSpPr>
+          <p:cNvPr id="4" name="TextBox 3">
+            <a:extLst>
+              <a:ext uri="{FF2B5EF4-FFF2-40B4-BE49-F238E27FC236}">
+                <a16:creationId xmlns:a16="http://schemas.microsoft.com/office/drawing/2014/main" id="{E648A04A-64E0-FC91-6947-C8CE5C5EE532}"/>
+              </a:ext>
+            </a:extLst>
+          </p:cNvPr>
+          <p:cNvSpPr txBox="1"/>
+          <p:nvPr/>
+        </p:nvSpPr>
+        <p:spPr>
+          <a:xfrm>
+            <a:off x="2716356" y="3075052"/>
+            <a:ext cx="906658" cy="246221"/>
+          </a:xfrm>
+          <a:prstGeom prst="rect">
+            <a:avLst/>
+          </a:prstGeom>
+          <a:noFill/>
+        </p:spPr>
+        <p:txBody>
+          <a:bodyPr wrap="none" lIns="45720" rIns="45720" rtlCol="0">
+            <a:spAutoFit/>
+          </a:bodyPr>
+          <a:lstStyle/>
+          <a:p>
+            <a:r>
+              <a:rPr lang="en-US" sz="1000" i="1"/>
+              <a:t>nc:PersonName</a:t>
+            </a:r>
+          </a:p>
+        </p:txBody>
+      </p:sp>
+      <p:cxnSp>
+        <p:nvCxnSpPr>
+          <p:cNvPr id="5" name="Straight Arrow Connector 4">
+            <a:extLst>
+              <a:ext uri="{FF2B5EF4-FFF2-40B4-BE49-F238E27FC236}">
+                <a16:creationId xmlns:a16="http://schemas.microsoft.com/office/drawing/2014/main" id="{961DA302-DEB2-96DA-4146-4D2E359FD445}"/>
+              </a:ext>
+            </a:extLst>
+          </p:cNvPr>
+          <p:cNvCxnSpPr>
+            <a:cxnSpLocks/>
+          </p:cNvCxnSpPr>
+          <p:nvPr/>
+        </p:nvCxnSpPr>
+        <p:spPr>
+          <a:xfrm>
+            <a:off x="2591261" y="3289300"/>
+            <a:ext cx="1156848" cy="0"/>
+          </a:xfrm>
+          <a:prstGeom prst="straightConnector1">
+            <a:avLst/>
+          </a:prstGeom>
+          <a:ln>
+            <a:solidFill>
+              <a:schemeClr val="tx1"/>
+            </a:solidFill>
+            <a:tailEnd type="triangle"/>
+          </a:ln>
+        </p:spPr>
+        <p:style>
+          <a:lnRef idx="1">
+            <a:schemeClr val="accent1"/>
+          </a:lnRef>
+          <a:fillRef idx="0">
+            <a:schemeClr val="accent1"/>
+          </a:fillRef>
+          <a:effectRef idx="0">
+            <a:schemeClr val="accent1"/>
+          </a:effectRef>
+          <a:fontRef idx="minor">
+            <a:schemeClr val="tx1"/>
+          </a:fontRef>
+        </p:style>
+      </p:cxnSp>
+      <p:sp>
+        <p:nvSpPr>
+          <p:cNvPr id="6" name="Rectangle 5">
+            <a:extLst>
+              <a:ext uri="{FF2B5EF4-FFF2-40B4-BE49-F238E27FC236}">
+                <a16:creationId xmlns:a16="http://schemas.microsoft.com/office/drawing/2014/main" id="{FB4EF293-1610-4D07-7FEE-3D68320F50EC}"/>
+              </a:ext>
+            </a:extLst>
+          </p:cNvPr>
+          <p:cNvSpPr/>
+          <p:nvPr/>
+        </p:nvSpPr>
+        <p:spPr>
+          <a:xfrm>
+            <a:off x="5736987" y="3102969"/>
+            <a:ext cx="923123" cy="389109"/>
+          </a:xfrm>
+          <a:prstGeom prst="rect">
+            <a:avLst/>
+          </a:prstGeom>
+          <a:solidFill>
+            <a:srgbClr val="F6F256"/>
+          </a:solidFill>
+          <a:ln>
+            <a:solidFill>
+              <a:schemeClr val="tx1"/>
+            </a:solidFill>
+          </a:ln>
+        </p:spPr>
+        <p:style>
+          <a:lnRef idx="2">
+            <a:schemeClr val="accent1">
+              <a:shade val="50000"/>
+            </a:schemeClr>
+          </a:lnRef>
+          <a:fillRef idx="1">
+            <a:schemeClr val="accent1"/>
+          </a:fillRef>
+          <a:effectRef idx="0">
+            <a:schemeClr val="accent1"/>
+          </a:effectRef>
+          <a:fontRef idx="minor">
+            <a:schemeClr val="lt1"/>
+          </a:fontRef>
+        </p:style>
+        <p:txBody>
+          <a:bodyPr rtlCol="0" anchor="ctr"/>
+          <a:lstStyle/>
+          <a:p>
+            <a:pPr algn="ctr"/>
+            <a:r>
+              <a:rPr lang="en-US" sz="1000">
+                <a:solidFill>
+                  <a:schemeClr val="tx1"/>
+                </a:solidFill>
+                <a:latin typeface="Consolas" panose="020B0609020204030204" pitchFamily="49" charset="0"/>
+              </a:rPr>
+              <a:t>Superman</a:t>
+            </a:r>
+          </a:p>
+        </p:txBody>
+      </p:sp>
+      <p:sp>
+        <p:nvSpPr>
+          <p:cNvPr id="8" name="Rectangle 7">
+            <a:extLst>
+              <a:ext uri="{FF2B5EF4-FFF2-40B4-BE49-F238E27FC236}">
+                <a16:creationId xmlns:a16="http://schemas.microsoft.com/office/drawing/2014/main" id="{0EF6472A-169B-F829-D1D9-57101ABFDC45}"/>
+              </a:ext>
+            </a:extLst>
+          </p:cNvPr>
+          <p:cNvSpPr/>
+          <p:nvPr/>
+        </p:nvSpPr>
+        <p:spPr>
+          <a:xfrm>
+            <a:off x="5736987" y="3799595"/>
+            <a:ext cx="923122" cy="389109"/>
+          </a:xfrm>
+          <a:prstGeom prst="rect">
+            <a:avLst/>
+          </a:prstGeom>
+          <a:solidFill>
+            <a:srgbClr val="F6F256"/>
+          </a:solidFill>
+          <a:ln>
+            <a:solidFill>
+              <a:schemeClr val="tx1"/>
+            </a:solidFill>
+          </a:ln>
+        </p:spPr>
+        <p:style>
+          <a:lnRef idx="2">
+            <a:schemeClr val="accent1">
+              <a:shade val="50000"/>
+            </a:schemeClr>
+          </a:lnRef>
+          <a:fillRef idx="1">
+            <a:schemeClr val="accent1"/>
+          </a:fillRef>
+          <a:effectRef idx="0">
+            <a:schemeClr val="accent1"/>
+          </a:effectRef>
+          <a:fontRef idx="minor">
+            <a:schemeClr val="lt1"/>
+          </a:fontRef>
+        </p:style>
+        <p:txBody>
+          <a:bodyPr rtlCol="0" anchor="ctr"/>
+          <a:lstStyle/>
+          <a:p>
+            <a:pPr algn="ctr"/>
+            <a:r>
+              <a:rPr lang="en-US" sz="1000">
+                <a:solidFill>
+                  <a:schemeClr val="tx1"/>
+                </a:solidFill>
+                <a:latin typeface="Consolas" panose="020B0609020204030204" pitchFamily="49" charset="0"/>
+              </a:rPr>
+              <a:t>Clark Kent</a:t>
+            </a:r>
+          </a:p>
+        </p:txBody>
+      </p:sp>
+      <p:cxnSp>
+        <p:nvCxnSpPr>
+          <p:cNvPr id="9" name="Straight Arrow Connector 8">
+            <a:extLst>
+              <a:ext uri="{FF2B5EF4-FFF2-40B4-BE49-F238E27FC236}">
+                <a16:creationId xmlns:a16="http://schemas.microsoft.com/office/drawing/2014/main" id="{68B1C714-9269-2210-EA54-907EA02E7A25}"/>
+              </a:ext>
+            </a:extLst>
+          </p:cNvPr>
+          <p:cNvCxnSpPr>
+            <a:cxnSpLocks/>
+            <a:endCxn id="6" idx="1"/>
+          </p:cNvCxnSpPr>
+          <p:nvPr/>
+        </p:nvCxnSpPr>
+        <p:spPr>
+          <a:xfrm>
+            <a:off x="4368314" y="3285809"/>
+            <a:ext cx="1368673" cy="11715"/>
+          </a:xfrm>
+          <a:prstGeom prst="straightConnector1">
+            <a:avLst/>
+          </a:prstGeom>
+          <a:ln>
+            <a:solidFill>
+              <a:schemeClr val="tx1"/>
+            </a:solidFill>
+            <a:tailEnd type="triangle"/>
+          </a:ln>
+        </p:spPr>
+        <p:style>
+          <a:lnRef idx="1">
+            <a:schemeClr val="accent1"/>
+          </a:lnRef>
+          <a:fillRef idx="0">
+            <a:schemeClr val="accent1"/>
+          </a:fillRef>
+          <a:effectRef idx="0">
+            <a:schemeClr val="accent1"/>
+          </a:effectRef>
+          <a:fontRef idx="minor">
+            <a:schemeClr val="tx1"/>
+          </a:fontRef>
+        </p:style>
+      </p:cxnSp>
+      <p:sp>
+        <p:nvSpPr>
+          <p:cNvPr id="10" name="TextBox 9">
+            <a:extLst>
+              <a:ext uri="{FF2B5EF4-FFF2-40B4-BE49-F238E27FC236}">
+                <a16:creationId xmlns:a16="http://schemas.microsoft.com/office/drawing/2014/main" id="{A7B97DBA-9FB3-0434-DF6B-EFB3F9F843D3}"/>
+              </a:ext>
+            </a:extLst>
+          </p:cNvPr>
+          <p:cNvSpPr txBox="1"/>
+          <p:nvPr/>
+        </p:nvSpPr>
+        <p:spPr>
+          <a:xfrm>
+            <a:off x="4518389" y="3075051"/>
+            <a:ext cx="1181734" cy="246221"/>
+          </a:xfrm>
+          <a:prstGeom prst="rect">
+            <a:avLst/>
+          </a:prstGeom>
+          <a:noFill/>
+        </p:spPr>
+        <p:txBody>
+          <a:bodyPr wrap="none" rtlCol="0">
+            <a:spAutoFit/>
+          </a:bodyPr>
+          <a:lstStyle/>
+          <a:p>
+            <a:r>
+              <a:rPr lang="en-US" sz="1000" i="1"/>
+              <a:t>nc:PersonFullName</a:t>
+            </a:r>
+          </a:p>
+        </p:txBody>
+      </p:sp>
+      <p:sp>
+        <p:nvSpPr>
+          <p:cNvPr id="13" name="Rectangle 12">
+            <a:extLst>
+              <a:ext uri="{FF2B5EF4-FFF2-40B4-BE49-F238E27FC236}">
+                <a16:creationId xmlns:a16="http://schemas.microsoft.com/office/drawing/2014/main" id="{64E65EA6-82C2-CFCA-08BA-EEEA3B5C2CD0}"/>
+              </a:ext>
+            </a:extLst>
+          </p:cNvPr>
+          <p:cNvSpPr/>
+          <p:nvPr/>
+        </p:nvSpPr>
+        <p:spPr>
+          <a:xfrm>
+            <a:off x="196655" y="209706"/>
+            <a:ext cx="1555945" cy="484094"/>
+          </a:xfrm>
+          <a:prstGeom prst="rect">
+            <a:avLst/>
+          </a:prstGeom>
+          <a:solidFill>
+            <a:srgbClr val="FFFF00"/>
+          </a:solidFill>
+          <a:ln>
+            <a:solidFill>
+              <a:schemeClr val="tx1"/>
+            </a:solidFill>
+          </a:ln>
+        </p:spPr>
+        <p:style>
+          <a:lnRef idx="2">
+            <a:schemeClr val="accent1">
+              <a:shade val="15000"/>
+            </a:schemeClr>
+          </a:lnRef>
+          <a:fillRef idx="1">
+            <a:schemeClr val="accent1"/>
+          </a:fillRef>
+          <a:effectRef idx="0">
+            <a:schemeClr val="accent1"/>
+          </a:effectRef>
+          <a:fontRef idx="minor">
+            <a:schemeClr val="lt1"/>
+          </a:fontRef>
+        </p:style>
+        <p:txBody>
+          <a:bodyPr rtlCol="0" anchor="ctr"/>
+          <a:lstStyle/>
+          <a:p>
+            <a:pPr algn="ctr"/>
+            <a:r>
+              <a:rPr lang="en-US">
+                <a:solidFill>
+                  <a:schemeClr val="tx1"/>
+                </a:solidFill>
+              </a:rPr>
+              <a:t>relProp</a:t>
+            </a:r>
+          </a:p>
+        </p:txBody>
+      </p:sp>
+      <p:sp>
+        <p:nvSpPr>
+          <p:cNvPr id="21" name="Arc 20">
+            <a:extLst>
+              <a:ext uri="{FF2B5EF4-FFF2-40B4-BE49-F238E27FC236}">
+                <a16:creationId xmlns:a16="http://schemas.microsoft.com/office/drawing/2014/main" id="{0CB5A27B-B7DC-A6FF-C2AD-DD274DB807CB}"/>
+              </a:ext>
+            </a:extLst>
+          </p:cNvPr>
+          <p:cNvSpPr/>
+          <p:nvPr/>
+        </p:nvSpPr>
+        <p:spPr>
+          <a:xfrm flipH="1">
+            <a:off x="2246557" y="2721532"/>
+            <a:ext cx="2794947" cy="1294892"/>
+          </a:xfrm>
+          <a:prstGeom prst="arc">
+            <a:avLst>
+              <a:gd name="adj1" fmla="val 326439"/>
+              <a:gd name="adj2" fmla="val 5890037"/>
+            </a:avLst>
+          </a:prstGeom>
+          <a:ln>
+            <a:solidFill>
+              <a:schemeClr val="tx1"/>
+            </a:solidFill>
+            <a:tailEnd type="triangle"/>
+          </a:ln>
+        </p:spPr>
+        <p:style>
+          <a:lnRef idx="1">
+            <a:schemeClr val="accent1"/>
+          </a:lnRef>
+          <a:fillRef idx="0">
+            <a:schemeClr val="accent1"/>
+          </a:fillRef>
+          <a:effectRef idx="0">
+            <a:schemeClr val="accent1"/>
+          </a:effectRef>
+          <a:fontRef idx="minor">
+            <a:schemeClr val="tx1"/>
+          </a:fontRef>
+        </p:style>
+        <p:txBody>
+          <a:bodyPr rtlCol="0" anchor="ctr"/>
+          <a:lstStyle/>
+          <a:p>
+            <a:pPr algn="ctr"/>
+            <a:endParaRPr lang="en-US"/>
+          </a:p>
+        </p:txBody>
+      </p:sp>
+      <p:sp>
+        <p:nvSpPr>
+          <p:cNvPr id="22" name="Rectangle: Rounded Corners 21">
+            <a:extLst>
+              <a:ext uri="{FF2B5EF4-FFF2-40B4-BE49-F238E27FC236}">
+                <a16:creationId xmlns:a16="http://schemas.microsoft.com/office/drawing/2014/main" id="{DADE0224-57D9-31A9-43E7-EB5A41031F84}"/>
+              </a:ext>
+            </a:extLst>
+          </p:cNvPr>
+          <p:cNvSpPr/>
+          <p:nvPr/>
+        </p:nvSpPr>
+        <p:spPr>
+          <a:xfrm>
+            <a:off x="3748109" y="3784101"/>
+            <a:ext cx="615456" cy="404603"/>
+          </a:xfrm>
+          <a:prstGeom prst="roundRect">
+            <a:avLst/>
+          </a:prstGeom>
+          <a:solidFill>
+            <a:srgbClr val="F6F256"/>
+          </a:solidFill>
+          <a:ln>
+            <a:solidFill>
+              <a:schemeClr val="tx1"/>
+            </a:solidFill>
+          </a:ln>
+        </p:spPr>
+        <p:style>
+          <a:lnRef idx="2">
+            <a:schemeClr val="accent1">
+              <a:shade val="50000"/>
+            </a:schemeClr>
+          </a:lnRef>
+          <a:fillRef idx="1">
+            <a:schemeClr val="accent1"/>
+          </a:fillRef>
+          <a:effectRef idx="0">
+            <a:schemeClr val="accent1"/>
+          </a:effectRef>
+          <a:fontRef idx="minor">
+            <a:schemeClr val="lt1"/>
+          </a:fontRef>
+        </p:style>
+        <p:txBody>
+          <a:bodyPr rtlCol="0" anchor="ctr"/>
+          <a:lstStyle>
+            <a:defPPr>
+              <a:defRPr lang="en-US"/>
+            </a:defPPr>
+            <a:lvl1pPr marL="0" algn="l" defTabSz="914400" rtl="0" eaLnBrk="1" latinLnBrk="0" hangingPunct="1">
+              <a:defRPr sz="1800" kern="1200">
+                <a:solidFill>
+                  <a:schemeClr val="lt1"/>
+                </a:solidFill>
+                <a:latin typeface="+mn-lt"/>
+                <a:ea typeface="+mn-ea"/>
+                <a:cs typeface="+mn-cs"/>
+              </a:defRPr>
+            </a:lvl1pPr>
+            <a:lvl2pPr marL="457200" algn="l" defTabSz="914400" rtl="0" eaLnBrk="1" latinLnBrk="0" hangingPunct="1">
+              <a:defRPr sz="1800" kern="1200">
+                <a:solidFill>
+                  <a:schemeClr val="lt1"/>
+                </a:solidFill>
+                <a:latin typeface="+mn-lt"/>
+                <a:ea typeface="+mn-ea"/>
+                <a:cs typeface="+mn-cs"/>
+              </a:defRPr>
+            </a:lvl2pPr>
+            <a:lvl3pPr marL="914400" algn="l" defTabSz="914400" rtl="0" eaLnBrk="1" latinLnBrk="0" hangingPunct="1">
+              <a:defRPr sz="1800" kern="1200">
+                <a:solidFill>
+                  <a:schemeClr val="lt1"/>
+                </a:solidFill>
+                <a:latin typeface="+mn-lt"/>
+                <a:ea typeface="+mn-ea"/>
+                <a:cs typeface="+mn-cs"/>
+              </a:defRPr>
+            </a:lvl3pPr>
+            <a:lvl4pPr marL="1371600" algn="l" defTabSz="914400" rtl="0" eaLnBrk="1" latinLnBrk="0" hangingPunct="1">
+              <a:defRPr sz="1800" kern="1200">
+                <a:solidFill>
+                  <a:schemeClr val="lt1"/>
+                </a:solidFill>
+                <a:latin typeface="+mn-lt"/>
+                <a:ea typeface="+mn-ea"/>
+                <a:cs typeface="+mn-cs"/>
+              </a:defRPr>
+            </a:lvl4pPr>
+            <a:lvl5pPr marL="1828800" algn="l" defTabSz="914400" rtl="0" eaLnBrk="1" latinLnBrk="0" hangingPunct="1">
+              <a:defRPr sz="1800" kern="1200">
+                <a:solidFill>
+                  <a:schemeClr val="lt1"/>
+                </a:solidFill>
+                <a:latin typeface="+mn-lt"/>
+                <a:ea typeface="+mn-ea"/>
+                <a:cs typeface="+mn-cs"/>
+              </a:defRPr>
+            </a:lvl5pPr>
+            <a:lvl6pPr marL="2286000" algn="l" defTabSz="914400" rtl="0" eaLnBrk="1" latinLnBrk="0" hangingPunct="1">
+              <a:defRPr sz="1800" kern="1200">
+                <a:solidFill>
+                  <a:schemeClr val="lt1"/>
+                </a:solidFill>
+                <a:latin typeface="+mn-lt"/>
+                <a:ea typeface="+mn-ea"/>
+                <a:cs typeface="+mn-cs"/>
+              </a:defRPr>
+            </a:lvl6pPr>
+            <a:lvl7pPr marL="2743200" algn="l" defTabSz="914400" rtl="0" eaLnBrk="1" latinLnBrk="0" hangingPunct="1">
+              <a:defRPr sz="1800" kern="1200">
+                <a:solidFill>
+                  <a:schemeClr val="lt1"/>
+                </a:solidFill>
+                <a:latin typeface="+mn-lt"/>
+                <a:ea typeface="+mn-ea"/>
+                <a:cs typeface="+mn-cs"/>
+              </a:defRPr>
+            </a:lvl7pPr>
+            <a:lvl8pPr marL="3200400" algn="l" defTabSz="914400" rtl="0" eaLnBrk="1" latinLnBrk="0" hangingPunct="1">
+              <a:defRPr sz="1800" kern="1200">
+                <a:solidFill>
+                  <a:schemeClr val="lt1"/>
+                </a:solidFill>
+                <a:latin typeface="+mn-lt"/>
+                <a:ea typeface="+mn-ea"/>
+                <a:cs typeface="+mn-cs"/>
+              </a:defRPr>
+            </a:lvl8pPr>
+            <a:lvl9pPr marL="3657600" algn="l" defTabSz="914400" rtl="0" eaLnBrk="1" latinLnBrk="0" hangingPunct="1">
+              <a:defRPr sz="1800" kern="1200">
+                <a:solidFill>
+                  <a:schemeClr val="lt1"/>
+                </a:solidFill>
+                <a:latin typeface="+mn-lt"/>
+                <a:ea typeface="+mn-ea"/>
+                <a:cs typeface="+mn-cs"/>
+              </a:defRPr>
+            </a:lvl9pPr>
+          </a:lstStyle>
+          <a:p>
+            <a:pPr algn="ctr">
+              <a:lnSpc>
+                <a:spcPts val="1000"/>
+              </a:lnSpc>
+            </a:pPr>
+            <a:r>
+              <a:rPr lang="en-US" sz="1000" i="1">
+                <a:solidFill>
+                  <a:schemeClr val="tx1"/>
+                </a:solidFill>
+              </a:rPr>
+              <a:t>_:n3</a:t>
+            </a:r>
+          </a:p>
+        </p:txBody>
+      </p:sp>
+      <p:sp>
+        <p:nvSpPr>
+          <p:cNvPr id="23" name="TextBox 22">
+            <a:extLst>
+              <a:ext uri="{FF2B5EF4-FFF2-40B4-BE49-F238E27FC236}">
+                <a16:creationId xmlns:a16="http://schemas.microsoft.com/office/drawing/2014/main" id="{939D8871-6993-F6FA-D43D-C96CBC1EB554}"/>
+              </a:ext>
+            </a:extLst>
+          </p:cNvPr>
+          <p:cNvSpPr txBox="1"/>
+          <p:nvPr/>
+        </p:nvSpPr>
+        <p:spPr>
+          <a:xfrm>
+            <a:off x="2712739" y="3682486"/>
+            <a:ext cx="906658" cy="246221"/>
+          </a:xfrm>
+          <a:prstGeom prst="rect">
+            <a:avLst/>
+          </a:prstGeom>
+          <a:noFill/>
+        </p:spPr>
+        <p:txBody>
+          <a:bodyPr wrap="none" lIns="45720" rIns="45720" rtlCol="0">
+            <a:spAutoFit/>
+          </a:bodyPr>
+          <a:lstStyle/>
+          <a:p>
+            <a:r>
+              <a:rPr lang="en-US" sz="1000" i="1"/>
+              <a:t>nc:PersonName</a:t>
+            </a:r>
+          </a:p>
+        </p:txBody>
+      </p:sp>
+      <p:cxnSp>
+        <p:nvCxnSpPr>
+          <p:cNvPr id="24" name="Straight Arrow Connector 23">
+            <a:extLst>
+              <a:ext uri="{FF2B5EF4-FFF2-40B4-BE49-F238E27FC236}">
+                <a16:creationId xmlns:a16="http://schemas.microsoft.com/office/drawing/2014/main" id="{9BDD0C11-0D0A-5173-8509-2520D02B02B2}"/>
+              </a:ext>
+            </a:extLst>
+          </p:cNvPr>
+          <p:cNvCxnSpPr>
+            <a:cxnSpLocks/>
+          </p:cNvCxnSpPr>
+          <p:nvPr/>
+        </p:nvCxnSpPr>
+        <p:spPr>
+          <a:xfrm>
+            <a:off x="4363565" y="4015556"/>
+            <a:ext cx="1371047" cy="11715"/>
+          </a:xfrm>
+          <a:prstGeom prst="straightConnector1">
+            <a:avLst/>
+          </a:prstGeom>
+          <a:ln>
+            <a:solidFill>
+              <a:schemeClr val="tx1"/>
+            </a:solidFill>
+            <a:tailEnd type="triangle"/>
+          </a:ln>
+        </p:spPr>
+        <p:style>
+          <a:lnRef idx="1">
+            <a:schemeClr val="accent1"/>
+          </a:lnRef>
+          <a:fillRef idx="0">
+            <a:schemeClr val="accent1"/>
+          </a:fillRef>
+          <a:effectRef idx="0">
+            <a:schemeClr val="accent1"/>
+          </a:effectRef>
+          <a:fontRef idx="minor">
+            <a:schemeClr val="tx1"/>
+          </a:fontRef>
+        </p:style>
+      </p:cxnSp>
+      <p:sp>
+        <p:nvSpPr>
+          <p:cNvPr id="25" name="TextBox 24">
+            <a:extLst>
+              <a:ext uri="{FF2B5EF4-FFF2-40B4-BE49-F238E27FC236}">
+                <a16:creationId xmlns:a16="http://schemas.microsoft.com/office/drawing/2014/main" id="{34B6E69B-822F-9B12-868F-4EC7F53DE756}"/>
+              </a:ext>
+            </a:extLst>
+          </p:cNvPr>
+          <p:cNvSpPr txBox="1"/>
+          <p:nvPr/>
+        </p:nvSpPr>
+        <p:spPr>
+          <a:xfrm>
+            <a:off x="4513640" y="3804798"/>
+            <a:ext cx="1181734" cy="246221"/>
+          </a:xfrm>
+          <a:prstGeom prst="rect">
+            <a:avLst/>
+          </a:prstGeom>
+          <a:noFill/>
+        </p:spPr>
+        <p:txBody>
+          <a:bodyPr wrap="none" rtlCol="0">
+            <a:spAutoFit/>
+          </a:bodyPr>
+          <a:lstStyle/>
+          <a:p>
+            <a:r>
+              <a:rPr lang="en-US" sz="1000" i="1"/>
+              <a:t>nc:PersonFullName</a:t>
+            </a:r>
+          </a:p>
+        </p:txBody>
+      </p:sp>
+      <p:sp>
+        <p:nvSpPr>
+          <p:cNvPr id="26" name="Arc 25">
+            <a:extLst>
+              <a:ext uri="{FF2B5EF4-FFF2-40B4-BE49-F238E27FC236}">
+                <a16:creationId xmlns:a16="http://schemas.microsoft.com/office/drawing/2014/main" id="{B7EDB173-FAAE-A896-38B7-1E6E7B925765}"/>
+              </a:ext>
+            </a:extLst>
+          </p:cNvPr>
+          <p:cNvSpPr/>
+          <p:nvPr/>
+        </p:nvSpPr>
+        <p:spPr>
+          <a:xfrm flipH="1" flipV="1">
+            <a:off x="3141730" y="2478362"/>
+            <a:ext cx="4983861" cy="1294892"/>
+          </a:xfrm>
+          <a:prstGeom prst="arc">
+            <a:avLst>
+              <a:gd name="adj1" fmla="val 189453"/>
+              <a:gd name="adj2" fmla="val 5890037"/>
+            </a:avLst>
+          </a:prstGeom>
+          <a:ln>
+            <a:solidFill>
+              <a:schemeClr val="tx1"/>
+            </a:solidFill>
+            <a:tailEnd type="triangle"/>
+          </a:ln>
+        </p:spPr>
+        <p:style>
+          <a:lnRef idx="1">
+            <a:schemeClr val="accent1"/>
+          </a:lnRef>
+          <a:fillRef idx="0">
+            <a:schemeClr val="accent1"/>
+          </a:fillRef>
+          <a:effectRef idx="0">
+            <a:schemeClr val="accent1"/>
+          </a:effectRef>
+          <a:fontRef idx="minor">
+            <a:schemeClr val="tx1"/>
+          </a:fontRef>
+        </p:style>
+        <p:txBody>
+          <a:bodyPr rtlCol="0" anchor="ctr"/>
+          <a:lstStyle/>
+          <a:p>
+            <a:pPr algn="ctr"/>
+            <a:endParaRPr lang="en-US"/>
+          </a:p>
+        </p:txBody>
+      </p:sp>
+      <p:sp>
+        <p:nvSpPr>
+          <p:cNvPr id="27" name="Rectangle 26">
+            <a:extLst>
+              <a:ext uri="{FF2B5EF4-FFF2-40B4-BE49-F238E27FC236}">
+                <a16:creationId xmlns:a16="http://schemas.microsoft.com/office/drawing/2014/main" id="{89CF16AA-9C0B-2206-7D15-5C01D142A168}"/>
+              </a:ext>
+            </a:extLst>
+          </p:cNvPr>
+          <p:cNvSpPr/>
+          <p:nvPr/>
+        </p:nvSpPr>
+        <p:spPr>
+          <a:xfrm>
+            <a:off x="5736987" y="2285404"/>
+            <a:ext cx="923123" cy="389109"/>
+          </a:xfrm>
+          <a:prstGeom prst="rect">
+            <a:avLst/>
+          </a:prstGeom>
+          <a:solidFill>
+            <a:srgbClr val="F6F256"/>
+          </a:solidFill>
+          <a:ln>
+            <a:solidFill>
+              <a:schemeClr val="tx1"/>
+            </a:solidFill>
+          </a:ln>
+        </p:spPr>
+        <p:style>
+          <a:lnRef idx="2">
+            <a:schemeClr val="accent1">
+              <a:shade val="50000"/>
+            </a:schemeClr>
+          </a:lnRef>
+          <a:fillRef idx="1">
+            <a:schemeClr val="accent1"/>
+          </a:fillRef>
+          <a:effectRef idx="0">
+            <a:schemeClr val="accent1"/>
+          </a:effectRef>
+          <a:fontRef idx="minor">
+            <a:schemeClr val="lt1"/>
+          </a:fontRef>
+        </p:style>
+        <p:txBody>
+          <a:bodyPr rtlCol="0" anchor="ctr"/>
+          <a:lstStyle/>
+          <a:p>
+            <a:pPr algn="ctr"/>
+            <a:r>
+              <a:rPr lang="en-US" sz="1000">
+                <a:solidFill>
+                  <a:schemeClr val="tx1"/>
+                </a:solidFill>
+                <a:latin typeface="Consolas" panose="020B0609020204030204" pitchFamily="49" charset="0"/>
+              </a:rPr>
+              <a:t>true</a:t>
+            </a:r>
+          </a:p>
+        </p:txBody>
+      </p:sp>
+      <p:sp>
+        <p:nvSpPr>
+          <p:cNvPr id="28" name="TextBox 27">
+            <a:extLst>
+              <a:ext uri="{FF2B5EF4-FFF2-40B4-BE49-F238E27FC236}">
+                <a16:creationId xmlns:a16="http://schemas.microsoft.com/office/drawing/2014/main" id="{F8BA6EC9-EE7F-E124-C367-D4F1CDF499A6}"/>
+              </a:ext>
+            </a:extLst>
+          </p:cNvPr>
+          <p:cNvSpPr txBox="1"/>
+          <p:nvPr/>
+        </p:nvSpPr>
+        <p:spPr>
+          <a:xfrm>
+            <a:off x="4697499" y="2262585"/>
+            <a:ext cx="774571" cy="246221"/>
+          </a:xfrm>
+          <a:prstGeom prst="rect">
+            <a:avLst/>
+          </a:prstGeom>
+          <a:noFill/>
+        </p:spPr>
+        <p:txBody>
+          <a:bodyPr wrap="none" rtlCol="0">
+            <a:spAutoFit/>
+          </a:bodyPr>
+          <a:lstStyle/>
+          <a:p>
+            <a:r>
+              <a:rPr lang="en-US" sz="1000" i="1"/>
+              <a:t>my:isSecret</a:t>
+            </a:r>
+          </a:p>
+        </p:txBody>
+      </p:sp>
+    </p:spTree>
+    <p:extLst>
+      <p:ext uri="{BB962C8B-B14F-4D97-AF65-F5344CB8AC3E}">
+        <p14:creationId xmlns:p14="http://schemas.microsoft.com/office/powerpoint/2010/main" val="696920132"/>
+      </p:ext>
+    </p:extLst>
+  </p:cSld>
+  <p:clrMapOvr>
+    <a:masterClrMapping/>
+  </p:clrMapOvr>
+</p:sld>
+</file>
+
 <file path=ppt/theme/theme1.xml><?xml version="1.0" encoding="utf-8"?>
 <a:theme xmlns:a="http://schemas.openxmlformats.org/drawingml/2006/main" name="Office Theme">
   <a:themeElements>

</xml_diff>

<commit_message>
Added new section 3.8 14 July 2025 draft
</commit_message>
<xml_diff>
--- a/pptx/figures.pptx
+++ b/pptx/figures.pptx
@@ -277,7 +277,7 @@
           <a:p>
             <a:fld id="{8B6844D7-9723-4963-9A7A-AA67393D1570}" type="datetimeFigureOut">
               <a:rPr lang="en-US" smtClean="0"/>
-              <a:t>12/22/2024</a:t>
+              <a:t>7/14/2025</a:t>
             </a:fld>
             <a:endParaRPr lang="en-US"/>
           </a:p>
@@ -475,7 +475,7 @@
           <a:p>
             <a:fld id="{8B6844D7-9723-4963-9A7A-AA67393D1570}" type="datetimeFigureOut">
               <a:rPr lang="en-US" smtClean="0"/>
-              <a:t>12/22/2024</a:t>
+              <a:t>7/14/2025</a:t>
             </a:fld>
             <a:endParaRPr lang="en-US"/>
           </a:p>
@@ -683,7 +683,7 @@
           <a:p>
             <a:fld id="{8B6844D7-9723-4963-9A7A-AA67393D1570}" type="datetimeFigureOut">
               <a:rPr lang="en-US" smtClean="0"/>
-              <a:t>12/22/2024</a:t>
+              <a:t>7/14/2025</a:t>
             </a:fld>
             <a:endParaRPr lang="en-US"/>
           </a:p>
@@ -881,7 +881,7 @@
           <a:p>
             <a:fld id="{8B6844D7-9723-4963-9A7A-AA67393D1570}" type="datetimeFigureOut">
               <a:rPr lang="en-US" smtClean="0"/>
-              <a:t>12/22/2024</a:t>
+              <a:t>7/14/2025</a:t>
             </a:fld>
             <a:endParaRPr lang="en-US"/>
           </a:p>
@@ -1156,7 +1156,7 @@
           <a:p>
             <a:fld id="{8B6844D7-9723-4963-9A7A-AA67393D1570}" type="datetimeFigureOut">
               <a:rPr lang="en-US" smtClean="0"/>
-              <a:t>12/22/2024</a:t>
+              <a:t>7/14/2025</a:t>
             </a:fld>
             <a:endParaRPr lang="en-US"/>
           </a:p>
@@ -1421,7 +1421,7 @@
           <a:p>
             <a:fld id="{8B6844D7-9723-4963-9A7A-AA67393D1570}" type="datetimeFigureOut">
               <a:rPr lang="en-US" smtClean="0"/>
-              <a:t>12/22/2024</a:t>
+              <a:t>7/14/2025</a:t>
             </a:fld>
             <a:endParaRPr lang="en-US"/>
           </a:p>
@@ -1833,7 +1833,7 @@
           <a:p>
             <a:fld id="{8B6844D7-9723-4963-9A7A-AA67393D1570}" type="datetimeFigureOut">
               <a:rPr lang="en-US" smtClean="0"/>
-              <a:t>12/22/2024</a:t>
+              <a:t>7/14/2025</a:t>
             </a:fld>
             <a:endParaRPr lang="en-US"/>
           </a:p>
@@ -1974,7 +1974,7 @@
           <a:p>
             <a:fld id="{8B6844D7-9723-4963-9A7A-AA67393D1570}" type="datetimeFigureOut">
               <a:rPr lang="en-US" smtClean="0"/>
-              <a:t>12/22/2024</a:t>
+              <a:t>7/14/2025</a:t>
             </a:fld>
             <a:endParaRPr lang="en-US"/>
           </a:p>
@@ -2087,7 +2087,7 @@
           <a:p>
             <a:fld id="{8B6844D7-9723-4963-9A7A-AA67393D1570}" type="datetimeFigureOut">
               <a:rPr lang="en-US" smtClean="0"/>
-              <a:t>12/22/2024</a:t>
+              <a:t>7/14/2025</a:t>
             </a:fld>
             <a:endParaRPr lang="en-US"/>
           </a:p>
@@ -2398,7 +2398,7 @@
           <a:p>
             <a:fld id="{8B6844D7-9723-4963-9A7A-AA67393D1570}" type="datetimeFigureOut">
               <a:rPr lang="en-US" smtClean="0"/>
-              <a:t>12/22/2024</a:t>
+              <a:t>7/14/2025</a:t>
             </a:fld>
             <a:endParaRPr lang="en-US"/>
           </a:p>
@@ -2686,7 +2686,7 @@
           <a:p>
             <a:fld id="{8B6844D7-9723-4963-9A7A-AA67393D1570}" type="datetimeFigureOut">
               <a:rPr lang="en-US" smtClean="0"/>
-              <a:t>12/22/2024</a:t>
+              <a:t>7/14/2025</a:t>
             </a:fld>
             <a:endParaRPr lang="en-US"/>
           </a:p>
@@ -2927,7 +2927,7 @@
           <a:p>
             <a:fld id="{8B6844D7-9723-4963-9A7A-AA67393D1570}" type="datetimeFigureOut">
               <a:rPr lang="en-US" smtClean="0"/>
-              <a:t>12/22/2024</a:t>
+              <a:t>7/14/2025</a:t>
             </a:fld>
             <a:endParaRPr lang="en-US"/>
           </a:p>
@@ -30124,7 +30124,7 @@
                   <a:schemeClr val="tx1"/>
                 </a:solidFill>
               </a:rPr>
-              <a:t>meaning</a:t>
+              <a:t>kgraph</a:t>
             </a:r>
           </a:p>
         </p:txBody>
@@ -30283,7 +30283,7 @@
                   <a:schemeClr val="tx1"/>
                 </a:solidFill>
               </a:rPr>
-              <a:t>_:n1</a:t>
+              <a:t>_:b0</a:t>
             </a:r>
           </a:p>
         </p:txBody>
@@ -30752,7 +30752,7 @@
                   <a:schemeClr val="tx1"/>
                 </a:solidFill>
               </a:rPr>
-              <a:t>_:n2</a:t>
+              <a:t>_:b1</a:t>
             </a:r>
           </a:p>
         </p:txBody>
@@ -31448,6 +31448,242 @@
           </a:p>
         </p:txBody>
       </p:sp>
+      <p:sp>
+        <p:nvSpPr>
+          <p:cNvPr id="3" name="Rectangle: Rounded Corners 2">
+            <a:extLst>
+              <a:ext uri="{FF2B5EF4-FFF2-40B4-BE49-F238E27FC236}">
+                <a16:creationId xmlns:a16="http://schemas.microsoft.com/office/drawing/2014/main" id="{43365162-1DCC-07EF-6CBD-114443BE6DE4}"/>
+              </a:ext>
+            </a:extLst>
+          </p:cNvPr>
+          <p:cNvSpPr/>
+          <p:nvPr/>
+        </p:nvSpPr>
+        <p:spPr>
+          <a:xfrm>
+            <a:off x="5411545" y="1892211"/>
+            <a:ext cx="1141655" cy="405676"/>
+          </a:xfrm>
+          <a:prstGeom prst="roundRect">
+            <a:avLst/>
+          </a:prstGeom>
+          <a:solidFill>
+            <a:srgbClr val="D0B9FF"/>
+          </a:solidFill>
+          <a:ln>
+            <a:solidFill>
+              <a:schemeClr val="tx1"/>
+            </a:solidFill>
+          </a:ln>
+        </p:spPr>
+        <p:style>
+          <a:lnRef idx="2">
+            <a:schemeClr val="accent1">
+              <a:shade val="50000"/>
+            </a:schemeClr>
+          </a:lnRef>
+          <a:fillRef idx="1">
+            <a:schemeClr val="accent1"/>
+          </a:fillRef>
+          <a:effectRef idx="0">
+            <a:schemeClr val="accent1"/>
+          </a:effectRef>
+          <a:fontRef idx="minor">
+            <a:schemeClr val="lt1"/>
+          </a:fontRef>
+        </p:style>
+        <p:txBody>
+          <a:bodyPr rtlCol="0" anchor="ctr"/>
+          <a:lstStyle>
+            <a:defPPr>
+              <a:defRPr lang="en-US"/>
+            </a:defPPr>
+            <a:lvl1pPr marL="0" algn="l" defTabSz="914400" rtl="0" eaLnBrk="1" latinLnBrk="0" hangingPunct="1">
+              <a:defRPr sz="1800" kern="1200">
+                <a:solidFill>
+                  <a:schemeClr val="lt1"/>
+                </a:solidFill>
+                <a:latin typeface="+mn-lt"/>
+                <a:ea typeface="+mn-ea"/>
+                <a:cs typeface="+mn-cs"/>
+              </a:defRPr>
+            </a:lvl1pPr>
+            <a:lvl2pPr marL="457200" algn="l" defTabSz="914400" rtl="0" eaLnBrk="1" latinLnBrk="0" hangingPunct="1">
+              <a:defRPr sz="1800" kern="1200">
+                <a:solidFill>
+                  <a:schemeClr val="lt1"/>
+                </a:solidFill>
+                <a:latin typeface="+mn-lt"/>
+                <a:ea typeface="+mn-ea"/>
+                <a:cs typeface="+mn-cs"/>
+              </a:defRPr>
+            </a:lvl2pPr>
+            <a:lvl3pPr marL="914400" algn="l" defTabSz="914400" rtl="0" eaLnBrk="1" latinLnBrk="0" hangingPunct="1">
+              <a:defRPr sz="1800" kern="1200">
+                <a:solidFill>
+                  <a:schemeClr val="lt1"/>
+                </a:solidFill>
+                <a:latin typeface="+mn-lt"/>
+                <a:ea typeface="+mn-ea"/>
+                <a:cs typeface="+mn-cs"/>
+              </a:defRPr>
+            </a:lvl3pPr>
+            <a:lvl4pPr marL="1371600" algn="l" defTabSz="914400" rtl="0" eaLnBrk="1" latinLnBrk="0" hangingPunct="1">
+              <a:defRPr sz="1800" kern="1200">
+                <a:solidFill>
+                  <a:schemeClr val="lt1"/>
+                </a:solidFill>
+                <a:latin typeface="+mn-lt"/>
+                <a:ea typeface="+mn-ea"/>
+                <a:cs typeface="+mn-cs"/>
+              </a:defRPr>
+            </a:lvl4pPr>
+            <a:lvl5pPr marL="1828800" algn="l" defTabSz="914400" rtl="0" eaLnBrk="1" latinLnBrk="0" hangingPunct="1">
+              <a:defRPr sz="1800" kern="1200">
+                <a:solidFill>
+                  <a:schemeClr val="lt1"/>
+                </a:solidFill>
+                <a:latin typeface="+mn-lt"/>
+                <a:ea typeface="+mn-ea"/>
+                <a:cs typeface="+mn-cs"/>
+              </a:defRPr>
+            </a:lvl5pPr>
+            <a:lvl6pPr marL="2286000" algn="l" defTabSz="914400" rtl="0" eaLnBrk="1" latinLnBrk="0" hangingPunct="1">
+              <a:defRPr sz="1800" kern="1200">
+                <a:solidFill>
+                  <a:schemeClr val="lt1"/>
+                </a:solidFill>
+                <a:latin typeface="+mn-lt"/>
+                <a:ea typeface="+mn-ea"/>
+                <a:cs typeface="+mn-cs"/>
+              </a:defRPr>
+            </a:lvl6pPr>
+            <a:lvl7pPr marL="2743200" algn="l" defTabSz="914400" rtl="0" eaLnBrk="1" latinLnBrk="0" hangingPunct="1">
+              <a:defRPr sz="1800" kern="1200">
+                <a:solidFill>
+                  <a:schemeClr val="lt1"/>
+                </a:solidFill>
+                <a:latin typeface="+mn-lt"/>
+                <a:ea typeface="+mn-ea"/>
+                <a:cs typeface="+mn-cs"/>
+              </a:defRPr>
+            </a:lvl7pPr>
+            <a:lvl8pPr marL="3200400" algn="l" defTabSz="914400" rtl="0" eaLnBrk="1" latinLnBrk="0" hangingPunct="1">
+              <a:defRPr sz="1800" kern="1200">
+                <a:solidFill>
+                  <a:schemeClr val="lt1"/>
+                </a:solidFill>
+                <a:latin typeface="+mn-lt"/>
+                <a:ea typeface="+mn-ea"/>
+                <a:cs typeface="+mn-cs"/>
+              </a:defRPr>
+            </a:lvl8pPr>
+            <a:lvl9pPr marL="3657600" algn="l" defTabSz="914400" rtl="0" eaLnBrk="1" latinLnBrk="0" hangingPunct="1">
+              <a:defRPr sz="1800" kern="1200">
+                <a:solidFill>
+                  <a:schemeClr val="lt1"/>
+                </a:solidFill>
+                <a:latin typeface="+mn-lt"/>
+                <a:ea typeface="+mn-ea"/>
+                <a:cs typeface="+mn-cs"/>
+              </a:defRPr>
+            </a:lvl9pPr>
+          </a:lstStyle>
+          <a:p>
+            <a:pPr algn="ctr"/>
+            <a:r>
+              <a:rPr lang="en-US" sz="1000">
+                <a:solidFill>
+                  <a:schemeClr val="tx1"/>
+                </a:solidFill>
+              </a:rPr>
+              <a:t>nc:TextType</a:t>
+            </a:r>
+          </a:p>
+        </p:txBody>
+      </p:sp>
+      <p:cxnSp>
+        <p:nvCxnSpPr>
+          <p:cNvPr id="10" name="Straight Arrow Connector 9">
+            <a:extLst>
+              <a:ext uri="{FF2B5EF4-FFF2-40B4-BE49-F238E27FC236}">
+                <a16:creationId xmlns:a16="http://schemas.microsoft.com/office/drawing/2014/main" id="{9C27A31F-1181-7203-D31A-8CB45877D294}"/>
+              </a:ext>
+            </a:extLst>
+          </p:cNvPr>
+          <p:cNvCxnSpPr>
+            <a:cxnSpLocks/>
+          </p:cNvCxnSpPr>
+          <p:nvPr/>
+        </p:nvCxnSpPr>
+        <p:spPr>
+          <a:xfrm flipV="1">
+            <a:off x="5966734" y="2286000"/>
+            <a:ext cx="1084" cy="792649"/>
+          </a:xfrm>
+          <a:prstGeom prst="straightConnector1">
+            <a:avLst/>
+          </a:prstGeom>
+          <a:ln>
+            <a:solidFill>
+              <a:schemeClr val="tx1"/>
+            </a:solidFill>
+            <a:tailEnd type="triangle"/>
+          </a:ln>
+        </p:spPr>
+        <p:style>
+          <a:lnRef idx="1">
+            <a:schemeClr val="accent1"/>
+          </a:lnRef>
+          <a:fillRef idx="0">
+            <a:schemeClr val="accent1"/>
+          </a:fillRef>
+          <a:effectRef idx="0">
+            <a:schemeClr val="accent1"/>
+          </a:effectRef>
+          <a:fontRef idx="minor">
+            <a:schemeClr val="tx1"/>
+          </a:fontRef>
+        </p:style>
+      </p:cxnSp>
+      <p:sp>
+        <p:nvSpPr>
+          <p:cNvPr id="12" name="TextBox 11">
+            <a:extLst>
+              <a:ext uri="{FF2B5EF4-FFF2-40B4-BE49-F238E27FC236}">
+                <a16:creationId xmlns:a16="http://schemas.microsoft.com/office/drawing/2014/main" id="{C6AD02E3-68CF-7E7C-F8AC-58C4A576AB7A}"/>
+              </a:ext>
+            </a:extLst>
+          </p:cNvPr>
+          <p:cNvSpPr txBox="1"/>
+          <p:nvPr/>
+        </p:nvSpPr>
+        <p:spPr>
+          <a:xfrm>
+            <a:off x="5763434" y="2602976"/>
+            <a:ext cx="408766" cy="153888"/>
+          </a:xfrm>
+          <a:prstGeom prst="rect">
+            <a:avLst/>
+          </a:prstGeom>
+          <a:solidFill>
+            <a:schemeClr val="bg1"/>
+          </a:solidFill>
+        </p:spPr>
+        <p:txBody>
+          <a:bodyPr wrap="none" lIns="0" tIns="0" rIns="0" bIns="0" rtlCol="0">
+            <a:spAutoFit/>
+          </a:bodyPr>
+          <a:lstStyle/>
+          <a:p>
+            <a:r>
+              <a:rPr lang="en-US" sz="1000" i="1"/>
+              <a:t>rdf:type</a:t>
+            </a:r>
+          </a:p>
+        </p:txBody>
+      </p:sp>
     </p:spTree>
     <p:extLst>
       <p:ext uri="{BB962C8B-B14F-4D97-AF65-F5344CB8AC3E}">

</xml_diff>

<commit_message>
1 August 2025 candidate for PS01 (#49)
</commit_message>
<xml_diff>
--- a/pptx/figures.pptx
+++ b/pptx/figures.pptx
@@ -277,7 +277,7 @@
           <a:p>
             <a:fld id="{8B6844D7-9723-4963-9A7A-AA67393D1570}" type="datetimeFigureOut">
               <a:rPr lang="en-US" smtClean="0"/>
-              <a:t>12/22/2024</a:t>
+              <a:t>7/14/2025</a:t>
             </a:fld>
             <a:endParaRPr lang="en-US"/>
           </a:p>
@@ -475,7 +475,7 @@
           <a:p>
             <a:fld id="{8B6844D7-9723-4963-9A7A-AA67393D1570}" type="datetimeFigureOut">
               <a:rPr lang="en-US" smtClean="0"/>
-              <a:t>12/22/2024</a:t>
+              <a:t>7/14/2025</a:t>
             </a:fld>
             <a:endParaRPr lang="en-US"/>
           </a:p>
@@ -683,7 +683,7 @@
           <a:p>
             <a:fld id="{8B6844D7-9723-4963-9A7A-AA67393D1570}" type="datetimeFigureOut">
               <a:rPr lang="en-US" smtClean="0"/>
-              <a:t>12/22/2024</a:t>
+              <a:t>7/14/2025</a:t>
             </a:fld>
             <a:endParaRPr lang="en-US"/>
           </a:p>
@@ -881,7 +881,7 @@
           <a:p>
             <a:fld id="{8B6844D7-9723-4963-9A7A-AA67393D1570}" type="datetimeFigureOut">
               <a:rPr lang="en-US" smtClean="0"/>
-              <a:t>12/22/2024</a:t>
+              <a:t>7/14/2025</a:t>
             </a:fld>
             <a:endParaRPr lang="en-US"/>
           </a:p>
@@ -1156,7 +1156,7 @@
           <a:p>
             <a:fld id="{8B6844D7-9723-4963-9A7A-AA67393D1570}" type="datetimeFigureOut">
               <a:rPr lang="en-US" smtClean="0"/>
-              <a:t>12/22/2024</a:t>
+              <a:t>7/14/2025</a:t>
             </a:fld>
             <a:endParaRPr lang="en-US"/>
           </a:p>
@@ -1421,7 +1421,7 @@
           <a:p>
             <a:fld id="{8B6844D7-9723-4963-9A7A-AA67393D1570}" type="datetimeFigureOut">
               <a:rPr lang="en-US" smtClean="0"/>
-              <a:t>12/22/2024</a:t>
+              <a:t>7/14/2025</a:t>
             </a:fld>
             <a:endParaRPr lang="en-US"/>
           </a:p>
@@ -1833,7 +1833,7 @@
           <a:p>
             <a:fld id="{8B6844D7-9723-4963-9A7A-AA67393D1570}" type="datetimeFigureOut">
               <a:rPr lang="en-US" smtClean="0"/>
-              <a:t>12/22/2024</a:t>
+              <a:t>7/14/2025</a:t>
             </a:fld>
             <a:endParaRPr lang="en-US"/>
           </a:p>
@@ -1974,7 +1974,7 @@
           <a:p>
             <a:fld id="{8B6844D7-9723-4963-9A7A-AA67393D1570}" type="datetimeFigureOut">
               <a:rPr lang="en-US" smtClean="0"/>
-              <a:t>12/22/2024</a:t>
+              <a:t>7/14/2025</a:t>
             </a:fld>
             <a:endParaRPr lang="en-US"/>
           </a:p>
@@ -2087,7 +2087,7 @@
           <a:p>
             <a:fld id="{8B6844D7-9723-4963-9A7A-AA67393D1570}" type="datetimeFigureOut">
               <a:rPr lang="en-US" smtClean="0"/>
-              <a:t>12/22/2024</a:t>
+              <a:t>7/14/2025</a:t>
             </a:fld>
             <a:endParaRPr lang="en-US"/>
           </a:p>
@@ -2398,7 +2398,7 @@
           <a:p>
             <a:fld id="{8B6844D7-9723-4963-9A7A-AA67393D1570}" type="datetimeFigureOut">
               <a:rPr lang="en-US" smtClean="0"/>
-              <a:t>12/22/2024</a:t>
+              <a:t>7/14/2025</a:t>
             </a:fld>
             <a:endParaRPr lang="en-US"/>
           </a:p>
@@ -2686,7 +2686,7 @@
           <a:p>
             <a:fld id="{8B6844D7-9723-4963-9A7A-AA67393D1570}" type="datetimeFigureOut">
               <a:rPr lang="en-US" smtClean="0"/>
-              <a:t>12/22/2024</a:t>
+              <a:t>7/14/2025</a:t>
             </a:fld>
             <a:endParaRPr lang="en-US"/>
           </a:p>
@@ -2927,7 +2927,7 @@
           <a:p>
             <a:fld id="{8B6844D7-9723-4963-9A7A-AA67393D1570}" type="datetimeFigureOut">
               <a:rPr lang="en-US" smtClean="0"/>
-              <a:t>12/22/2024</a:t>
+              <a:t>7/14/2025</a:t>
             </a:fld>
             <a:endParaRPr lang="en-US"/>
           </a:p>
@@ -30124,7 +30124,7 @@
                   <a:schemeClr val="tx1"/>
                 </a:solidFill>
               </a:rPr>
-              <a:t>meaning</a:t>
+              <a:t>kgraph</a:t>
             </a:r>
           </a:p>
         </p:txBody>
@@ -30283,7 +30283,7 @@
                   <a:schemeClr val="tx1"/>
                 </a:solidFill>
               </a:rPr>
-              <a:t>_:n1</a:t>
+              <a:t>_:b0</a:t>
             </a:r>
           </a:p>
         </p:txBody>
@@ -30752,7 +30752,7 @@
                   <a:schemeClr val="tx1"/>
                 </a:solidFill>
               </a:rPr>
-              <a:t>_:n2</a:t>
+              <a:t>_:b1</a:t>
             </a:r>
           </a:p>
         </p:txBody>
@@ -31448,6 +31448,242 @@
           </a:p>
         </p:txBody>
       </p:sp>
+      <p:sp>
+        <p:nvSpPr>
+          <p:cNvPr id="3" name="Rectangle: Rounded Corners 2">
+            <a:extLst>
+              <a:ext uri="{FF2B5EF4-FFF2-40B4-BE49-F238E27FC236}">
+                <a16:creationId xmlns:a16="http://schemas.microsoft.com/office/drawing/2014/main" id="{43365162-1DCC-07EF-6CBD-114443BE6DE4}"/>
+              </a:ext>
+            </a:extLst>
+          </p:cNvPr>
+          <p:cNvSpPr/>
+          <p:nvPr/>
+        </p:nvSpPr>
+        <p:spPr>
+          <a:xfrm>
+            <a:off x="5411545" y="1892211"/>
+            <a:ext cx="1141655" cy="405676"/>
+          </a:xfrm>
+          <a:prstGeom prst="roundRect">
+            <a:avLst/>
+          </a:prstGeom>
+          <a:solidFill>
+            <a:srgbClr val="D0B9FF"/>
+          </a:solidFill>
+          <a:ln>
+            <a:solidFill>
+              <a:schemeClr val="tx1"/>
+            </a:solidFill>
+          </a:ln>
+        </p:spPr>
+        <p:style>
+          <a:lnRef idx="2">
+            <a:schemeClr val="accent1">
+              <a:shade val="50000"/>
+            </a:schemeClr>
+          </a:lnRef>
+          <a:fillRef idx="1">
+            <a:schemeClr val="accent1"/>
+          </a:fillRef>
+          <a:effectRef idx="0">
+            <a:schemeClr val="accent1"/>
+          </a:effectRef>
+          <a:fontRef idx="minor">
+            <a:schemeClr val="lt1"/>
+          </a:fontRef>
+        </p:style>
+        <p:txBody>
+          <a:bodyPr rtlCol="0" anchor="ctr"/>
+          <a:lstStyle>
+            <a:defPPr>
+              <a:defRPr lang="en-US"/>
+            </a:defPPr>
+            <a:lvl1pPr marL="0" algn="l" defTabSz="914400" rtl="0" eaLnBrk="1" latinLnBrk="0" hangingPunct="1">
+              <a:defRPr sz="1800" kern="1200">
+                <a:solidFill>
+                  <a:schemeClr val="lt1"/>
+                </a:solidFill>
+                <a:latin typeface="+mn-lt"/>
+                <a:ea typeface="+mn-ea"/>
+                <a:cs typeface="+mn-cs"/>
+              </a:defRPr>
+            </a:lvl1pPr>
+            <a:lvl2pPr marL="457200" algn="l" defTabSz="914400" rtl="0" eaLnBrk="1" latinLnBrk="0" hangingPunct="1">
+              <a:defRPr sz="1800" kern="1200">
+                <a:solidFill>
+                  <a:schemeClr val="lt1"/>
+                </a:solidFill>
+                <a:latin typeface="+mn-lt"/>
+                <a:ea typeface="+mn-ea"/>
+                <a:cs typeface="+mn-cs"/>
+              </a:defRPr>
+            </a:lvl2pPr>
+            <a:lvl3pPr marL="914400" algn="l" defTabSz="914400" rtl="0" eaLnBrk="1" latinLnBrk="0" hangingPunct="1">
+              <a:defRPr sz="1800" kern="1200">
+                <a:solidFill>
+                  <a:schemeClr val="lt1"/>
+                </a:solidFill>
+                <a:latin typeface="+mn-lt"/>
+                <a:ea typeface="+mn-ea"/>
+                <a:cs typeface="+mn-cs"/>
+              </a:defRPr>
+            </a:lvl3pPr>
+            <a:lvl4pPr marL="1371600" algn="l" defTabSz="914400" rtl="0" eaLnBrk="1" latinLnBrk="0" hangingPunct="1">
+              <a:defRPr sz="1800" kern="1200">
+                <a:solidFill>
+                  <a:schemeClr val="lt1"/>
+                </a:solidFill>
+                <a:latin typeface="+mn-lt"/>
+                <a:ea typeface="+mn-ea"/>
+                <a:cs typeface="+mn-cs"/>
+              </a:defRPr>
+            </a:lvl4pPr>
+            <a:lvl5pPr marL="1828800" algn="l" defTabSz="914400" rtl="0" eaLnBrk="1" latinLnBrk="0" hangingPunct="1">
+              <a:defRPr sz="1800" kern="1200">
+                <a:solidFill>
+                  <a:schemeClr val="lt1"/>
+                </a:solidFill>
+                <a:latin typeface="+mn-lt"/>
+                <a:ea typeface="+mn-ea"/>
+                <a:cs typeface="+mn-cs"/>
+              </a:defRPr>
+            </a:lvl5pPr>
+            <a:lvl6pPr marL="2286000" algn="l" defTabSz="914400" rtl="0" eaLnBrk="1" latinLnBrk="0" hangingPunct="1">
+              <a:defRPr sz="1800" kern="1200">
+                <a:solidFill>
+                  <a:schemeClr val="lt1"/>
+                </a:solidFill>
+                <a:latin typeface="+mn-lt"/>
+                <a:ea typeface="+mn-ea"/>
+                <a:cs typeface="+mn-cs"/>
+              </a:defRPr>
+            </a:lvl6pPr>
+            <a:lvl7pPr marL="2743200" algn="l" defTabSz="914400" rtl="0" eaLnBrk="1" latinLnBrk="0" hangingPunct="1">
+              <a:defRPr sz="1800" kern="1200">
+                <a:solidFill>
+                  <a:schemeClr val="lt1"/>
+                </a:solidFill>
+                <a:latin typeface="+mn-lt"/>
+                <a:ea typeface="+mn-ea"/>
+                <a:cs typeface="+mn-cs"/>
+              </a:defRPr>
+            </a:lvl7pPr>
+            <a:lvl8pPr marL="3200400" algn="l" defTabSz="914400" rtl="0" eaLnBrk="1" latinLnBrk="0" hangingPunct="1">
+              <a:defRPr sz="1800" kern="1200">
+                <a:solidFill>
+                  <a:schemeClr val="lt1"/>
+                </a:solidFill>
+                <a:latin typeface="+mn-lt"/>
+                <a:ea typeface="+mn-ea"/>
+                <a:cs typeface="+mn-cs"/>
+              </a:defRPr>
+            </a:lvl8pPr>
+            <a:lvl9pPr marL="3657600" algn="l" defTabSz="914400" rtl="0" eaLnBrk="1" latinLnBrk="0" hangingPunct="1">
+              <a:defRPr sz="1800" kern="1200">
+                <a:solidFill>
+                  <a:schemeClr val="lt1"/>
+                </a:solidFill>
+                <a:latin typeface="+mn-lt"/>
+                <a:ea typeface="+mn-ea"/>
+                <a:cs typeface="+mn-cs"/>
+              </a:defRPr>
+            </a:lvl9pPr>
+          </a:lstStyle>
+          <a:p>
+            <a:pPr algn="ctr"/>
+            <a:r>
+              <a:rPr lang="en-US" sz="1000">
+                <a:solidFill>
+                  <a:schemeClr val="tx1"/>
+                </a:solidFill>
+              </a:rPr>
+              <a:t>nc:TextType</a:t>
+            </a:r>
+          </a:p>
+        </p:txBody>
+      </p:sp>
+      <p:cxnSp>
+        <p:nvCxnSpPr>
+          <p:cNvPr id="10" name="Straight Arrow Connector 9">
+            <a:extLst>
+              <a:ext uri="{FF2B5EF4-FFF2-40B4-BE49-F238E27FC236}">
+                <a16:creationId xmlns:a16="http://schemas.microsoft.com/office/drawing/2014/main" id="{9C27A31F-1181-7203-D31A-8CB45877D294}"/>
+              </a:ext>
+            </a:extLst>
+          </p:cNvPr>
+          <p:cNvCxnSpPr>
+            <a:cxnSpLocks/>
+          </p:cNvCxnSpPr>
+          <p:nvPr/>
+        </p:nvCxnSpPr>
+        <p:spPr>
+          <a:xfrm flipV="1">
+            <a:off x="5966734" y="2286000"/>
+            <a:ext cx="1084" cy="792649"/>
+          </a:xfrm>
+          <a:prstGeom prst="straightConnector1">
+            <a:avLst/>
+          </a:prstGeom>
+          <a:ln>
+            <a:solidFill>
+              <a:schemeClr val="tx1"/>
+            </a:solidFill>
+            <a:tailEnd type="triangle"/>
+          </a:ln>
+        </p:spPr>
+        <p:style>
+          <a:lnRef idx="1">
+            <a:schemeClr val="accent1"/>
+          </a:lnRef>
+          <a:fillRef idx="0">
+            <a:schemeClr val="accent1"/>
+          </a:fillRef>
+          <a:effectRef idx="0">
+            <a:schemeClr val="accent1"/>
+          </a:effectRef>
+          <a:fontRef idx="minor">
+            <a:schemeClr val="tx1"/>
+          </a:fontRef>
+        </p:style>
+      </p:cxnSp>
+      <p:sp>
+        <p:nvSpPr>
+          <p:cNvPr id="12" name="TextBox 11">
+            <a:extLst>
+              <a:ext uri="{FF2B5EF4-FFF2-40B4-BE49-F238E27FC236}">
+                <a16:creationId xmlns:a16="http://schemas.microsoft.com/office/drawing/2014/main" id="{C6AD02E3-68CF-7E7C-F8AC-58C4A576AB7A}"/>
+              </a:ext>
+            </a:extLst>
+          </p:cNvPr>
+          <p:cNvSpPr txBox="1"/>
+          <p:nvPr/>
+        </p:nvSpPr>
+        <p:spPr>
+          <a:xfrm>
+            <a:off x="5763434" y="2602976"/>
+            <a:ext cx="408766" cy="153888"/>
+          </a:xfrm>
+          <a:prstGeom prst="rect">
+            <a:avLst/>
+          </a:prstGeom>
+          <a:solidFill>
+            <a:schemeClr val="bg1"/>
+          </a:solidFill>
+        </p:spPr>
+        <p:txBody>
+          <a:bodyPr wrap="none" lIns="0" tIns="0" rIns="0" bIns="0" rtlCol="0">
+            <a:spAutoFit/>
+          </a:bodyPr>
+          <a:lstStyle/>
+          <a:p>
+            <a:r>
+              <a:rPr lang="en-US" sz="1000" i="1"/>
+              <a:t>rdf:type</a:t>
+            </a:r>
+          </a:p>
+        </p:txBody>
+      </p:sp>
     </p:spTree>
     <p:extLst>
       <p:ext uri="{BB962C8B-B14F-4D97-AF65-F5344CB8AC3E}">

</xml_diff>